<commit_message>
Atualização dos slides de seminario
</commit_message>
<xml_diff>
--- a/Seminario/optimal clusters - SLIDES.pptx
+++ b/Seminario/optimal clusters - SLIDES.pptx
@@ -5,7 +5,7 @@
     <p:sldMasterId id="2147483648" r:id="rId1"/>
   </p:sldMasterIdLst>
   <p:notesMasterIdLst>
-    <p:notesMasterId r:id="rId21"/>
+    <p:notesMasterId r:id="rId26"/>
   </p:notesMasterIdLst>
   <p:sldIdLst>
     <p:sldId id="256" r:id="rId2"/>
@@ -27,6 +27,11 @@
     <p:sldId id="278" r:id="rId18"/>
     <p:sldId id="281" r:id="rId19"/>
     <p:sldId id="283" r:id="rId20"/>
+    <p:sldId id="284" r:id="rId21"/>
+    <p:sldId id="285" r:id="rId22"/>
+    <p:sldId id="286" r:id="rId23"/>
+    <p:sldId id="287" r:id="rId24"/>
+    <p:sldId id="288" r:id="rId25"/>
   </p:sldIdLst>
   <p:sldSz cx="12192000" cy="6858000"/>
   <p:notesSz cx="6858000" cy="9144000"/>
@@ -215,7 +220,7 @@
           <a:p>
             <a:fld id="{C27D85D0-8849-4E53-AC47-0B98F7A07F37}" type="datetimeFigureOut">
               <a:rPr lang="pt-BR" smtClean="0"/>
-              <a:t>30/04/2024</a:t>
+              <a:t>01/05/2024</a:t>
             </a:fld>
             <a:endParaRPr lang="pt-BR"/>
           </a:p>
@@ -1493,6 +1498,109 @@
 </p:notes>
 </file>
 
+<file path=ppt/notesSlides/notesSlide19.xml><?xml version="1.0" encoding="utf-8"?>
+<p:notes xmlns:a="http://schemas.openxmlformats.org/drawingml/2006/main" xmlns:r="http://schemas.openxmlformats.org/officeDocument/2006/relationships" xmlns:p="http://schemas.openxmlformats.org/presentationml/2006/main">
+  <p:cSld>
+    <p:spTree>
+      <p:nvGrpSpPr>
+        <p:cNvPr id="1" name=""/>
+        <p:cNvGrpSpPr/>
+        <p:nvPr/>
+      </p:nvGrpSpPr>
+      <p:grpSpPr>
+        <a:xfrm>
+          <a:off x="0" y="0"/>
+          <a:ext cx="0" cy="0"/>
+          <a:chOff x="0" y="0"/>
+          <a:chExt cx="0" cy="0"/>
+        </a:xfrm>
+      </p:grpSpPr>
+      <p:sp>
+        <p:nvSpPr>
+          <p:cNvPr id="2" name="Espaço Reservado para Imagem de Slide 1"/>
+          <p:cNvSpPr>
+            <a:spLocks noGrp="1" noRot="1" noChangeAspect="1"/>
+          </p:cNvSpPr>
+          <p:nvPr>
+            <p:ph type="sldImg"/>
+          </p:nvPr>
+        </p:nvSpPr>
+        <p:spPr/>
+      </p:sp>
+      <p:sp>
+        <p:nvSpPr>
+          <p:cNvPr id="3" name="Espaço Reservado para Anotações 2"/>
+          <p:cNvSpPr>
+            <a:spLocks noGrp="1"/>
+          </p:cNvSpPr>
+          <p:nvPr>
+            <p:ph type="body" idx="1"/>
+          </p:nvPr>
+        </p:nvSpPr>
+        <p:spPr/>
+        <p:txBody>
+          <a:bodyPr/>
+          <a:lstStyle/>
+          <a:p>
+            <a:r>
+              <a:rPr lang="pt-BR" dirty="0"/>
+              <a:t>Os procedimentos </a:t>
+            </a:r>
+            <a:r>
+              <a:rPr lang="pt-BR" dirty="0" err="1"/>
+              <a:t>aglomerativos</a:t>
+            </a:r>
+            <a:r>
+              <a:rPr lang="pt-BR" dirty="0"/>
+              <a:t> começam com n clusters </a:t>
+            </a:r>
+            <a:r>
+              <a:rPr lang="pt-BR" dirty="0" err="1"/>
+              <a:t>singleton</a:t>
+            </a:r>
+            <a:r>
+              <a:rPr lang="pt-BR" dirty="0"/>
+              <a:t> e, em seguida, formam uma sequência mesclando clusters sucessivamente</a:t>
+            </a:r>
+          </a:p>
+        </p:txBody>
+      </p:sp>
+      <p:sp>
+        <p:nvSpPr>
+          <p:cNvPr id="4" name="Espaço Reservado para Número de Slide 3"/>
+          <p:cNvSpPr>
+            <a:spLocks noGrp="1"/>
+          </p:cNvSpPr>
+          <p:nvPr>
+            <p:ph type="sldNum" sz="quarter" idx="5"/>
+          </p:nvPr>
+        </p:nvSpPr>
+        <p:spPr/>
+        <p:txBody>
+          <a:bodyPr/>
+          <a:lstStyle/>
+          <a:p>
+            <a:fld id="{5E0A5BA6-946D-4582-8BDA-25D6682E6A6A}" type="slidenum">
+              <a:rPr lang="pt-BR" smtClean="0"/>
+              <a:t>20</a:t>
+            </a:fld>
+            <a:endParaRPr lang="pt-BR"/>
+          </a:p>
+        </p:txBody>
+      </p:sp>
+    </p:spTree>
+    <p:extLst>
+      <p:ext uri="{BB962C8B-B14F-4D97-AF65-F5344CB8AC3E}">
+        <p14:creationId xmlns:p14="http://schemas.microsoft.com/office/powerpoint/2010/main" val="3408265775"/>
+      </p:ext>
+    </p:extLst>
+  </p:cSld>
+  <p:clrMapOvr>
+    <a:masterClrMapping/>
+  </p:clrMapOvr>
+</p:notes>
+</file>
+
 <file path=ppt/notesSlides/notesSlide2.xml><?xml version="1.0" encoding="utf-8"?>
 <p:notes xmlns:a="http://schemas.openxmlformats.org/drawingml/2006/main" xmlns:r="http://schemas.openxmlformats.org/officeDocument/2006/relationships" xmlns:p="http://schemas.openxmlformats.org/presentationml/2006/main">
   <p:cSld>
@@ -1624,6 +1732,418 @@
     <p:extLst>
       <p:ext uri="{BB962C8B-B14F-4D97-AF65-F5344CB8AC3E}">
         <p14:creationId xmlns:p14="http://schemas.microsoft.com/office/powerpoint/2010/main" val="3941562026"/>
+      </p:ext>
+    </p:extLst>
+  </p:cSld>
+  <p:clrMapOvr>
+    <a:masterClrMapping/>
+  </p:clrMapOvr>
+</p:notes>
+</file>
+
+<file path=ppt/notesSlides/notesSlide20.xml><?xml version="1.0" encoding="utf-8"?>
+<p:notes xmlns:a="http://schemas.openxmlformats.org/drawingml/2006/main" xmlns:r="http://schemas.openxmlformats.org/officeDocument/2006/relationships" xmlns:p="http://schemas.openxmlformats.org/presentationml/2006/main">
+  <p:cSld>
+    <p:spTree>
+      <p:nvGrpSpPr>
+        <p:cNvPr id="1" name=""/>
+        <p:cNvGrpSpPr/>
+        <p:nvPr/>
+      </p:nvGrpSpPr>
+      <p:grpSpPr>
+        <a:xfrm>
+          <a:off x="0" y="0"/>
+          <a:ext cx="0" cy="0"/>
+          <a:chOff x="0" y="0"/>
+          <a:chExt cx="0" cy="0"/>
+        </a:xfrm>
+      </p:grpSpPr>
+      <p:sp>
+        <p:nvSpPr>
+          <p:cNvPr id="2" name="Espaço Reservado para Imagem de Slide 1"/>
+          <p:cNvSpPr>
+            <a:spLocks noGrp="1" noRot="1" noChangeAspect="1"/>
+          </p:cNvSpPr>
+          <p:nvPr>
+            <p:ph type="sldImg"/>
+          </p:nvPr>
+        </p:nvSpPr>
+        <p:spPr/>
+      </p:sp>
+      <p:sp>
+        <p:nvSpPr>
+          <p:cNvPr id="3" name="Espaço Reservado para Anotações 2"/>
+          <p:cNvSpPr>
+            <a:spLocks noGrp="1"/>
+          </p:cNvSpPr>
+          <p:nvPr>
+            <p:ph type="body" idx="1"/>
+          </p:nvPr>
+        </p:nvSpPr>
+        <p:spPr/>
+        <p:txBody>
+          <a:bodyPr/>
+          <a:lstStyle/>
+          <a:p>
+            <a:r>
+              <a:rPr lang="pt-BR" dirty="0"/>
+              <a:t>Os procedimentos </a:t>
+            </a:r>
+            <a:r>
+              <a:rPr lang="pt-BR" dirty="0" err="1"/>
+              <a:t>aglomerativos</a:t>
+            </a:r>
+            <a:r>
+              <a:rPr lang="pt-BR" dirty="0"/>
+              <a:t> começam com n clusters </a:t>
+            </a:r>
+            <a:r>
+              <a:rPr lang="pt-BR" dirty="0" err="1"/>
+              <a:t>singleton</a:t>
+            </a:r>
+            <a:r>
+              <a:rPr lang="pt-BR" dirty="0"/>
+              <a:t> e, em seguida, formam uma sequência mesclando clusters sucessivamente</a:t>
+            </a:r>
+          </a:p>
+        </p:txBody>
+      </p:sp>
+      <p:sp>
+        <p:nvSpPr>
+          <p:cNvPr id="4" name="Espaço Reservado para Número de Slide 3"/>
+          <p:cNvSpPr>
+            <a:spLocks noGrp="1"/>
+          </p:cNvSpPr>
+          <p:nvPr>
+            <p:ph type="sldNum" sz="quarter" idx="5"/>
+          </p:nvPr>
+        </p:nvSpPr>
+        <p:spPr/>
+        <p:txBody>
+          <a:bodyPr/>
+          <a:lstStyle/>
+          <a:p>
+            <a:fld id="{5E0A5BA6-946D-4582-8BDA-25D6682E6A6A}" type="slidenum">
+              <a:rPr lang="pt-BR" smtClean="0"/>
+              <a:t>21</a:t>
+            </a:fld>
+            <a:endParaRPr lang="pt-BR"/>
+          </a:p>
+        </p:txBody>
+      </p:sp>
+    </p:spTree>
+    <p:extLst>
+      <p:ext uri="{BB962C8B-B14F-4D97-AF65-F5344CB8AC3E}">
+        <p14:creationId xmlns:p14="http://schemas.microsoft.com/office/powerpoint/2010/main" val="1235423617"/>
+      </p:ext>
+    </p:extLst>
+  </p:cSld>
+  <p:clrMapOvr>
+    <a:masterClrMapping/>
+  </p:clrMapOvr>
+</p:notes>
+</file>
+
+<file path=ppt/notesSlides/notesSlide21.xml><?xml version="1.0" encoding="utf-8"?>
+<p:notes xmlns:a="http://schemas.openxmlformats.org/drawingml/2006/main" xmlns:r="http://schemas.openxmlformats.org/officeDocument/2006/relationships" xmlns:p="http://schemas.openxmlformats.org/presentationml/2006/main">
+  <p:cSld>
+    <p:spTree>
+      <p:nvGrpSpPr>
+        <p:cNvPr id="1" name=""/>
+        <p:cNvGrpSpPr/>
+        <p:nvPr/>
+      </p:nvGrpSpPr>
+      <p:grpSpPr>
+        <a:xfrm>
+          <a:off x="0" y="0"/>
+          <a:ext cx="0" cy="0"/>
+          <a:chOff x="0" y="0"/>
+          <a:chExt cx="0" cy="0"/>
+        </a:xfrm>
+      </p:grpSpPr>
+      <p:sp>
+        <p:nvSpPr>
+          <p:cNvPr id="2" name="Espaço Reservado para Imagem de Slide 1"/>
+          <p:cNvSpPr>
+            <a:spLocks noGrp="1" noRot="1" noChangeAspect="1"/>
+          </p:cNvSpPr>
+          <p:nvPr>
+            <p:ph type="sldImg"/>
+          </p:nvPr>
+        </p:nvSpPr>
+        <p:spPr/>
+      </p:sp>
+      <p:sp>
+        <p:nvSpPr>
+          <p:cNvPr id="3" name="Espaço Reservado para Anotações 2"/>
+          <p:cNvSpPr>
+            <a:spLocks noGrp="1"/>
+          </p:cNvSpPr>
+          <p:nvPr>
+            <p:ph type="body" idx="1"/>
+          </p:nvPr>
+        </p:nvSpPr>
+        <p:spPr/>
+        <p:txBody>
+          <a:bodyPr/>
+          <a:lstStyle/>
+          <a:p>
+            <a:r>
+              <a:rPr lang="pt-BR" dirty="0"/>
+              <a:t>Os procedimentos </a:t>
+            </a:r>
+            <a:r>
+              <a:rPr lang="pt-BR" dirty="0" err="1"/>
+              <a:t>aglomerativos</a:t>
+            </a:r>
+            <a:r>
+              <a:rPr lang="pt-BR" dirty="0"/>
+              <a:t> começam com n clusters </a:t>
+            </a:r>
+            <a:r>
+              <a:rPr lang="pt-BR" dirty="0" err="1"/>
+              <a:t>singleton</a:t>
+            </a:r>
+            <a:r>
+              <a:rPr lang="pt-BR" dirty="0"/>
+              <a:t> e, em seguida, formam uma sequência mesclando clusters sucessivamente</a:t>
+            </a:r>
+          </a:p>
+        </p:txBody>
+      </p:sp>
+      <p:sp>
+        <p:nvSpPr>
+          <p:cNvPr id="4" name="Espaço Reservado para Número de Slide 3"/>
+          <p:cNvSpPr>
+            <a:spLocks noGrp="1"/>
+          </p:cNvSpPr>
+          <p:nvPr>
+            <p:ph type="sldNum" sz="quarter" idx="5"/>
+          </p:nvPr>
+        </p:nvSpPr>
+        <p:spPr/>
+        <p:txBody>
+          <a:bodyPr/>
+          <a:lstStyle/>
+          <a:p>
+            <a:fld id="{5E0A5BA6-946D-4582-8BDA-25D6682E6A6A}" type="slidenum">
+              <a:rPr lang="pt-BR" smtClean="0"/>
+              <a:t>22</a:t>
+            </a:fld>
+            <a:endParaRPr lang="pt-BR"/>
+          </a:p>
+        </p:txBody>
+      </p:sp>
+    </p:spTree>
+    <p:extLst>
+      <p:ext uri="{BB962C8B-B14F-4D97-AF65-F5344CB8AC3E}">
+        <p14:creationId xmlns:p14="http://schemas.microsoft.com/office/powerpoint/2010/main" val="3328700659"/>
+      </p:ext>
+    </p:extLst>
+  </p:cSld>
+  <p:clrMapOvr>
+    <a:masterClrMapping/>
+  </p:clrMapOvr>
+</p:notes>
+</file>
+
+<file path=ppt/notesSlides/notesSlide22.xml><?xml version="1.0" encoding="utf-8"?>
+<p:notes xmlns:a="http://schemas.openxmlformats.org/drawingml/2006/main" xmlns:r="http://schemas.openxmlformats.org/officeDocument/2006/relationships" xmlns:p="http://schemas.openxmlformats.org/presentationml/2006/main">
+  <p:cSld>
+    <p:spTree>
+      <p:nvGrpSpPr>
+        <p:cNvPr id="1" name=""/>
+        <p:cNvGrpSpPr/>
+        <p:nvPr/>
+      </p:nvGrpSpPr>
+      <p:grpSpPr>
+        <a:xfrm>
+          <a:off x="0" y="0"/>
+          <a:ext cx="0" cy="0"/>
+          <a:chOff x="0" y="0"/>
+          <a:chExt cx="0" cy="0"/>
+        </a:xfrm>
+      </p:grpSpPr>
+      <p:sp>
+        <p:nvSpPr>
+          <p:cNvPr id="2" name="Espaço Reservado para Imagem de Slide 1"/>
+          <p:cNvSpPr>
+            <a:spLocks noGrp="1" noRot="1" noChangeAspect="1"/>
+          </p:cNvSpPr>
+          <p:nvPr>
+            <p:ph type="sldImg"/>
+          </p:nvPr>
+        </p:nvSpPr>
+        <p:spPr/>
+      </p:sp>
+      <p:sp>
+        <p:nvSpPr>
+          <p:cNvPr id="3" name="Espaço Reservado para Anotações 2"/>
+          <p:cNvSpPr>
+            <a:spLocks noGrp="1"/>
+          </p:cNvSpPr>
+          <p:nvPr>
+            <p:ph type="body" idx="1"/>
+          </p:nvPr>
+        </p:nvSpPr>
+        <p:spPr/>
+        <p:txBody>
+          <a:bodyPr/>
+          <a:lstStyle/>
+          <a:p>
+            <a:r>
+              <a:rPr lang="pt-BR" dirty="0"/>
+              <a:t>Os procedimentos </a:t>
+            </a:r>
+            <a:r>
+              <a:rPr lang="pt-BR" dirty="0" err="1"/>
+              <a:t>aglomerativos</a:t>
+            </a:r>
+            <a:r>
+              <a:rPr lang="pt-BR" dirty="0"/>
+              <a:t> começam com n clusters </a:t>
+            </a:r>
+            <a:r>
+              <a:rPr lang="pt-BR" dirty="0" err="1"/>
+              <a:t>singleton</a:t>
+            </a:r>
+            <a:r>
+              <a:rPr lang="pt-BR" dirty="0"/>
+              <a:t> e, em seguida, formam uma sequência mesclando clusters sucessivamente</a:t>
+            </a:r>
+          </a:p>
+        </p:txBody>
+      </p:sp>
+      <p:sp>
+        <p:nvSpPr>
+          <p:cNvPr id="4" name="Espaço Reservado para Número de Slide 3"/>
+          <p:cNvSpPr>
+            <a:spLocks noGrp="1"/>
+          </p:cNvSpPr>
+          <p:nvPr>
+            <p:ph type="sldNum" sz="quarter" idx="5"/>
+          </p:nvPr>
+        </p:nvSpPr>
+        <p:spPr/>
+        <p:txBody>
+          <a:bodyPr/>
+          <a:lstStyle/>
+          <a:p>
+            <a:fld id="{5E0A5BA6-946D-4582-8BDA-25D6682E6A6A}" type="slidenum">
+              <a:rPr lang="pt-BR" smtClean="0"/>
+              <a:t>23</a:t>
+            </a:fld>
+            <a:endParaRPr lang="pt-BR"/>
+          </a:p>
+        </p:txBody>
+      </p:sp>
+    </p:spTree>
+    <p:extLst>
+      <p:ext uri="{BB962C8B-B14F-4D97-AF65-F5344CB8AC3E}">
+        <p14:creationId xmlns:p14="http://schemas.microsoft.com/office/powerpoint/2010/main" val="2326440418"/>
+      </p:ext>
+    </p:extLst>
+  </p:cSld>
+  <p:clrMapOvr>
+    <a:masterClrMapping/>
+  </p:clrMapOvr>
+</p:notes>
+</file>
+
+<file path=ppt/notesSlides/notesSlide23.xml><?xml version="1.0" encoding="utf-8"?>
+<p:notes xmlns:a="http://schemas.openxmlformats.org/drawingml/2006/main" xmlns:r="http://schemas.openxmlformats.org/officeDocument/2006/relationships" xmlns:p="http://schemas.openxmlformats.org/presentationml/2006/main">
+  <p:cSld>
+    <p:spTree>
+      <p:nvGrpSpPr>
+        <p:cNvPr id="1" name=""/>
+        <p:cNvGrpSpPr/>
+        <p:nvPr/>
+      </p:nvGrpSpPr>
+      <p:grpSpPr>
+        <a:xfrm>
+          <a:off x="0" y="0"/>
+          <a:ext cx="0" cy="0"/>
+          <a:chOff x="0" y="0"/>
+          <a:chExt cx="0" cy="0"/>
+        </a:xfrm>
+      </p:grpSpPr>
+      <p:sp>
+        <p:nvSpPr>
+          <p:cNvPr id="2" name="Espaço Reservado para Imagem de Slide 1"/>
+          <p:cNvSpPr>
+            <a:spLocks noGrp="1" noRot="1" noChangeAspect="1"/>
+          </p:cNvSpPr>
+          <p:nvPr>
+            <p:ph type="sldImg"/>
+          </p:nvPr>
+        </p:nvSpPr>
+        <p:spPr/>
+      </p:sp>
+      <p:sp>
+        <p:nvSpPr>
+          <p:cNvPr id="3" name="Espaço Reservado para Anotações 2"/>
+          <p:cNvSpPr>
+            <a:spLocks noGrp="1"/>
+          </p:cNvSpPr>
+          <p:nvPr>
+            <p:ph type="body" idx="1"/>
+          </p:nvPr>
+        </p:nvSpPr>
+        <p:spPr/>
+        <p:txBody>
+          <a:bodyPr/>
+          <a:lstStyle/>
+          <a:p>
+            <a:r>
+              <a:rPr lang="pt-BR" dirty="0"/>
+              <a:t>Os procedimentos </a:t>
+            </a:r>
+            <a:r>
+              <a:rPr lang="pt-BR" dirty="0" err="1"/>
+              <a:t>aglomerativos</a:t>
+            </a:r>
+            <a:r>
+              <a:rPr lang="pt-BR" dirty="0"/>
+              <a:t> começam com n clusters </a:t>
+            </a:r>
+            <a:r>
+              <a:rPr lang="pt-BR" dirty="0" err="1"/>
+              <a:t>singleton</a:t>
+            </a:r>
+            <a:r>
+              <a:rPr lang="pt-BR" dirty="0"/>
+              <a:t> e, em seguida, formam uma sequência mesclando clusters sucessivamente</a:t>
+            </a:r>
+          </a:p>
+        </p:txBody>
+      </p:sp>
+      <p:sp>
+        <p:nvSpPr>
+          <p:cNvPr id="4" name="Espaço Reservado para Número de Slide 3"/>
+          <p:cNvSpPr>
+            <a:spLocks noGrp="1"/>
+          </p:cNvSpPr>
+          <p:nvPr>
+            <p:ph type="sldNum" sz="quarter" idx="5"/>
+          </p:nvPr>
+        </p:nvSpPr>
+        <p:spPr/>
+        <p:txBody>
+          <a:bodyPr/>
+          <a:lstStyle/>
+          <a:p>
+            <a:fld id="{5E0A5BA6-946D-4582-8BDA-25D6682E6A6A}" type="slidenum">
+              <a:rPr lang="pt-BR" smtClean="0"/>
+              <a:t>24</a:t>
+            </a:fld>
+            <a:endParaRPr lang="pt-BR"/>
+          </a:p>
+        </p:txBody>
+      </p:sp>
+    </p:spTree>
+    <p:extLst>
+      <p:ext uri="{BB962C8B-B14F-4D97-AF65-F5344CB8AC3E}">
+        <p14:creationId xmlns:p14="http://schemas.microsoft.com/office/powerpoint/2010/main" val="2806590157"/>
       </p:ext>
     </p:extLst>
   </p:cSld>
@@ -2463,7 +2983,7 @@
           <a:p>
             <a:fld id="{809AD006-F4CF-42C4-B1DE-5280DDD9EA79}" type="datetimeFigureOut">
               <a:rPr lang="pt-BR" smtClean="0"/>
-              <a:t>30/04/2024</a:t>
+              <a:t>01/05/2024</a:t>
             </a:fld>
             <a:endParaRPr lang="pt-BR"/>
           </a:p>
@@ -2661,7 +3181,7 @@
           <a:p>
             <a:fld id="{809AD006-F4CF-42C4-B1DE-5280DDD9EA79}" type="datetimeFigureOut">
               <a:rPr lang="pt-BR" smtClean="0"/>
-              <a:t>30/04/2024</a:t>
+              <a:t>01/05/2024</a:t>
             </a:fld>
             <a:endParaRPr lang="pt-BR"/>
           </a:p>
@@ -2869,7 +3389,7 @@
           <a:p>
             <a:fld id="{809AD006-F4CF-42C4-B1DE-5280DDD9EA79}" type="datetimeFigureOut">
               <a:rPr lang="pt-BR" smtClean="0"/>
-              <a:t>30/04/2024</a:t>
+              <a:t>01/05/2024</a:t>
             </a:fld>
             <a:endParaRPr lang="pt-BR"/>
           </a:p>
@@ -3067,7 +3587,7 @@
           <a:p>
             <a:fld id="{809AD006-F4CF-42C4-B1DE-5280DDD9EA79}" type="datetimeFigureOut">
               <a:rPr lang="pt-BR" smtClean="0"/>
-              <a:t>30/04/2024</a:t>
+              <a:t>01/05/2024</a:t>
             </a:fld>
             <a:endParaRPr lang="pt-BR"/>
           </a:p>
@@ -3342,7 +3862,7 @@
           <a:p>
             <a:fld id="{809AD006-F4CF-42C4-B1DE-5280DDD9EA79}" type="datetimeFigureOut">
               <a:rPr lang="pt-BR" smtClean="0"/>
-              <a:t>30/04/2024</a:t>
+              <a:t>01/05/2024</a:t>
             </a:fld>
             <a:endParaRPr lang="pt-BR"/>
           </a:p>
@@ -3607,7 +4127,7 @@
           <a:p>
             <a:fld id="{809AD006-F4CF-42C4-B1DE-5280DDD9EA79}" type="datetimeFigureOut">
               <a:rPr lang="pt-BR" smtClean="0"/>
-              <a:t>30/04/2024</a:t>
+              <a:t>01/05/2024</a:t>
             </a:fld>
             <a:endParaRPr lang="pt-BR"/>
           </a:p>
@@ -4019,7 +4539,7 @@
           <a:p>
             <a:fld id="{809AD006-F4CF-42C4-B1DE-5280DDD9EA79}" type="datetimeFigureOut">
               <a:rPr lang="pt-BR" smtClean="0"/>
-              <a:t>30/04/2024</a:t>
+              <a:t>01/05/2024</a:t>
             </a:fld>
             <a:endParaRPr lang="pt-BR"/>
           </a:p>
@@ -4160,7 +4680,7 @@
           <a:p>
             <a:fld id="{809AD006-F4CF-42C4-B1DE-5280DDD9EA79}" type="datetimeFigureOut">
               <a:rPr lang="pt-BR" smtClean="0"/>
-              <a:t>30/04/2024</a:t>
+              <a:t>01/05/2024</a:t>
             </a:fld>
             <a:endParaRPr lang="pt-BR"/>
           </a:p>
@@ -4273,7 +4793,7 @@
           <a:p>
             <a:fld id="{809AD006-F4CF-42C4-B1DE-5280DDD9EA79}" type="datetimeFigureOut">
               <a:rPr lang="pt-BR" smtClean="0"/>
-              <a:t>30/04/2024</a:t>
+              <a:t>01/05/2024</a:t>
             </a:fld>
             <a:endParaRPr lang="pt-BR"/>
           </a:p>
@@ -4584,7 +5104,7 @@
           <a:p>
             <a:fld id="{809AD006-F4CF-42C4-B1DE-5280DDD9EA79}" type="datetimeFigureOut">
               <a:rPr lang="pt-BR" smtClean="0"/>
-              <a:t>30/04/2024</a:t>
+              <a:t>01/05/2024</a:t>
             </a:fld>
             <a:endParaRPr lang="pt-BR"/>
           </a:p>
@@ -4872,7 +5392,7 @@
           <a:p>
             <a:fld id="{809AD006-F4CF-42C4-B1DE-5280DDD9EA79}" type="datetimeFigureOut">
               <a:rPr lang="pt-BR" smtClean="0"/>
-              <a:t>30/04/2024</a:t>
+              <a:t>01/05/2024</a:t>
             </a:fld>
             <a:endParaRPr lang="pt-BR"/>
           </a:p>
@@ -5113,7 +5633,7 @@
           <a:p>
             <a:fld id="{809AD006-F4CF-42C4-B1DE-5280DDD9EA79}" type="datetimeFigureOut">
               <a:rPr lang="pt-BR" smtClean="0"/>
-              <a:t>30/04/2024</a:t>
+              <a:t>01/05/2024</a:t>
             </a:fld>
             <a:endParaRPr lang="pt-BR"/>
           </a:p>
@@ -5789,8 +6309,8 @@
           </a:p>
         </p:txBody>
       </p:sp>
-      <mc:AlternateContent xmlns:mc="http://schemas.openxmlformats.org/markup-compatibility/2006">
-        <mc:Choice xmlns:a14="http://schemas.microsoft.com/office/drawing/2010/main" Requires="a14">
+      <mc:AlternateContent xmlns:mc="http://schemas.openxmlformats.org/markup-compatibility/2006" xmlns:a14="http://schemas.microsoft.com/office/drawing/2010/main">
+        <mc:Choice Requires="a14">
           <p:sp>
             <p:nvSpPr>
               <p:cNvPr id="3" name="Espaço Reservado para Conteúdo 2">
@@ -5892,7 +6412,7 @@
             </p:txBody>
           </p:sp>
         </mc:Choice>
-        <mc:Fallback>
+        <mc:Fallback xmlns="">
           <p:sp>
             <p:nvSpPr>
               <p:cNvPr id="3" name="Espaço Reservado para Conteúdo 2">
@@ -8333,8 +8853,8 @@
           </a:p>
         </p:txBody>
       </p:sp>
-      <mc:AlternateContent xmlns:mc="http://schemas.openxmlformats.org/markup-compatibility/2006">
-        <mc:Choice xmlns:a14="http://schemas.microsoft.com/office/drawing/2010/main" Requires="a14">
+      <mc:AlternateContent xmlns:mc="http://schemas.openxmlformats.org/markup-compatibility/2006" xmlns:a14="http://schemas.microsoft.com/office/drawing/2010/main">
+        <mc:Choice Requires="a14">
           <p:sp>
             <p:nvSpPr>
               <p:cNvPr id="3" name="Espaço Reservado para Conteúdo 2">
@@ -8697,7 +9217,7 @@
             </p:txBody>
           </p:sp>
         </mc:Choice>
-        <mc:Fallback>
+        <mc:Fallback xmlns="">
           <p:sp>
             <p:nvSpPr>
               <p:cNvPr id="3" name="Espaço Reservado para Conteúdo 2">
@@ -8902,52 +9422,409 @@
           </a:p>
         </p:txBody>
       </p:sp>
-      <p:sp>
-        <p:nvSpPr>
-          <p:cNvPr id="3" name="Espaço Reservado para Conteúdo 2">
-            <a:extLst>
-              <a:ext uri="{FF2B5EF4-FFF2-40B4-BE49-F238E27FC236}">
-                <a16:creationId xmlns:a16="http://schemas.microsoft.com/office/drawing/2014/main" id="{EC2E1DDA-B549-8F9D-BA64-18BAFB4D49A1}"/>
-              </a:ext>
-            </a:extLst>
-          </p:cNvPr>
-          <p:cNvSpPr>
-            <a:spLocks noGrp="1"/>
-          </p:cNvSpPr>
-          <p:nvPr>
-            <p:ph idx="1"/>
-          </p:nvPr>
-        </p:nvSpPr>
-        <p:spPr>
-          <a:xfrm>
-            <a:off x="838200" y="1812395"/>
-            <a:ext cx="9791701" cy="4351338"/>
-          </a:xfrm>
-        </p:spPr>
-        <p:txBody>
-          <a:bodyPr>
-            <a:normAutofit/>
-          </a:bodyPr>
-          <a:lstStyle/>
-          <a:p>
-            <a:r>
-              <a:rPr lang="pt-BR" dirty="0"/>
-              <a:t>Teorema 1:</a:t>
-            </a:r>
-          </a:p>
-          <a:p>
-            <a:pPr lvl="1" algn="just"/>
-            <a:endParaRPr lang="pt-BR" dirty="0"/>
-          </a:p>
-          <a:p>
-            <a:pPr lvl="1" algn="just"/>
-            <a:r>
-              <a:rPr lang="pt-BR" dirty="0"/>
-              <a:t>T</a:t>
-            </a:r>
-          </a:p>
-        </p:txBody>
-      </p:sp>
+      <mc:AlternateContent xmlns:mc="http://schemas.openxmlformats.org/markup-compatibility/2006">
+        <mc:Choice xmlns:a14="http://schemas.microsoft.com/office/drawing/2010/main" Requires="a14">
+          <p:sp>
+            <p:nvSpPr>
+              <p:cNvPr id="3" name="Espaço Reservado para Conteúdo 2">
+                <a:extLst>
+                  <a:ext uri="{FF2B5EF4-FFF2-40B4-BE49-F238E27FC236}">
+                    <a16:creationId xmlns:a16="http://schemas.microsoft.com/office/drawing/2014/main" id="{EC2E1DDA-B549-8F9D-BA64-18BAFB4D49A1}"/>
+                  </a:ext>
+                </a:extLst>
+              </p:cNvPr>
+              <p:cNvSpPr>
+                <a:spLocks noGrp="1"/>
+              </p:cNvSpPr>
+              <p:nvPr>
+                <p:ph idx="1"/>
+              </p:nvPr>
+            </p:nvSpPr>
+            <p:spPr>
+              <a:xfrm>
+                <a:off x="838201" y="1812395"/>
+                <a:ext cx="7151370" cy="4351338"/>
+              </a:xfrm>
+            </p:spPr>
+            <p:txBody>
+              <a:bodyPr>
+                <a:normAutofit/>
+              </a:bodyPr>
+              <a:lstStyle/>
+              <a:p>
+                <a:r>
+                  <a:rPr lang="pt-BR" dirty="0"/>
+                  <a:t>Teorema 1:</a:t>
+                </a:r>
+              </a:p>
+              <a:p>
+                <a:pPr lvl="1" algn="just"/>
+                <a:endParaRPr lang="pt-BR" dirty="0"/>
+              </a:p>
+              <a:p>
+                <a:pPr lvl="1" algn="just"/>
+                <a:r>
+                  <a:rPr lang="pt-BR" dirty="0"/>
+                  <a:t>Presumir T = (</a:t>
+                </a:r>
+                <a14:m>
+                  <m:oMath xmlns:m="http://schemas.openxmlformats.org/officeDocument/2006/math">
+                    <m:sSub>
+                      <m:sSubPr>
+                        <m:ctrlPr>
+                          <a:rPr lang="pt-BR" i="1" smtClean="0">
+                            <a:latin typeface="Cambria Math" panose="02040503050406030204" pitchFamily="18" charset="0"/>
+                          </a:rPr>
+                        </m:ctrlPr>
+                      </m:sSubPr>
+                      <m:e>
+                        <m:r>
+                          <a:rPr lang="pt-BR" b="0" i="1" smtClean="0">
+                            <a:latin typeface="Cambria Math" panose="02040503050406030204" pitchFamily="18" charset="0"/>
+                          </a:rPr>
+                          <m:t>𝑉</m:t>
+                        </m:r>
+                      </m:e>
+                      <m:sub>
+                        <m:r>
+                          <a:rPr lang="pt-BR" b="0" i="1" smtClean="0">
+                            <a:latin typeface="Cambria Math" panose="02040503050406030204" pitchFamily="18" charset="0"/>
+                          </a:rPr>
+                          <m:t>𝑇</m:t>
+                        </m:r>
+                      </m:sub>
+                    </m:sSub>
+                  </m:oMath>
+                </a14:m>
+                <a:r>
+                  <a:rPr lang="pt-BR" dirty="0"/>
+                  <a:t>, </a:t>
+                </a:r>
+                <a14:m>
+                  <m:oMath xmlns:m="http://schemas.openxmlformats.org/officeDocument/2006/math">
+                    <m:sSub>
+                      <m:sSubPr>
+                        <m:ctrlPr>
+                          <a:rPr lang="pt-BR" i="1">
+                            <a:latin typeface="Cambria Math" panose="02040503050406030204" pitchFamily="18" charset="0"/>
+                          </a:rPr>
+                        </m:ctrlPr>
+                      </m:sSubPr>
+                      <m:e>
+                        <m:r>
+                          <a:rPr lang="pt-BR" b="0" i="1" smtClean="0">
+                            <a:latin typeface="Cambria Math" panose="02040503050406030204" pitchFamily="18" charset="0"/>
+                          </a:rPr>
+                          <m:t>𝐸</m:t>
+                        </m:r>
+                      </m:e>
+                      <m:sub>
+                        <m:r>
+                          <a:rPr lang="pt-BR" i="1">
+                            <a:latin typeface="Cambria Math" panose="02040503050406030204" pitchFamily="18" charset="0"/>
+                          </a:rPr>
+                          <m:t>𝑇</m:t>
+                        </m:r>
+                      </m:sub>
+                    </m:sSub>
+                  </m:oMath>
+                </a14:m>
+                <a:r>
+                  <a:rPr lang="pt-BR" dirty="0"/>
+                  <a:t>) é a árvore geradora mínima do grafo G = (V, E). Para qualquer 1 ≤ </a:t>
+                </a:r>
+                <a:r>
+                  <a:rPr lang="pt-BR" b="1" dirty="0"/>
+                  <a:t>c</a:t>
+                </a:r>
+                <a:r>
+                  <a:rPr lang="pt-BR" dirty="0"/>
+                  <a:t> ≤ |</a:t>
+                </a:r>
+                <a:r>
+                  <a:rPr lang="pt-BR" i="1" dirty="0"/>
+                  <a:t>V</a:t>
+                </a:r>
+                <a:r>
+                  <a:rPr lang="pt-BR" dirty="0"/>
+                  <a:t>|, removemos as arestas cujos valores de peso são maiores que </a:t>
+                </a:r>
+                <a14:m>
+                  <m:oMath xmlns:m="http://schemas.openxmlformats.org/officeDocument/2006/math">
+                    <m:sSup>
+                      <m:sSupPr>
+                        <m:ctrlPr>
+                          <a:rPr lang="pt-BR" i="1">
+                            <a:latin typeface="Cambria Math" panose="02040503050406030204" pitchFamily="18" charset="0"/>
+                            <a:ea typeface="Cambria Math" panose="02040503050406030204" pitchFamily="18" charset="0"/>
+                          </a:rPr>
+                        </m:ctrlPr>
+                      </m:sSupPr>
+                      <m:e>
+                        <m:r>
+                          <a:rPr lang="pt-BR" i="1">
+                            <a:latin typeface="Cambria Math" panose="02040503050406030204" pitchFamily="18" charset="0"/>
+                            <a:ea typeface="Cambria Math" panose="02040503050406030204" pitchFamily="18" charset="0"/>
+                          </a:rPr>
+                          <m:t>𝑊</m:t>
+                        </m:r>
+                      </m:e>
+                      <m:sup>
+                        <m:r>
+                          <a:rPr lang="pt-BR" i="1">
+                            <a:latin typeface="Cambria Math" panose="02040503050406030204" pitchFamily="18" charset="0"/>
+                            <a:ea typeface="Cambria Math" panose="02040503050406030204" pitchFamily="18" charset="0"/>
+                          </a:rPr>
+                          <m:t>′</m:t>
+                        </m:r>
+                      </m:sup>
+                    </m:sSup>
+                    <m:d>
+                      <m:dPr>
+                        <m:ctrlPr>
+                          <a:rPr lang="pt-BR" i="1">
+                            <a:latin typeface="Cambria Math" panose="02040503050406030204" pitchFamily="18" charset="0"/>
+                            <a:ea typeface="Cambria Math" panose="02040503050406030204" pitchFamily="18" charset="0"/>
+                          </a:rPr>
+                        </m:ctrlPr>
+                      </m:dPr>
+                      <m:e>
+                        <m:r>
+                          <a:rPr lang="pt-BR" i="1">
+                            <a:latin typeface="Cambria Math" panose="02040503050406030204" pitchFamily="18" charset="0"/>
+                            <a:ea typeface="Cambria Math" panose="02040503050406030204" pitchFamily="18" charset="0"/>
+                          </a:rPr>
+                          <m:t>𝑐</m:t>
+                        </m:r>
+                      </m:e>
+                    </m:d>
+                    <m:r>
+                      <a:rPr lang="pt-BR" i="1">
+                        <a:latin typeface="Cambria Math" panose="02040503050406030204" pitchFamily="18" charset="0"/>
+                        <a:ea typeface="Cambria Math" panose="02040503050406030204" pitchFamily="18" charset="0"/>
+                      </a:rPr>
+                      <m:t> </m:t>
+                    </m:r>
+                  </m:oMath>
+                </a14:m>
+                <a:r>
+                  <a:rPr lang="pt-BR" dirty="0"/>
+                  <a:t>de T e produz </a:t>
+                </a:r>
+                <a:r>
+                  <a:rPr lang="pt-BR" b="1" dirty="0"/>
+                  <a:t>c</a:t>
+                </a:r>
+                <a:r>
+                  <a:rPr lang="pt-BR" dirty="0"/>
+                  <a:t> ramificações conectadas, que são marcadas como </a:t>
+                </a:r>
+                <a14:m>
+                  <m:oMath xmlns:m="http://schemas.openxmlformats.org/officeDocument/2006/math">
+                    <m:sSub>
+                      <m:sSubPr>
+                        <m:ctrlPr>
+                          <a:rPr lang="pt-BR" i="1">
+                            <a:latin typeface="Cambria Math" panose="02040503050406030204" pitchFamily="18" charset="0"/>
+                          </a:rPr>
+                        </m:ctrlPr>
+                      </m:sSubPr>
+                      <m:e>
+                        <m:r>
+                          <a:rPr lang="pt-BR" b="0" i="1" smtClean="0">
+                            <a:latin typeface="Cambria Math" panose="02040503050406030204" pitchFamily="18" charset="0"/>
+                          </a:rPr>
+                          <m:t>𝑇</m:t>
+                        </m:r>
+                      </m:e>
+                      <m:sub>
+                        <m:r>
+                          <a:rPr lang="pt-BR" b="0" i="1" smtClean="0">
+                            <a:latin typeface="Cambria Math" panose="02040503050406030204" pitchFamily="18" charset="0"/>
+                          </a:rPr>
+                          <m:t>𝐾</m:t>
+                        </m:r>
+                      </m:sub>
+                    </m:sSub>
+                  </m:oMath>
+                </a14:m>
+                <a:r>
+                  <a:rPr lang="pt-BR" dirty="0"/>
+                  <a:t> = (</a:t>
+                </a:r>
+                <a14:m>
+                  <m:oMath xmlns:m="http://schemas.openxmlformats.org/officeDocument/2006/math">
+                    <m:sSub>
+                      <m:sSubPr>
+                        <m:ctrlPr>
+                          <a:rPr lang="pt-BR" i="1">
+                            <a:latin typeface="Cambria Math" panose="02040503050406030204" pitchFamily="18" charset="0"/>
+                          </a:rPr>
+                        </m:ctrlPr>
+                      </m:sSubPr>
+                      <m:e>
+                        <m:r>
+                          <a:rPr lang="pt-BR" b="0" i="1" smtClean="0">
+                            <a:latin typeface="Cambria Math" panose="02040503050406030204" pitchFamily="18" charset="0"/>
+                          </a:rPr>
+                          <m:t>𝑉</m:t>
+                        </m:r>
+                      </m:e>
+                      <m:sub>
+                        <m:r>
+                          <a:rPr lang="pt-BR" b="0" i="1" smtClean="0">
+                            <a:latin typeface="Cambria Math" panose="02040503050406030204" pitchFamily="18" charset="0"/>
+                          </a:rPr>
+                          <m:t>𝐾</m:t>
+                        </m:r>
+                      </m:sub>
+                    </m:sSub>
+                  </m:oMath>
+                </a14:m>
+                <a:r>
+                  <a:rPr lang="pt-BR" dirty="0"/>
+                  <a:t>, </a:t>
+                </a:r>
+                <a14:m>
+                  <m:oMath xmlns:m="http://schemas.openxmlformats.org/officeDocument/2006/math">
+                    <m:sSub>
+                      <m:sSubPr>
+                        <m:ctrlPr>
+                          <a:rPr lang="pt-BR" i="1">
+                            <a:latin typeface="Cambria Math" panose="02040503050406030204" pitchFamily="18" charset="0"/>
+                          </a:rPr>
+                        </m:ctrlPr>
+                      </m:sSubPr>
+                      <m:e>
+                        <m:r>
+                          <a:rPr lang="pt-BR" i="1">
+                            <a:latin typeface="Cambria Math" panose="02040503050406030204" pitchFamily="18" charset="0"/>
+                          </a:rPr>
+                          <m:t>𝐸</m:t>
+                        </m:r>
+                      </m:e>
+                      <m:sub>
+                        <m:r>
+                          <a:rPr lang="pt-BR" b="0" i="1" smtClean="0">
+                            <a:latin typeface="Cambria Math" panose="02040503050406030204" pitchFamily="18" charset="0"/>
+                          </a:rPr>
+                          <m:t>𝐾</m:t>
+                        </m:r>
+                      </m:sub>
+                    </m:sSub>
+                  </m:oMath>
+                </a14:m>
+                <a:r>
+                  <a:rPr lang="pt-BR" dirty="0"/>
+                  <a:t>) (k = 1,2, ... ,c). O ramo resultante </a:t>
+                </a:r>
+                <a14:m>
+                  <m:oMath xmlns:m="http://schemas.openxmlformats.org/officeDocument/2006/math">
+                    <m:sSub>
+                      <m:sSubPr>
+                        <m:ctrlPr>
+                          <a:rPr lang="pt-BR" i="1">
+                            <a:latin typeface="Cambria Math" panose="02040503050406030204" pitchFamily="18" charset="0"/>
+                          </a:rPr>
+                        </m:ctrlPr>
+                      </m:sSubPr>
+                      <m:e>
+                        <m:r>
+                          <a:rPr lang="pt-BR" i="1">
+                            <a:latin typeface="Cambria Math" panose="02040503050406030204" pitchFamily="18" charset="0"/>
+                          </a:rPr>
+                          <m:t>𝑇</m:t>
+                        </m:r>
+                      </m:e>
+                      <m:sub>
+                        <m:r>
+                          <a:rPr lang="pt-BR" i="1">
+                            <a:latin typeface="Cambria Math" panose="02040503050406030204" pitchFamily="18" charset="0"/>
+                          </a:rPr>
+                          <m:t>𝐾</m:t>
+                        </m:r>
+                      </m:sub>
+                    </m:sSub>
+                  </m:oMath>
+                </a14:m>
+                <a:r>
+                  <a:rPr lang="pt-BR" dirty="0"/>
+                  <a:t> é o </a:t>
+                </a:r>
+                <a:r>
+                  <a:rPr lang="en-US" b="1" i="1" dirty="0">
+                    <a:solidFill>
+                      <a:srgbClr val="FF0000"/>
+                    </a:solidFill>
+                  </a:rPr>
+                  <a:t>c-near neighbor minimum spanning tree </a:t>
+                </a:r>
+                <a:r>
+                  <a:rPr lang="en-US" dirty="0"/>
+                  <a:t>do </a:t>
+                </a:r>
+                <a:r>
+                  <a:rPr lang="en-US" dirty="0" err="1"/>
+                  <a:t>grafo</a:t>
+                </a:r>
+                <a:r>
+                  <a:rPr lang="en-US" dirty="0"/>
+                  <a:t> G</a:t>
+                </a:r>
+              </a:p>
+              <a:p>
+                <a:pPr marL="457200" lvl="1" indent="0" algn="just">
+                  <a:buNone/>
+                </a:pPr>
+                <a:endParaRPr lang="en-US" dirty="0"/>
+              </a:p>
+            </p:txBody>
+          </p:sp>
+        </mc:Choice>
+        <mc:Fallback>
+          <p:sp>
+            <p:nvSpPr>
+              <p:cNvPr id="3" name="Espaço Reservado para Conteúdo 2">
+                <a:extLst>
+                  <a:ext uri="{FF2B5EF4-FFF2-40B4-BE49-F238E27FC236}">
+                    <a16:creationId xmlns:a16="http://schemas.microsoft.com/office/drawing/2014/main" id="{EC2E1DDA-B549-8F9D-BA64-18BAFB4D49A1}"/>
+                  </a:ext>
+                </a:extLst>
+              </p:cNvPr>
+              <p:cNvSpPr>
+                <a:spLocks noGrp="1" noRot="1" noChangeAspect="1" noMove="1" noResize="1" noEditPoints="1" noAdjustHandles="1" noChangeArrowheads="1" noChangeShapeType="1" noTextEdit="1"/>
+              </p:cNvSpPr>
+              <p:nvPr>
+                <p:ph idx="1"/>
+              </p:nvPr>
+            </p:nvSpPr>
+            <p:spPr>
+              <a:xfrm>
+                <a:off x="838201" y="1812395"/>
+                <a:ext cx="7151370" cy="4351338"/>
+              </a:xfrm>
+              <a:blipFill>
+                <a:blip r:embed="rId3"/>
+                <a:stretch>
+                  <a:fillRect l="-1535" t="-2241" r="-1279"/>
+                </a:stretch>
+              </a:blipFill>
+            </p:spPr>
+            <p:txBody>
+              <a:bodyPr/>
+              <a:lstStyle/>
+              <a:p>
+                <a:r>
+                  <a:rPr lang="pt-BR">
+                    <a:noFill/>
+                  </a:rPr>
+                  <a:t> </a:t>
+                </a:r>
+              </a:p>
+            </p:txBody>
+          </p:sp>
+        </mc:Fallback>
+      </mc:AlternateContent>
       <p:pic>
         <p:nvPicPr>
           <p:cNvPr id="4" name="Picture 2" descr="Local do Evento | SBRC 2021 - Simpósio Brasileiro de Redes ...">
@@ -8963,7 +9840,7 @@
           <p:nvPr/>
         </p:nvPicPr>
         <p:blipFill>
-          <a:blip r:embed="rId3">
+          <a:blip r:embed="rId4">
             <a:extLst>
               <a:ext uri="{28A0092B-C50C-407E-A947-70E740481C1C}">
                 <a14:useLocalDpi xmlns:a14="http://schemas.microsoft.com/office/drawing/2010/main" val="0"/>
@@ -9010,7 +9887,7 @@
           <p:nvPr/>
         </p:nvPicPr>
         <p:blipFill rotWithShape="1">
-          <a:blip r:embed="rId4">
+          <a:blip r:embed="rId5">
             <a:extLst>
               <a:ext uri="{28A0092B-C50C-407E-A947-70E740481C1C}">
                 <a14:useLocalDpi xmlns:a14="http://schemas.microsoft.com/office/drawing/2010/main" val="0"/>
@@ -9038,6 +9915,36 @@
               </a14:hiddenFill>
             </a:ext>
           </a:extLst>
+        </p:spPr>
+      </p:pic>
+      <p:pic>
+        <p:nvPicPr>
+          <p:cNvPr id="7" name="Imagem 6">
+            <a:extLst>
+              <a:ext uri="{FF2B5EF4-FFF2-40B4-BE49-F238E27FC236}">
+                <a16:creationId xmlns:a16="http://schemas.microsoft.com/office/drawing/2014/main" id="{A3861257-5CA7-BC82-D9E6-40A2E32F8E63}"/>
+              </a:ext>
+            </a:extLst>
+          </p:cNvPr>
+          <p:cNvPicPr>
+            <a:picLocks noChangeAspect="1"/>
+          </p:cNvPicPr>
+          <p:nvPr/>
+        </p:nvPicPr>
+        <p:blipFill>
+          <a:blip r:embed="rId6"/>
+          <a:stretch>
+            <a:fillRect/>
+          </a:stretch>
+        </p:blipFill>
+        <p:spPr>
+          <a:xfrm>
+            <a:off x="8180277" y="1931458"/>
+            <a:ext cx="3751747" cy="4113212"/>
+          </a:xfrm>
+          <a:prstGeom prst="rect">
+            <a:avLst/>
+          </a:prstGeom>
         </p:spPr>
       </p:pic>
     </p:spTree>
@@ -9281,6 +10188,1873 @@
     <p:extLst>
       <p:ext uri="{BB962C8B-B14F-4D97-AF65-F5344CB8AC3E}">
         <p14:creationId xmlns:p14="http://schemas.microsoft.com/office/powerpoint/2010/main" val="106509685"/>
+      </p:ext>
+    </p:extLst>
+  </p:cSld>
+  <p:clrMapOvr>
+    <a:masterClrMapping/>
+  </p:clrMapOvr>
+</p:sld>
+</file>
+
+<file path=ppt/slides/slide20.xml><?xml version="1.0" encoding="utf-8"?>
+<p:sld xmlns:a="http://schemas.openxmlformats.org/drawingml/2006/main" xmlns:r="http://schemas.openxmlformats.org/officeDocument/2006/relationships" xmlns:p="http://schemas.openxmlformats.org/presentationml/2006/main">
+  <p:cSld>
+    <p:spTree>
+      <p:nvGrpSpPr>
+        <p:cNvPr id="1" name=""/>
+        <p:cNvGrpSpPr/>
+        <p:nvPr/>
+      </p:nvGrpSpPr>
+      <p:grpSpPr>
+        <a:xfrm>
+          <a:off x="0" y="0"/>
+          <a:ext cx="0" cy="0"/>
+          <a:chOff x="0" y="0"/>
+          <a:chExt cx="0" cy="0"/>
+        </a:xfrm>
+      </p:grpSpPr>
+      <p:sp>
+        <p:nvSpPr>
+          <p:cNvPr id="2" name="Título 1">
+            <a:extLst>
+              <a:ext uri="{FF2B5EF4-FFF2-40B4-BE49-F238E27FC236}">
+                <a16:creationId xmlns:a16="http://schemas.microsoft.com/office/drawing/2014/main" id="{4549A9CF-9A04-0D0B-3F38-47569BAC879F}"/>
+              </a:ext>
+            </a:extLst>
+          </p:cNvPr>
+          <p:cNvSpPr>
+            <a:spLocks noGrp="1"/>
+          </p:cNvSpPr>
+          <p:nvPr>
+            <p:ph type="title"/>
+          </p:nvPr>
+        </p:nvSpPr>
+        <p:spPr/>
+        <p:txBody>
+          <a:bodyPr/>
+          <a:lstStyle/>
+          <a:p>
+            <a:r>
+              <a:rPr lang="pt-BR" dirty="0"/>
+              <a:t>Índice de proporção </a:t>
+            </a:r>
+            <a:br>
+              <a:rPr lang="pt-BR" dirty="0"/>
+            </a:br>
+            <a:r>
+              <a:rPr lang="pt-BR" dirty="0" err="1"/>
+              <a:t>compacta-separada</a:t>
+            </a:r>
+            <a:r>
+              <a:rPr lang="pt-BR" dirty="0"/>
+              <a:t> (CSP)</a:t>
+            </a:r>
+          </a:p>
+        </p:txBody>
+      </p:sp>
+      <mc:AlternateContent xmlns:mc="http://schemas.openxmlformats.org/markup-compatibility/2006">
+        <mc:Choice xmlns:a14="http://schemas.microsoft.com/office/drawing/2010/main" Requires="a14">
+          <p:sp>
+            <p:nvSpPr>
+              <p:cNvPr id="3" name="Espaço Reservado para Conteúdo 2">
+                <a:extLst>
+                  <a:ext uri="{FF2B5EF4-FFF2-40B4-BE49-F238E27FC236}">
+                    <a16:creationId xmlns:a16="http://schemas.microsoft.com/office/drawing/2014/main" id="{EC2E1DDA-B549-8F9D-BA64-18BAFB4D49A1}"/>
+                  </a:ext>
+                </a:extLst>
+              </p:cNvPr>
+              <p:cNvSpPr>
+                <a:spLocks noGrp="1"/>
+              </p:cNvSpPr>
+              <p:nvPr>
+                <p:ph idx="1"/>
+              </p:nvPr>
+            </p:nvSpPr>
+            <p:spPr>
+              <a:xfrm>
+                <a:off x="838201" y="1812395"/>
+                <a:ext cx="6888479" cy="4351338"/>
+              </a:xfrm>
+            </p:spPr>
+            <p:txBody>
+              <a:bodyPr>
+                <a:normAutofit/>
+              </a:bodyPr>
+              <a:lstStyle/>
+              <a:p>
+                <a:r>
+                  <a:rPr lang="pt-BR" dirty="0"/>
+                  <a:t>Teorema 2:</a:t>
+                </a:r>
+              </a:p>
+              <a:p>
+                <a:pPr lvl="1" algn="just"/>
+                <a:endParaRPr lang="pt-BR" dirty="0"/>
+              </a:p>
+              <a:p>
+                <a:pPr lvl="1" algn="just"/>
+                <a:r>
+                  <a:rPr lang="pt-BR" dirty="0"/>
+                  <a:t>Sendo </a:t>
+                </a:r>
+                <a:r>
+                  <a:rPr lang="pt-BR" b="1" i="1" dirty="0" err="1"/>
+                  <a:t>Hk</a:t>
+                </a:r>
+                <a:r>
+                  <a:rPr lang="pt-BR" dirty="0"/>
+                  <a:t> é uma camada do dendrograma produzido pelo algoritmo AHC, contendo </a:t>
+                </a:r>
+                <a:r>
+                  <a:rPr lang="pt-BR" b="1" i="1" dirty="0"/>
+                  <a:t>c</a:t>
+                </a:r>
+                <a:r>
+                  <a:rPr lang="pt-BR" dirty="0"/>
+                  <a:t> clusters {G1, G2,..., </a:t>
+                </a:r>
+                <a:r>
+                  <a:rPr lang="pt-BR" dirty="0" err="1"/>
+                  <a:t>Gc</a:t>
+                </a:r>
+                <a:r>
+                  <a:rPr lang="pt-BR" dirty="0"/>
+                  <a:t>} cada um com </a:t>
+                </a:r>
+                <a:r>
+                  <a:rPr lang="pt-BR" b="1" i="1" dirty="0"/>
+                  <a:t>i</a:t>
+                </a:r>
+                <a:r>
+                  <a:rPr lang="pt-BR" dirty="0"/>
+                  <a:t> amostras → </a:t>
+                </a:r>
+                <a:r>
+                  <a:rPr lang="pt-BR" b="1" i="1" dirty="0"/>
+                  <a:t>i</a:t>
+                </a:r>
+                <a:r>
+                  <a:rPr lang="pt-BR" dirty="0"/>
+                  <a:t> = 1,2,...,c, </a:t>
+                </a:r>
+              </a:p>
+              <a:p>
+                <a:pPr marL="457200" lvl="1" indent="0" algn="just">
+                  <a:buNone/>
+                </a:pPr>
+                <a:endParaRPr lang="pt-BR" dirty="0"/>
+              </a:p>
+              <a:p>
+                <a:pPr lvl="1" algn="just"/>
+                <a:r>
+                  <a:rPr lang="pt-BR" dirty="0"/>
+                  <a:t>A separabilidade </a:t>
+                </a:r>
+                <a:r>
+                  <a:rPr lang="pt-BR" dirty="0" err="1"/>
+                  <a:t>interclusters</a:t>
+                </a:r>
+                <a:r>
+                  <a:rPr lang="pt-BR" dirty="0"/>
+                  <a:t> do cluster i é maior ou igual à compactação </a:t>
+                </a:r>
+                <a:r>
+                  <a:rPr lang="pt-BR" dirty="0" err="1"/>
+                  <a:t>intracluster</a:t>
+                </a:r>
+                <a:r>
+                  <a:rPr lang="pt-BR" dirty="0"/>
+                  <a:t>, ou seja, </a:t>
+                </a:r>
+                <a14:m>
+                  <m:oMath xmlns:m="http://schemas.openxmlformats.org/officeDocument/2006/math">
+                    <m:r>
+                      <m:rPr>
+                        <m:sty m:val="p"/>
+                      </m:rPr>
+                      <a:rPr lang="pt-BR" b="0" i="0" smtClean="0">
+                        <a:latin typeface="Cambria Math" panose="02040503050406030204" pitchFamily="18" charset="0"/>
+                      </a:rPr>
+                      <m:t>s</m:t>
+                    </m:r>
+                    <m:r>
+                      <a:rPr lang="pt-BR" b="0" i="1" smtClean="0">
+                        <a:latin typeface="Cambria Math" panose="02040503050406030204" pitchFamily="18" charset="0"/>
+                      </a:rPr>
+                      <m:t>𝑑</m:t>
+                    </m:r>
+                    <m:d>
+                      <m:dPr>
+                        <m:ctrlPr>
+                          <a:rPr lang="pt-BR" b="0" i="1" smtClean="0">
+                            <a:latin typeface="Cambria Math" panose="02040503050406030204" pitchFamily="18" charset="0"/>
+                          </a:rPr>
+                        </m:ctrlPr>
+                      </m:dPr>
+                      <m:e>
+                        <m:r>
+                          <a:rPr lang="pt-BR" b="0" i="1" smtClean="0">
+                            <a:latin typeface="Cambria Math" panose="02040503050406030204" pitchFamily="18" charset="0"/>
+                          </a:rPr>
+                          <m:t>𝑖</m:t>
+                        </m:r>
+                      </m:e>
+                    </m:d>
+                    <m:r>
+                      <a:rPr lang="pt-BR" b="0" i="1" smtClean="0">
+                        <a:latin typeface="Cambria Math" panose="02040503050406030204" pitchFamily="18" charset="0"/>
+                      </a:rPr>
+                      <m:t> </m:t>
+                    </m:r>
+                  </m:oMath>
+                </a14:m>
+                <a:r>
+                  <a:rPr lang="pt-BR" dirty="0"/>
+                  <a:t>≥ </a:t>
+                </a:r>
+                <a14:m>
+                  <m:oMath xmlns:m="http://schemas.openxmlformats.org/officeDocument/2006/math">
+                    <m:r>
+                      <m:rPr>
+                        <m:sty m:val="p"/>
+                      </m:rPr>
+                      <a:rPr lang="pt-BR" b="0" i="0" smtClean="0">
+                        <a:latin typeface="Cambria Math" panose="02040503050406030204" pitchFamily="18" charset="0"/>
+                      </a:rPr>
+                      <m:t>cd</m:t>
+                    </m:r>
+                    <m:d>
+                      <m:dPr>
+                        <m:ctrlPr>
+                          <a:rPr lang="pt-BR" i="1">
+                            <a:latin typeface="Cambria Math" panose="02040503050406030204" pitchFamily="18" charset="0"/>
+                          </a:rPr>
+                        </m:ctrlPr>
+                      </m:dPr>
+                      <m:e>
+                        <m:r>
+                          <a:rPr lang="pt-BR" b="0" i="1" smtClean="0">
+                            <a:latin typeface="Cambria Math" panose="02040503050406030204" pitchFamily="18" charset="0"/>
+                          </a:rPr>
+                          <m:t>𝑖</m:t>
+                        </m:r>
+                      </m:e>
+                    </m:d>
+                  </m:oMath>
+                </a14:m>
+                <a:endParaRPr lang="en-US" dirty="0"/>
+              </a:p>
+            </p:txBody>
+          </p:sp>
+        </mc:Choice>
+        <mc:Fallback>
+          <p:sp>
+            <p:nvSpPr>
+              <p:cNvPr id="3" name="Espaço Reservado para Conteúdo 2">
+                <a:extLst>
+                  <a:ext uri="{FF2B5EF4-FFF2-40B4-BE49-F238E27FC236}">
+                    <a16:creationId xmlns:a16="http://schemas.microsoft.com/office/drawing/2014/main" id="{EC2E1DDA-B549-8F9D-BA64-18BAFB4D49A1}"/>
+                  </a:ext>
+                </a:extLst>
+              </p:cNvPr>
+              <p:cNvSpPr>
+                <a:spLocks noGrp="1" noRot="1" noChangeAspect="1" noMove="1" noResize="1" noEditPoints="1" noAdjustHandles="1" noChangeArrowheads="1" noChangeShapeType="1" noTextEdit="1"/>
+              </p:cNvSpPr>
+              <p:nvPr>
+                <p:ph idx="1"/>
+              </p:nvPr>
+            </p:nvSpPr>
+            <p:spPr>
+              <a:xfrm>
+                <a:off x="838201" y="1812395"/>
+                <a:ext cx="6888479" cy="4351338"/>
+              </a:xfrm>
+              <a:blipFill>
+                <a:blip r:embed="rId3"/>
+                <a:stretch>
+                  <a:fillRect l="-1593" t="-2241" r="-1327"/>
+                </a:stretch>
+              </a:blipFill>
+            </p:spPr>
+            <p:txBody>
+              <a:bodyPr/>
+              <a:lstStyle/>
+              <a:p>
+                <a:r>
+                  <a:rPr lang="pt-BR">
+                    <a:noFill/>
+                  </a:rPr>
+                  <a:t> </a:t>
+                </a:r>
+              </a:p>
+            </p:txBody>
+          </p:sp>
+        </mc:Fallback>
+      </mc:AlternateContent>
+      <p:pic>
+        <p:nvPicPr>
+          <p:cNvPr id="4" name="Picture 2" descr="Local do Evento | SBRC 2021 - Simpósio Brasileiro de Redes ...">
+            <a:extLst>
+              <a:ext uri="{FF2B5EF4-FFF2-40B4-BE49-F238E27FC236}">
+                <a16:creationId xmlns:a16="http://schemas.microsoft.com/office/drawing/2014/main" id="{C4BAF076-983A-267F-65B0-779489FA3886}"/>
+              </a:ext>
+            </a:extLst>
+          </p:cNvPr>
+          <p:cNvPicPr>
+            <a:picLocks noChangeAspect="1" noChangeArrowheads="1"/>
+          </p:cNvPicPr>
+          <p:nvPr/>
+        </p:nvPicPr>
+        <p:blipFill>
+          <a:blip r:embed="rId4">
+            <a:extLst>
+              <a:ext uri="{28A0092B-C50C-407E-A947-70E740481C1C}">
+                <a14:useLocalDpi xmlns:a14="http://schemas.microsoft.com/office/drawing/2010/main" val="0"/>
+              </a:ext>
+            </a:extLst>
+          </a:blip>
+          <a:srcRect/>
+          <a:stretch>
+            <a:fillRect/>
+          </a:stretch>
+        </p:blipFill>
+        <p:spPr bwMode="auto">
+          <a:xfrm>
+            <a:off x="8783783" y="0"/>
+            <a:ext cx="3408217" cy="1388533"/>
+          </a:xfrm>
+          <a:prstGeom prst="rect">
+            <a:avLst/>
+          </a:prstGeom>
+          <a:noFill/>
+          <a:extLst>
+            <a:ext uri="{909E8E84-426E-40DD-AFC4-6F175D3DCCD1}">
+              <a14:hiddenFill xmlns:a14="http://schemas.microsoft.com/office/drawing/2010/main">
+                <a:solidFill>
+                  <a:srgbClr val="FFFFFF"/>
+                </a:solidFill>
+              </a14:hiddenFill>
+            </a:ext>
+          </a:extLst>
+        </p:spPr>
+      </p:pic>
+      <p:pic>
+        <p:nvPicPr>
+          <p:cNvPr id="5" name="Picture 4" descr="Edições Anteriores | SBRC 2021 - Simpósio Brasileiro de Redes de  Computadores e Sistemas Distribuídos">
+            <a:extLst>
+              <a:ext uri="{FF2B5EF4-FFF2-40B4-BE49-F238E27FC236}">
+                <a16:creationId xmlns:a16="http://schemas.microsoft.com/office/drawing/2014/main" id="{EE629CB4-DE61-E1C8-0777-7BFAD2ACB3C1}"/>
+              </a:ext>
+            </a:extLst>
+          </p:cNvPr>
+          <p:cNvPicPr>
+            <a:picLocks noChangeAspect="1" noChangeArrowheads="1"/>
+          </p:cNvPicPr>
+          <p:nvPr/>
+        </p:nvPicPr>
+        <p:blipFill rotWithShape="1">
+          <a:blip r:embed="rId5">
+            <a:extLst>
+              <a:ext uri="{28A0092B-C50C-407E-A947-70E740481C1C}">
+                <a14:useLocalDpi xmlns:a14="http://schemas.microsoft.com/office/drawing/2010/main" val="0"/>
+              </a:ext>
+            </a:extLst>
+          </a:blip>
+          <a:srcRect l="18938" t="24085"/>
+          <a:stretch/>
+        </p:blipFill>
+        <p:spPr bwMode="auto">
+          <a:xfrm>
+            <a:off x="259976" y="5803900"/>
+            <a:ext cx="2762759" cy="1054100"/>
+          </a:xfrm>
+          <a:prstGeom prst="rect">
+            <a:avLst/>
+          </a:prstGeom>
+          <a:noFill/>
+          <a:extLst>
+            <a:ext uri="{909E8E84-426E-40DD-AFC4-6F175D3DCCD1}">
+              <a14:hiddenFill xmlns:a14="http://schemas.microsoft.com/office/drawing/2010/main">
+                <a:solidFill>
+                  <a:srgbClr val="FFFFFF"/>
+                </a:solidFill>
+              </a14:hiddenFill>
+            </a:ext>
+          </a:extLst>
+        </p:spPr>
+      </p:pic>
+      <p:pic>
+        <p:nvPicPr>
+          <p:cNvPr id="7" name="Imagem 6">
+            <a:extLst>
+              <a:ext uri="{FF2B5EF4-FFF2-40B4-BE49-F238E27FC236}">
+                <a16:creationId xmlns:a16="http://schemas.microsoft.com/office/drawing/2014/main" id="{A3861257-5CA7-BC82-D9E6-40A2E32F8E63}"/>
+              </a:ext>
+            </a:extLst>
+          </p:cNvPr>
+          <p:cNvPicPr>
+            <a:picLocks noChangeAspect="1"/>
+          </p:cNvPicPr>
+          <p:nvPr/>
+        </p:nvPicPr>
+        <p:blipFill>
+          <a:blip r:embed="rId6"/>
+          <a:stretch>
+            <a:fillRect/>
+          </a:stretch>
+        </p:blipFill>
+        <p:spPr>
+          <a:xfrm>
+            <a:off x="8180277" y="1931458"/>
+            <a:ext cx="3751747" cy="4113212"/>
+          </a:xfrm>
+          <a:prstGeom prst="rect">
+            <a:avLst/>
+          </a:prstGeom>
+        </p:spPr>
+      </p:pic>
+    </p:spTree>
+    <p:extLst>
+      <p:ext uri="{BB962C8B-B14F-4D97-AF65-F5344CB8AC3E}">
+        <p14:creationId xmlns:p14="http://schemas.microsoft.com/office/powerpoint/2010/main" val="855756052"/>
+      </p:ext>
+    </p:extLst>
+  </p:cSld>
+  <p:clrMapOvr>
+    <a:masterClrMapping/>
+  </p:clrMapOvr>
+</p:sld>
+</file>
+
+<file path=ppt/slides/slide21.xml><?xml version="1.0" encoding="utf-8"?>
+<p:sld xmlns:a="http://schemas.openxmlformats.org/drawingml/2006/main" xmlns:r="http://schemas.openxmlformats.org/officeDocument/2006/relationships" xmlns:p="http://schemas.openxmlformats.org/presentationml/2006/main">
+  <p:cSld>
+    <p:spTree>
+      <p:nvGrpSpPr>
+        <p:cNvPr id="1" name=""/>
+        <p:cNvGrpSpPr/>
+        <p:nvPr/>
+      </p:nvGrpSpPr>
+      <p:grpSpPr>
+        <a:xfrm>
+          <a:off x="0" y="0"/>
+          <a:ext cx="0" cy="0"/>
+          <a:chOff x="0" y="0"/>
+          <a:chExt cx="0" cy="0"/>
+        </a:xfrm>
+      </p:grpSpPr>
+      <p:sp>
+        <p:nvSpPr>
+          <p:cNvPr id="2" name="Título 1">
+            <a:extLst>
+              <a:ext uri="{FF2B5EF4-FFF2-40B4-BE49-F238E27FC236}">
+                <a16:creationId xmlns:a16="http://schemas.microsoft.com/office/drawing/2014/main" id="{4549A9CF-9A04-0D0B-3F38-47569BAC879F}"/>
+              </a:ext>
+            </a:extLst>
+          </p:cNvPr>
+          <p:cNvSpPr>
+            <a:spLocks noGrp="1"/>
+          </p:cNvSpPr>
+          <p:nvPr>
+            <p:ph type="title"/>
+          </p:nvPr>
+        </p:nvSpPr>
+        <p:spPr/>
+        <p:txBody>
+          <a:bodyPr/>
+          <a:lstStyle/>
+          <a:p>
+            <a:r>
+              <a:rPr lang="pt-BR" dirty="0"/>
+              <a:t>Índice de proporção </a:t>
+            </a:r>
+            <a:br>
+              <a:rPr lang="pt-BR" dirty="0"/>
+            </a:br>
+            <a:r>
+              <a:rPr lang="pt-BR" dirty="0" err="1"/>
+              <a:t>compacta-separada</a:t>
+            </a:r>
+            <a:r>
+              <a:rPr lang="pt-BR" dirty="0"/>
+              <a:t> (CSP)</a:t>
+            </a:r>
+          </a:p>
+        </p:txBody>
+      </p:sp>
+      <mc:AlternateContent xmlns:mc="http://schemas.openxmlformats.org/markup-compatibility/2006">
+        <mc:Choice xmlns:a14="http://schemas.microsoft.com/office/drawing/2010/main" Requires="a14">
+          <p:sp>
+            <p:nvSpPr>
+              <p:cNvPr id="3" name="Espaço Reservado para Conteúdo 2">
+                <a:extLst>
+                  <a:ext uri="{FF2B5EF4-FFF2-40B4-BE49-F238E27FC236}">
+                    <a16:creationId xmlns:a16="http://schemas.microsoft.com/office/drawing/2014/main" id="{EC2E1DDA-B549-8F9D-BA64-18BAFB4D49A1}"/>
+                  </a:ext>
+                </a:extLst>
+              </p:cNvPr>
+              <p:cNvSpPr>
+                <a:spLocks noGrp="1"/>
+              </p:cNvSpPr>
+              <p:nvPr>
+                <p:ph idx="1"/>
+              </p:nvPr>
+            </p:nvSpPr>
+            <p:spPr>
+              <a:xfrm>
+                <a:off x="838201" y="1812395"/>
+                <a:ext cx="6888479" cy="4351338"/>
+              </a:xfrm>
+            </p:spPr>
+            <p:txBody>
+              <a:bodyPr>
+                <a:normAutofit/>
+              </a:bodyPr>
+              <a:lstStyle/>
+              <a:p>
+                <a:r>
+                  <a:rPr lang="pt-BR" dirty="0"/>
+                  <a:t>Teorema 2:</a:t>
+                </a:r>
+              </a:p>
+              <a:p>
+                <a:pPr lvl="1" algn="just"/>
+                <a:endParaRPr lang="pt-BR" dirty="0"/>
+              </a:p>
+              <a:p>
+                <a:pPr lvl="1" algn="just"/>
+                <a:r>
+                  <a:rPr lang="pt-BR" dirty="0"/>
+                  <a:t>Sendo </a:t>
+                </a:r>
+                <a:r>
+                  <a:rPr lang="pt-BR" b="1" i="1" dirty="0" err="1"/>
+                  <a:t>Hk</a:t>
+                </a:r>
+                <a:r>
+                  <a:rPr lang="pt-BR" dirty="0"/>
+                  <a:t> é uma camada do dendrograma produzido pelo algoritmo AHC, contendo </a:t>
+                </a:r>
+                <a:r>
+                  <a:rPr lang="pt-BR" b="1" i="1" dirty="0"/>
+                  <a:t>c</a:t>
+                </a:r>
+                <a:r>
+                  <a:rPr lang="pt-BR" dirty="0"/>
+                  <a:t> clusters {G1, G2,..., </a:t>
+                </a:r>
+                <a:r>
+                  <a:rPr lang="pt-BR" dirty="0" err="1"/>
+                  <a:t>Gc</a:t>
+                </a:r>
+                <a:r>
+                  <a:rPr lang="pt-BR" dirty="0"/>
+                  <a:t>} cada um com </a:t>
+                </a:r>
+                <a:r>
+                  <a:rPr lang="pt-BR" b="1" i="1" dirty="0"/>
+                  <a:t>i</a:t>
+                </a:r>
+                <a:r>
+                  <a:rPr lang="pt-BR" dirty="0"/>
+                  <a:t> amostras → </a:t>
+                </a:r>
+                <a:r>
+                  <a:rPr lang="pt-BR" b="1" i="1" dirty="0"/>
+                  <a:t>i</a:t>
+                </a:r>
+                <a:r>
+                  <a:rPr lang="pt-BR" dirty="0"/>
+                  <a:t> = 1,2,...,c, </a:t>
+                </a:r>
+              </a:p>
+              <a:p>
+                <a:pPr marL="457200" lvl="1" indent="0" algn="just">
+                  <a:buNone/>
+                </a:pPr>
+                <a:endParaRPr lang="pt-BR" dirty="0"/>
+              </a:p>
+              <a:p>
+                <a:pPr lvl="1" algn="just"/>
+                <a:r>
+                  <a:rPr lang="pt-BR" dirty="0"/>
+                  <a:t>A separabilidade </a:t>
+                </a:r>
+                <a:r>
+                  <a:rPr lang="pt-BR" dirty="0" err="1"/>
+                  <a:t>interclusters</a:t>
+                </a:r>
+                <a:r>
+                  <a:rPr lang="pt-BR" dirty="0"/>
+                  <a:t> do cluster i é maior ou igual à compactação </a:t>
+                </a:r>
+                <a:r>
+                  <a:rPr lang="pt-BR" dirty="0" err="1"/>
+                  <a:t>intracluster</a:t>
+                </a:r>
+                <a:r>
+                  <a:rPr lang="pt-BR" dirty="0"/>
+                  <a:t>, ou seja, </a:t>
+                </a:r>
+                <a14:m>
+                  <m:oMath xmlns:m="http://schemas.openxmlformats.org/officeDocument/2006/math">
+                    <m:r>
+                      <m:rPr>
+                        <m:sty m:val="p"/>
+                      </m:rPr>
+                      <a:rPr lang="pt-BR" b="0" i="0" smtClean="0">
+                        <a:latin typeface="Cambria Math" panose="02040503050406030204" pitchFamily="18" charset="0"/>
+                      </a:rPr>
+                      <m:t>s</m:t>
+                    </m:r>
+                    <m:r>
+                      <a:rPr lang="pt-BR" b="0" i="1" smtClean="0">
+                        <a:latin typeface="Cambria Math" panose="02040503050406030204" pitchFamily="18" charset="0"/>
+                      </a:rPr>
+                      <m:t>𝑑</m:t>
+                    </m:r>
+                    <m:d>
+                      <m:dPr>
+                        <m:ctrlPr>
+                          <a:rPr lang="pt-BR" b="0" i="1" smtClean="0">
+                            <a:latin typeface="Cambria Math" panose="02040503050406030204" pitchFamily="18" charset="0"/>
+                          </a:rPr>
+                        </m:ctrlPr>
+                      </m:dPr>
+                      <m:e>
+                        <m:r>
+                          <a:rPr lang="pt-BR" b="0" i="1" smtClean="0">
+                            <a:latin typeface="Cambria Math" panose="02040503050406030204" pitchFamily="18" charset="0"/>
+                          </a:rPr>
+                          <m:t>𝑖</m:t>
+                        </m:r>
+                      </m:e>
+                    </m:d>
+                    <m:r>
+                      <a:rPr lang="pt-BR" b="0" i="1" smtClean="0">
+                        <a:latin typeface="Cambria Math" panose="02040503050406030204" pitchFamily="18" charset="0"/>
+                      </a:rPr>
+                      <m:t> </m:t>
+                    </m:r>
+                  </m:oMath>
+                </a14:m>
+                <a:r>
+                  <a:rPr lang="pt-BR" dirty="0"/>
+                  <a:t>≥ </a:t>
+                </a:r>
+                <a14:m>
+                  <m:oMath xmlns:m="http://schemas.openxmlformats.org/officeDocument/2006/math">
+                    <m:r>
+                      <m:rPr>
+                        <m:sty m:val="p"/>
+                      </m:rPr>
+                      <a:rPr lang="pt-BR" b="0" i="0" smtClean="0">
+                        <a:latin typeface="Cambria Math" panose="02040503050406030204" pitchFamily="18" charset="0"/>
+                      </a:rPr>
+                      <m:t>cd</m:t>
+                    </m:r>
+                    <m:d>
+                      <m:dPr>
+                        <m:ctrlPr>
+                          <a:rPr lang="pt-BR" i="1">
+                            <a:latin typeface="Cambria Math" panose="02040503050406030204" pitchFamily="18" charset="0"/>
+                          </a:rPr>
+                        </m:ctrlPr>
+                      </m:dPr>
+                      <m:e>
+                        <m:r>
+                          <a:rPr lang="pt-BR" b="0" i="1" smtClean="0">
+                            <a:latin typeface="Cambria Math" panose="02040503050406030204" pitchFamily="18" charset="0"/>
+                          </a:rPr>
+                          <m:t>𝑖</m:t>
+                        </m:r>
+                      </m:e>
+                    </m:d>
+                  </m:oMath>
+                </a14:m>
+                <a:endParaRPr lang="en-US" dirty="0"/>
+              </a:p>
+            </p:txBody>
+          </p:sp>
+        </mc:Choice>
+        <mc:Fallback>
+          <p:sp>
+            <p:nvSpPr>
+              <p:cNvPr id="3" name="Espaço Reservado para Conteúdo 2">
+                <a:extLst>
+                  <a:ext uri="{FF2B5EF4-FFF2-40B4-BE49-F238E27FC236}">
+                    <a16:creationId xmlns:a16="http://schemas.microsoft.com/office/drawing/2014/main" id="{EC2E1DDA-B549-8F9D-BA64-18BAFB4D49A1}"/>
+                  </a:ext>
+                </a:extLst>
+              </p:cNvPr>
+              <p:cNvSpPr>
+                <a:spLocks noGrp="1" noRot="1" noChangeAspect="1" noMove="1" noResize="1" noEditPoints="1" noAdjustHandles="1" noChangeArrowheads="1" noChangeShapeType="1" noTextEdit="1"/>
+              </p:cNvSpPr>
+              <p:nvPr>
+                <p:ph idx="1"/>
+              </p:nvPr>
+            </p:nvSpPr>
+            <p:spPr>
+              <a:xfrm>
+                <a:off x="838201" y="1812395"/>
+                <a:ext cx="6888479" cy="4351338"/>
+              </a:xfrm>
+              <a:blipFill>
+                <a:blip r:embed="rId3"/>
+                <a:stretch>
+                  <a:fillRect l="-1593" t="-2241" r="-1327"/>
+                </a:stretch>
+              </a:blipFill>
+            </p:spPr>
+            <p:txBody>
+              <a:bodyPr/>
+              <a:lstStyle/>
+              <a:p>
+                <a:r>
+                  <a:rPr lang="pt-BR">
+                    <a:noFill/>
+                  </a:rPr>
+                  <a:t> </a:t>
+                </a:r>
+              </a:p>
+            </p:txBody>
+          </p:sp>
+        </mc:Fallback>
+      </mc:AlternateContent>
+      <p:pic>
+        <p:nvPicPr>
+          <p:cNvPr id="4" name="Picture 2" descr="Local do Evento | SBRC 2021 - Simpósio Brasileiro de Redes ...">
+            <a:extLst>
+              <a:ext uri="{FF2B5EF4-FFF2-40B4-BE49-F238E27FC236}">
+                <a16:creationId xmlns:a16="http://schemas.microsoft.com/office/drawing/2014/main" id="{C4BAF076-983A-267F-65B0-779489FA3886}"/>
+              </a:ext>
+            </a:extLst>
+          </p:cNvPr>
+          <p:cNvPicPr>
+            <a:picLocks noChangeAspect="1" noChangeArrowheads="1"/>
+          </p:cNvPicPr>
+          <p:nvPr/>
+        </p:nvPicPr>
+        <p:blipFill>
+          <a:blip r:embed="rId4">
+            <a:extLst>
+              <a:ext uri="{28A0092B-C50C-407E-A947-70E740481C1C}">
+                <a14:useLocalDpi xmlns:a14="http://schemas.microsoft.com/office/drawing/2010/main" val="0"/>
+              </a:ext>
+            </a:extLst>
+          </a:blip>
+          <a:srcRect/>
+          <a:stretch>
+            <a:fillRect/>
+          </a:stretch>
+        </p:blipFill>
+        <p:spPr bwMode="auto">
+          <a:xfrm>
+            <a:off x="8783783" y="0"/>
+            <a:ext cx="3408217" cy="1388533"/>
+          </a:xfrm>
+          <a:prstGeom prst="rect">
+            <a:avLst/>
+          </a:prstGeom>
+          <a:noFill/>
+          <a:extLst>
+            <a:ext uri="{909E8E84-426E-40DD-AFC4-6F175D3DCCD1}">
+              <a14:hiddenFill xmlns:a14="http://schemas.microsoft.com/office/drawing/2010/main">
+                <a:solidFill>
+                  <a:srgbClr val="FFFFFF"/>
+                </a:solidFill>
+              </a14:hiddenFill>
+            </a:ext>
+          </a:extLst>
+        </p:spPr>
+      </p:pic>
+      <p:pic>
+        <p:nvPicPr>
+          <p:cNvPr id="5" name="Picture 4" descr="Edições Anteriores | SBRC 2021 - Simpósio Brasileiro de Redes de  Computadores e Sistemas Distribuídos">
+            <a:extLst>
+              <a:ext uri="{FF2B5EF4-FFF2-40B4-BE49-F238E27FC236}">
+                <a16:creationId xmlns:a16="http://schemas.microsoft.com/office/drawing/2014/main" id="{EE629CB4-DE61-E1C8-0777-7BFAD2ACB3C1}"/>
+              </a:ext>
+            </a:extLst>
+          </p:cNvPr>
+          <p:cNvPicPr>
+            <a:picLocks noChangeAspect="1" noChangeArrowheads="1"/>
+          </p:cNvPicPr>
+          <p:nvPr/>
+        </p:nvPicPr>
+        <p:blipFill rotWithShape="1">
+          <a:blip r:embed="rId5">
+            <a:extLst>
+              <a:ext uri="{28A0092B-C50C-407E-A947-70E740481C1C}">
+                <a14:useLocalDpi xmlns:a14="http://schemas.microsoft.com/office/drawing/2010/main" val="0"/>
+              </a:ext>
+            </a:extLst>
+          </a:blip>
+          <a:srcRect l="18938" t="24085"/>
+          <a:stretch/>
+        </p:blipFill>
+        <p:spPr bwMode="auto">
+          <a:xfrm>
+            <a:off x="259976" y="5803900"/>
+            <a:ext cx="2762759" cy="1054100"/>
+          </a:xfrm>
+          <a:prstGeom prst="rect">
+            <a:avLst/>
+          </a:prstGeom>
+          <a:noFill/>
+          <a:extLst>
+            <a:ext uri="{909E8E84-426E-40DD-AFC4-6F175D3DCCD1}">
+              <a14:hiddenFill xmlns:a14="http://schemas.microsoft.com/office/drawing/2010/main">
+                <a:solidFill>
+                  <a:srgbClr val="FFFFFF"/>
+                </a:solidFill>
+              </a14:hiddenFill>
+            </a:ext>
+          </a:extLst>
+        </p:spPr>
+      </p:pic>
+      <p:pic>
+        <p:nvPicPr>
+          <p:cNvPr id="7" name="Imagem 6">
+            <a:extLst>
+              <a:ext uri="{FF2B5EF4-FFF2-40B4-BE49-F238E27FC236}">
+                <a16:creationId xmlns:a16="http://schemas.microsoft.com/office/drawing/2014/main" id="{A3861257-5CA7-BC82-D9E6-40A2E32F8E63}"/>
+              </a:ext>
+            </a:extLst>
+          </p:cNvPr>
+          <p:cNvPicPr>
+            <a:picLocks noChangeAspect="1"/>
+          </p:cNvPicPr>
+          <p:nvPr/>
+        </p:nvPicPr>
+        <p:blipFill>
+          <a:blip r:embed="rId6"/>
+          <a:stretch>
+            <a:fillRect/>
+          </a:stretch>
+        </p:blipFill>
+        <p:spPr>
+          <a:xfrm>
+            <a:off x="8180277" y="1931458"/>
+            <a:ext cx="3751747" cy="4113212"/>
+          </a:xfrm>
+          <a:prstGeom prst="rect">
+            <a:avLst/>
+          </a:prstGeom>
+        </p:spPr>
+      </p:pic>
+    </p:spTree>
+    <p:extLst>
+      <p:ext uri="{BB962C8B-B14F-4D97-AF65-F5344CB8AC3E}">
+        <p14:creationId xmlns:p14="http://schemas.microsoft.com/office/powerpoint/2010/main" val="774972616"/>
+      </p:ext>
+    </p:extLst>
+  </p:cSld>
+  <p:clrMapOvr>
+    <a:masterClrMapping/>
+  </p:clrMapOvr>
+</p:sld>
+</file>
+
+<file path=ppt/slides/slide22.xml><?xml version="1.0" encoding="utf-8"?>
+<p:sld xmlns:a="http://schemas.openxmlformats.org/drawingml/2006/main" xmlns:r="http://schemas.openxmlformats.org/officeDocument/2006/relationships" xmlns:p="http://schemas.openxmlformats.org/presentationml/2006/main">
+  <p:cSld>
+    <p:spTree>
+      <p:nvGrpSpPr>
+        <p:cNvPr id="1" name=""/>
+        <p:cNvGrpSpPr/>
+        <p:nvPr/>
+      </p:nvGrpSpPr>
+      <p:grpSpPr>
+        <a:xfrm>
+          <a:off x="0" y="0"/>
+          <a:ext cx="0" cy="0"/>
+          <a:chOff x="0" y="0"/>
+          <a:chExt cx="0" cy="0"/>
+        </a:xfrm>
+      </p:grpSpPr>
+      <p:sp>
+        <p:nvSpPr>
+          <p:cNvPr id="2" name="Título 1">
+            <a:extLst>
+              <a:ext uri="{FF2B5EF4-FFF2-40B4-BE49-F238E27FC236}">
+                <a16:creationId xmlns:a16="http://schemas.microsoft.com/office/drawing/2014/main" id="{4549A9CF-9A04-0D0B-3F38-47569BAC879F}"/>
+              </a:ext>
+            </a:extLst>
+          </p:cNvPr>
+          <p:cNvSpPr>
+            <a:spLocks noGrp="1"/>
+          </p:cNvSpPr>
+          <p:nvPr>
+            <p:ph type="title"/>
+          </p:nvPr>
+        </p:nvSpPr>
+        <p:spPr/>
+        <p:txBody>
+          <a:bodyPr/>
+          <a:lstStyle/>
+          <a:p>
+            <a:r>
+              <a:rPr lang="pt-BR" dirty="0"/>
+              <a:t>Índice CSP e número </a:t>
+            </a:r>
+            <a:br>
+              <a:rPr lang="pt-BR" dirty="0"/>
+            </a:br>
+            <a:r>
+              <a:rPr lang="pt-BR" dirty="0"/>
+              <a:t>ideal de clusters</a:t>
+            </a:r>
+          </a:p>
+        </p:txBody>
+      </p:sp>
+      <p:sp>
+        <p:nvSpPr>
+          <p:cNvPr id="3" name="Espaço Reservado para Conteúdo 2">
+            <a:extLst>
+              <a:ext uri="{FF2B5EF4-FFF2-40B4-BE49-F238E27FC236}">
+                <a16:creationId xmlns:a16="http://schemas.microsoft.com/office/drawing/2014/main" id="{EC2E1DDA-B549-8F9D-BA64-18BAFB4D49A1}"/>
+              </a:ext>
+            </a:extLst>
+          </p:cNvPr>
+          <p:cNvSpPr>
+            <a:spLocks noGrp="1"/>
+          </p:cNvSpPr>
+          <p:nvPr>
+            <p:ph idx="1"/>
+          </p:nvPr>
+        </p:nvSpPr>
+        <p:spPr>
+          <a:xfrm>
+            <a:off x="838201" y="1812395"/>
+            <a:ext cx="9905999" cy="4351338"/>
+          </a:xfrm>
+        </p:spPr>
+        <p:txBody>
+          <a:bodyPr>
+            <a:normAutofit/>
+          </a:bodyPr>
+          <a:lstStyle/>
+          <a:p>
+            <a:pPr algn="just"/>
+            <a:r>
+              <a:rPr lang="pt-BR" dirty="0"/>
+              <a:t>Análise do agrupamento com o índice CSP</a:t>
+            </a:r>
+          </a:p>
+          <a:p>
+            <a:pPr marL="457200" lvl="1" indent="0" algn="just">
+              <a:buNone/>
+            </a:pPr>
+            <a:endParaRPr lang="pt-BR" dirty="0"/>
+          </a:p>
+          <a:p>
+            <a:pPr algn="just"/>
+            <a:r>
+              <a:rPr lang="pt-BR" dirty="0"/>
+              <a:t>Analisamos os efeitos de agrupamento de um conjunto de dados calculando o valor médio do índice CSP de todos os clusters no conjunto de dados.</a:t>
+            </a:r>
+          </a:p>
+          <a:p>
+            <a:pPr marL="457200" lvl="1" indent="0" algn="just">
+              <a:buNone/>
+            </a:pPr>
+            <a:endParaRPr lang="pt-BR" dirty="0"/>
+          </a:p>
+          <a:p>
+            <a:pPr algn="just"/>
+            <a:r>
+              <a:rPr lang="pt-BR" dirty="0"/>
+              <a:t>Quanto maior o valor médio, melhor será o resultado do agrupamento. O número de cluster que corresponde ao valor médio máximo é o número ideal de clusters.</a:t>
+            </a:r>
+          </a:p>
+        </p:txBody>
+      </p:sp>
+      <p:pic>
+        <p:nvPicPr>
+          <p:cNvPr id="4" name="Picture 2" descr="Local do Evento | SBRC 2021 - Simpósio Brasileiro de Redes ...">
+            <a:extLst>
+              <a:ext uri="{FF2B5EF4-FFF2-40B4-BE49-F238E27FC236}">
+                <a16:creationId xmlns:a16="http://schemas.microsoft.com/office/drawing/2014/main" id="{C4BAF076-983A-267F-65B0-779489FA3886}"/>
+              </a:ext>
+            </a:extLst>
+          </p:cNvPr>
+          <p:cNvPicPr>
+            <a:picLocks noChangeAspect="1" noChangeArrowheads="1"/>
+          </p:cNvPicPr>
+          <p:nvPr/>
+        </p:nvPicPr>
+        <p:blipFill>
+          <a:blip r:embed="rId3">
+            <a:extLst>
+              <a:ext uri="{28A0092B-C50C-407E-A947-70E740481C1C}">
+                <a14:useLocalDpi xmlns:a14="http://schemas.microsoft.com/office/drawing/2010/main" val="0"/>
+              </a:ext>
+            </a:extLst>
+          </a:blip>
+          <a:srcRect/>
+          <a:stretch>
+            <a:fillRect/>
+          </a:stretch>
+        </p:blipFill>
+        <p:spPr bwMode="auto">
+          <a:xfrm>
+            <a:off x="8783783" y="0"/>
+            <a:ext cx="3408217" cy="1388533"/>
+          </a:xfrm>
+          <a:prstGeom prst="rect">
+            <a:avLst/>
+          </a:prstGeom>
+          <a:noFill/>
+          <a:extLst>
+            <a:ext uri="{909E8E84-426E-40DD-AFC4-6F175D3DCCD1}">
+              <a14:hiddenFill xmlns:a14="http://schemas.microsoft.com/office/drawing/2010/main">
+                <a:solidFill>
+                  <a:srgbClr val="FFFFFF"/>
+                </a:solidFill>
+              </a14:hiddenFill>
+            </a:ext>
+          </a:extLst>
+        </p:spPr>
+      </p:pic>
+      <p:pic>
+        <p:nvPicPr>
+          <p:cNvPr id="5" name="Picture 4" descr="Edições Anteriores | SBRC 2021 - Simpósio Brasileiro de Redes de  Computadores e Sistemas Distribuídos">
+            <a:extLst>
+              <a:ext uri="{FF2B5EF4-FFF2-40B4-BE49-F238E27FC236}">
+                <a16:creationId xmlns:a16="http://schemas.microsoft.com/office/drawing/2014/main" id="{EE629CB4-DE61-E1C8-0777-7BFAD2ACB3C1}"/>
+              </a:ext>
+            </a:extLst>
+          </p:cNvPr>
+          <p:cNvPicPr>
+            <a:picLocks noChangeAspect="1" noChangeArrowheads="1"/>
+          </p:cNvPicPr>
+          <p:nvPr/>
+        </p:nvPicPr>
+        <p:blipFill rotWithShape="1">
+          <a:blip r:embed="rId4">
+            <a:extLst>
+              <a:ext uri="{28A0092B-C50C-407E-A947-70E740481C1C}">
+                <a14:useLocalDpi xmlns:a14="http://schemas.microsoft.com/office/drawing/2010/main" val="0"/>
+              </a:ext>
+            </a:extLst>
+          </a:blip>
+          <a:srcRect l="18938" t="24085"/>
+          <a:stretch/>
+        </p:blipFill>
+        <p:spPr bwMode="auto">
+          <a:xfrm>
+            <a:off x="259976" y="5803900"/>
+            <a:ext cx="2762759" cy="1054100"/>
+          </a:xfrm>
+          <a:prstGeom prst="rect">
+            <a:avLst/>
+          </a:prstGeom>
+          <a:noFill/>
+          <a:extLst>
+            <a:ext uri="{909E8E84-426E-40DD-AFC4-6F175D3DCCD1}">
+              <a14:hiddenFill xmlns:a14="http://schemas.microsoft.com/office/drawing/2010/main">
+                <a:solidFill>
+                  <a:srgbClr val="FFFFFF"/>
+                </a:solidFill>
+              </a14:hiddenFill>
+            </a:ext>
+          </a:extLst>
+        </p:spPr>
+      </p:pic>
+    </p:spTree>
+    <p:extLst>
+      <p:ext uri="{BB962C8B-B14F-4D97-AF65-F5344CB8AC3E}">
+        <p14:creationId xmlns:p14="http://schemas.microsoft.com/office/powerpoint/2010/main" val="2469860889"/>
+      </p:ext>
+    </p:extLst>
+  </p:cSld>
+  <p:clrMapOvr>
+    <a:masterClrMapping/>
+  </p:clrMapOvr>
+</p:sld>
+</file>
+
+<file path=ppt/slides/slide23.xml><?xml version="1.0" encoding="utf-8"?>
+<p:sld xmlns:a="http://schemas.openxmlformats.org/drawingml/2006/main" xmlns:r="http://schemas.openxmlformats.org/officeDocument/2006/relationships" xmlns:p="http://schemas.openxmlformats.org/presentationml/2006/main">
+  <p:cSld>
+    <p:spTree>
+      <p:nvGrpSpPr>
+        <p:cNvPr id="1" name=""/>
+        <p:cNvGrpSpPr/>
+        <p:nvPr/>
+      </p:nvGrpSpPr>
+      <p:grpSpPr>
+        <a:xfrm>
+          <a:off x="0" y="0"/>
+          <a:ext cx="0" cy="0"/>
+          <a:chOff x="0" y="0"/>
+          <a:chExt cx="0" cy="0"/>
+        </a:xfrm>
+      </p:grpSpPr>
+      <p:sp>
+        <p:nvSpPr>
+          <p:cNvPr id="2" name="Título 1">
+            <a:extLst>
+              <a:ext uri="{FF2B5EF4-FFF2-40B4-BE49-F238E27FC236}">
+                <a16:creationId xmlns:a16="http://schemas.microsoft.com/office/drawing/2014/main" id="{4549A9CF-9A04-0D0B-3F38-47569BAC879F}"/>
+              </a:ext>
+            </a:extLst>
+          </p:cNvPr>
+          <p:cNvSpPr>
+            <a:spLocks noGrp="1"/>
+          </p:cNvSpPr>
+          <p:nvPr>
+            <p:ph type="title"/>
+          </p:nvPr>
+        </p:nvSpPr>
+        <p:spPr/>
+        <p:txBody>
+          <a:bodyPr/>
+          <a:lstStyle/>
+          <a:p>
+            <a:r>
+              <a:rPr lang="pt-BR" dirty="0"/>
+              <a:t>Índice CSP e número </a:t>
+            </a:r>
+            <a:br>
+              <a:rPr lang="pt-BR" dirty="0"/>
+            </a:br>
+            <a:r>
+              <a:rPr lang="pt-BR" dirty="0"/>
+              <a:t>ideal de clusters</a:t>
+            </a:r>
+          </a:p>
+        </p:txBody>
+      </p:sp>
+      <mc:AlternateContent xmlns:mc="http://schemas.openxmlformats.org/markup-compatibility/2006">
+        <mc:Choice xmlns:a14="http://schemas.microsoft.com/office/drawing/2010/main" Requires="a14">
+          <p:sp>
+            <p:nvSpPr>
+              <p:cNvPr id="3" name="Espaço Reservado para Conteúdo 2">
+                <a:extLst>
+                  <a:ext uri="{FF2B5EF4-FFF2-40B4-BE49-F238E27FC236}">
+                    <a16:creationId xmlns:a16="http://schemas.microsoft.com/office/drawing/2014/main" id="{EC2E1DDA-B549-8F9D-BA64-18BAFB4D49A1}"/>
+                  </a:ext>
+                </a:extLst>
+              </p:cNvPr>
+              <p:cNvSpPr>
+                <a:spLocks noGrp="1"/>
+              </p:cNvSpPr>
+              <p:nvPr>
+                <p:ph idx="1"/>
+              </p:nvPr>
+            </p:nvSpPr>
+            <p:spPr>
+              <a:xfrm>
+                <a:off x="838201" y="1812395"/>
+                <a:ext cx="8682989" cy="4351338"/>
+              </a:xfrm>
+            </p:spPr>
+            <p:txBody>
+              <a:bodyPr>
+                <a:normAutofit/>
+              </a:bodyPr>
+              <a:lstStyle/>
+              <a:p>
+                <a:pPr algn="just"/>
+                <a:r>
+                  <a:rPr lang="pt-BR" dirty="0"/>
+                  <a:t>Fórmula para </a:t>
+                </a:r>
+                <a:r>
+                  <a:rPr lang="pt-BR" dirty="0" err="1"/>
+                  <a:t>avgCSP</a:t>
+                </a:r>
+                <a:endParaRPr lang="pt-BR" dirty="0"/>
+              </a:p>
+              <a:p>
+                <a:pPr marL="457200" lvl="1" indent="0" algn="just">
+                  <a:buNone/>
+                </a:pPr>
+                <a:endParaRPr lang="pt-BR" dirty="0"/>
+              </a:p>
+              <a:p>
+                <a:pPr marL="457200" lvl="1" indent="0" algn="just">
+                  <a:buNone/>
+                </a:pPr>
+                <a:endParaRPr lang="pt-BR" dirty="0"/>
+              </a:p>
+              <a:p>
+                <a:pPr marL="457200" lvl="1" indent="0" algn="just">
+                  <a:buNone/>
+                </a:pPr>
+                <a:endParaRPr lang="pt-BR" dirty="0"/>
+              </a:p>
+              <a:p>
+                <a:pPr marL="457200" lvl="1" indent="0" algn="just">
+                  <a:buNone/>
+                </a:pPr>
+                <a:endParaRPr lang="pt-BR" dirty="0"/>
+              </a:p>
+              <a:p>
+                <a:pPr marL="457200" lvl="1" indent="0" algn="just">
+                  <a:buNone/>
+                </a:pPr>
+                <a:r>
+                  <a:rPr lang="pt-BR" dirty="0"/>
+                  <a:t>Sendo: </a:t>
+                </a:r>
+              </a:p>
+              <a:p>
+                <a:pPr lvl="1" algn="just"/>
+                <a:r>
+                  <a:rPr lang="pt-BR" dirty="0"/>
+                  <a:t>n – número de pontos de dados</a:t>
+                </a:r>
+              </a:p>
+              <a:p>
+                <a:pPr lvl="1" algn="just"/>
+                <a14:m>
+                  <m:oMath xmlns:m="http://schemas.openxmlformats.org/officeDocument/2006/math">
+                    <m:r>
+                      <a:rPr lang="pt-BR" b="0" i="1" smtClean="0">
+                        <a:latin typeface="Cambria Math" panose="02040503050406030204" pitchFamily="18" charset="0"/>
+                      </a:rPr>
+                      <m:t>𝑎𝑣𝑔𝐶𝑆𝑃</m:t>
+                    </m:r>
+                  </m:oMath>
+                </a14:m>
+                <a:r>
+                  <a:rPr lang="pt-BR" dirty="0"/>
+                  <a:t> – valor médio de CSP no caso em que os pontos de dados são agrupados em </a:t>
+                </a:r>
+                <a:r>
+                  <a:rPr lang="pt-BR" b="1" i="1" dirty="0"/>
+                  <a:t>k</a:t>
+                </a:r>
+                <a:r>
+                  <a:rPr lang="pt-BR" dirty="0"/>
+                  <a:t> clusters</a:t>
+                </a:r>
+              </a:p>
+              <a:p>
+                <a:pPr lvl="1" algn="just"/>
+                <a14:m>
+                  <m:oMath xmlns:m="http://schemas.openxmlformats.org/officeDocument/2006/math">
+                    <m:sSub>
+                      <m:sSubPr>
+                        <m:ctrlPr>
+                          <a:rPr lang="pt-BR" i="1" smtClean="0">
+                            <a:latin typeface="Cambria Math" panose="02040503050406030204" pitchFamily="18" charset="0"/>
+                          </a:rPr>
+                        </m:ctrlPr>
+                      </m:sSubPr>
+                      <m:e>
+                        <m:r>
+                          <a:rPr lang="pt-BR" b="0" i="1" smtClean="0">
+                            <a:latin typeface="Cambria Math" panose="02040503050406030204" pitchFamily="18" charset="0"/>
+                          </a:rPr>
+                          <m:t>𝑘</m:t>
+                        </m:r>
+                      </m:e>
+                      <m:sub>
+                        <m:r>
+                          <a:rPr lang="pt-BR" b="0" i="1" smtClean="0">
+                            <a:latin typeface="Cambria Math" panose="02040503050406030204" pitchFamily="18" charset="0"/>
+                          </a:rPr>
+                          <m:t>𝑜𝑝𝑡</m:t>
+                        </m:r>
+                      </m:sub>
+                    </m:sSub>
+                  </m:oMath>
+                </a14:m>
+                <a:r>
+                  <a:rPr lang="pt-BR" dirty="0"/>
+                  <a:t> – valor ideal de clusters</a:t>
+                </a:r>
+              </a:p>
+            </p:txBody>
+          </p:sp>
+        </mc:Choice>
+        <mc:Fallback>
+          <p:sp>
+            <p:nvSpPr>
+              <p:cNvPr id="3" name="Espaço Reservado para Conteúdo 2">
+                <a:extLst>
+                  <a:ext uri="{FF2B5EF4-FFF2-40B4-BE49-F238E27FC236}">
+                    <a16:creationId xmlns:a16="http://schemas.microsoft.com/office/drawing/2014/main" id="{EC2E1DDA-B549-8F9D-BA64-18BAFB4D49A1}"/>
+                  </a:ext>
+                </a:extLst>
+              </p:cNvPr>
+              <p:cNvSpPr>
+                <a:spLocks noGrp="1" noRot="1" noChangeAspect="1" noMove="1" noResize="1" noEditPoints="1" noAdjustHandles="1" noChangeArrowheads="1" noChangeShapeType="1" noTextEdit="1"/>
+              </p:cNvSpPr>
+              <p:nvPr>
+                <p:ph idx="1"/>
+              </p:nvPr>
+            </p:nvSpPr>
+            <p:spPr>
+              <a:xfrm>
+                <a:off x="838201" y="1812395"/>
+                <a:ext cx="8682989" cy="4351338"/>
+              </a:xfrm>
+              <a:blipFill>
+                <a:blip r:embed="rId3"/>
+                <a:stretch>
+                  <a:fillRect l="-1264" t="-2241" r="-1053"/>
+                </a:stretch>
+              </a:blipFill>
+            </p:spPr>
+            <p:txBody>
+              <a:bodyPr/>
+              <a:lstStyle/>
+              <a:p>
+                <a:r>
+                  <a:rPr lang="pt-BR">
+                    <a:noFill/>
+                  </a:rPr>
+                  <a:t> </a:t>
+                </a:r>
+              </a:p>
+            </p:txBody>
+          </p:sp>
+        </mc:Fallback>
+      </mc:AlternateContent>
+      <p:pic>
+        <p:nvPicPr>
+          <p:cNvPr id="4" name="Picture 2" descr="Local do Evento | SBRC 2021 - Simpósio Brasileiro de Redes ...">
+            <a:extLst>
+              <a:ext uri="{FF2B5EF4-FFF2-40B4-BE49-F238E27FC236}">
+                <a16:creationId xmlns:a16="http://schemas.microsoft.com/office/drawing/2014/main" id="{C4BAF076-983A-267F-65B0-779489FA3886}"/>
+              </a:ext>
+            </a:extLst>
+          </p:cNvPr>
+          <p:cNvPicPr>
+            <a:picLocks noChangeAspect="1" noChangeArrowheads="1"/>
+          </p:cNvPicPr>
+          <p:nvPr/>
+        </p:nvPicPr>
+        <p:blipFill>
+          <a:blip r:embed="rId4">
+            <a:extLst>
+              <a:ext uri="{28A0092B-C50C-407E-A947-70E740481C1C}">
+                <a14:useLocalDpi xmlns:a14="http://schemas.microsoft.com/office/drawing/2010/main" val="0"/>
+              </a:ext>
+            </a:extLst>
+          </a:blip>
+          <a:srcRect/>
+          <a:stretch>
+            <a:fillRect/>
+          </a:stretch>
+        </p:blipFill>
+        <p:spPr bwMode="auto">
+          <a:xfrm>
+            <a:off x="8783783" y="0"/>
+            <a:ext cx="3408217" cy="1388533"/>
+          </a:xfrm>
+          <a:prstGeom prst="rect">
+            <a:avLst/>
+          </a:prstGeom>
+          <a:noFill/>
+          <a:extLst>
+            <a:ext uri="{909E8E84-426E-40DD-AFC4-6F175D3DCCD1}">
+              <a14:hiddenFill xmlns:a14="http://schemas.microsoft.com/office/drawing/2010/main">
+                <a:solidFill>
+                  <a:srgbClr val="FFFFFF"/>
+                </a:solidFill>
+              </a14:hiddenFill>
+            </a:ext>
+          </a:extLst>
+        </p:spPr>
+      </p:pic>
+      <p:pic>
+        <p:nvPicPr>
+          <p:cNvPr id="5" name="Picture 4" descr="Edições Anteriores | SBRC 2021 - Simpósio Brasileiro de Redes de  Computadores e Sistemas Distribuídos">
+            <a:extLst>
+              <a:ext uri="{FF2B5EF4-FFF2-40B4-BE49-F238E27FC236}">
+                <a16:creationId xmlns:a16="http://schemas.microsoft.com/office/drawing/2014/main" id="{EE629CB4-DE61-E1C8-0777-7BFAD2ACB3C1}"/>
+              </a:ext>
+            </a:extLst>
+          </p:cNvPr>
+          <p:cNvPicPr>
+            <a:picLocks noChangeAspect="1" noChangeArrowheads="1"/>
+          </p:cNvPicPr>
+          <p:nvPr/>
+        </p:nvPicPr>
+        <p:blipFill rotWithShape="1">
+          <a:blip r:embed="rId5">
+            <a:extLst>
+              <a:ext uri="{28A0092B-C50C-407E-A947-70E740481C1C}">
+                <a14:useLocalDpi xmlns:a14="http://schemas.microsoft.com/office/drawing/2010/main" val="0"/>
+              </a:ext>
+            </a:extLst>
+          </a:blip>
+          <a:srcRect l="18938" t="24085"/>
+          <a:stretch/>
+        </p:blipFill>
+        <p:spPr bwMode="auto">
+          <a:xfrm>
+            <a:off x="259976" y="5803900"/>
+            <a:ext cx="2762759" cy="1054100"/>
+          </a:xfrm>
+          <a:prstGeom prst="rect">
+            <a:avLst/>
+          </a:prstGeom>
+          <a:noFill/>
+          <a:extLst>
+            <a:ext uri="{909E8E84-426E-40DD-AFC4-6F175D3DCCD1}">
+              <a14:hiddenFill xmlns:a14="http://schemas.microsoft.com/office/drawing/2010/main">
+                <a:solidFill>
+                  <a:srgbClr val="FFFFFF"/>
+                </a:solidFill>
+              </a14:hiddenFill>
+            </a:ext>
+          </a:extLst>
+        </p:spPr>
+      </p:pic>
+      <p:pic>
+        <p:nvPicPr>
+          <p:cNvPr id="8" name="Imagem 7">
+            <a:extLst>
+              <a:ext uri="{FF2B5EF4-FFF2-40B4-BE49-F238E27FC236}">
+                <a16:creationId xmlns:a16="http://schemas.microsoft.com/office/drawing/2014/main" id="{67C9367E-9AE1-CBA4-32EC-48D7AB662504}"/>
+              </a:ext>
+            </a:extLst>
+          </p:cNvPr>
+          <p:cNvPicPr>
+            <a:picLocks noChangeAspect="1"/>
+          </p:cNvPicPr>
+          <p:nvPr/>
+        </p:nvPicPr>
+        <p:blipFill>
+          <a:blip r:embed="rId6"/>
+          <a:stretch>
+            <a:fillRect/>
+          </a:stretch>
+        </p:blipFill>
+        <p:spPr>
+          <a:xfrm>
+            <a:off x="4403715" y="2414786"/>
+            <a:ext cx="3563199" cy="1402834"/>
+          </a:xfrm>
+          <a:prstGeom prst="rect">
+            <a:avLst/>
+          </a:prstGeom>
+        </p:spPr>
+      </p:pic>
+    </p:spTree>
+    <p:extLst>
+      <p:ext uri="{BB962C8B-B14F-4D97-AF65-F5344CB8AC3E}">
+        <p14:creationId xmlns:p14="http://schemas.microsoft.com/office/powerpoint/2010/main" val="305997969"/>
+      </p:ext>
+    </p:extLst>
+  </p:cSld>
+  <p:clrMapOvr>
+    <a:masterClrMapping/>
+  </p:clrMapOvr>
+</p:sld>
+</file>
+
+<file path=ppt/slides/slide24.xml><?xml version="1.0" encoding="utf-8"?>
+<p:sld xmlns:a="http://schemas.openxmlformats.org/drawingml/2006/main" xmlns:r="http://schemas.openxmlformats.org/officeDocument/2006/relationships" xmlns:p="http://schemas.openxmlformats.org/presentationml/2006/main">
+  <p:cSld>
+    <p:spTree>
+      <p:nvGrpSpPr>
+        <p:cNvPr id="1" name=""/>
+        <p:cNvGrpSpPr/>
+        <p:nvPr/>
+      </p:nvGrpSpPr>
+      <p:grpSpPr>
+        <a:xfrm>
+          <a:off x="0" y="0"/>
+          <a:ext cx="0" cy="0"/>
+          <a:chOff x="0" y="0"/>
+          <a:chExt cx="0" cy="0"/>
+        </a:xfrm>
+      </p:grpSpPr>
+      <p:sp>
+        <p:nvSpPr>
+          <p:cNvPr id="2" name="Título 1">
+            <a:extLst>
+              <a:ext uri="{FF2B5EF4-FFF2-40B4-BE49-F238E27FC236}">
+                <a16:creationId xmlns:a16="http://schemas.microsoft.com/office/drawing/2014/main" id="{4549A9CF-9A04-0D0B-3F38-47569BAC879F}"/>
+              </a:ext>
+            </a:extLst>
+          </p:cNvPr>
+          <p:cNvSpPr>
+            <a:spLocks noGrp="1"/>
+          </p:cNvSpPr>
+          <p:nvPr>
+            <p:ph type="title"/>
+          </p:nvPr>
+        </p:nvSpPr>
+        <p:spPr/>
+        <p:txBody>
+          <a:bodyPr/>
+          <a:lstStyle/>
+          <a:p>
+            <a:r>
+              <a:rPr lang="pt-BR" dirty="0"/>
+              <a:t>Determinar o numero </a:t>
+            </a:r>
+            <a:br>
+              <a:rPr lang="pt-BR" dirty="0"/>
+            </a:br>
+            <a:r>
+              <a:rPr lang="pt-BR" dirty="0"/>
+              <a:t>ideal de clusters</a:t>
+            </a:r>
+          </a:p>
+        </p:txBody>
+      </p:sp>
+      <p:sp>
+        <p:nvSpPr>
+          <p:cNvPr id="3" name="Espaço Reservado para Conteúdo 2">
+            <a:extLst>
+              <a:ext uri="{FF2B5EF4-FFF2-40B4-BE49-F238E27FC236}">
+                <a16:creationId xmlns:a16="http://schemas.microsoft.com/office/drawing/2014/main" id="{EC2E1DDA-B549-8F9D-BA64-18BAFB4D49A1}"/>
+              </a:ext>
+            </a:extLst>
+          </p:cNvPr>
+          <p:cNvSpPr>
+            <a:spLocks noGrp="1"/>
+          </p:cNvSpPr>
+          <p:nvPr>
+            <p:ph idx="1"/>
+          </p:nvPr>
+        </p:nvSpPr>
+        <p:spPr>
+          <a:xfrm>
+            <a:off x="838201" y="1812395"/>
+            <a:ext cx="10923269" cy="4351338"/>
+          </a:xfrm>
+        </p:spPr>
+        <p:txBody>
+          <a:bodyPr>
+            <a:normAutofit/>
+          </a:bodyPr>
+          <a:lstStyle/>
+          <a:p>
+            <a:pPr algn="just"/>
+            <a:r>
+              <a:rPr lang="pt-BR" dirty="0"/>
+              <a:t>Utilização do algoritmo </a:t>
+            </a:r>
+            <a:r>
+              <a:rPr lang="pt-BR" i="1" dirty="0" err="1"/>
+              <a:t>optimal</a:t>
+            </a:r>
+            <a:r>
+              <a:rPr lang="pt-BR" i="1" dirty="0"/>
+              <a:t> </a:t>
+            </a:r>
+            <a:r>
+              <a:rPr lang="pt-BR" i="1" dirty="0" err="1"/>
+              <a:t>number</a:t>
+            </a:r>
+            <a:r>
+              <a:rPr lang="pt-BR" i="1" dirty="0"/>
+              <a:t> </a:t>
+            </a:r>
+            <a:r>
+              <a:rPr lang="pt-BR" i="1" dirty="0" err="1"/>
+              <a:t>of</a:t>
+            </a:r>
+            <a:r>
+              <a:rPr lang="pt-BR" i="1" dirty="0"/>
+              <a:t> cluster </a:t>
+            </a:r>
+            <a:r>
+              <a:rPr lang="pt-BR" i="1" dirty="0" err="1"/>
+              <a:t>determination</a:t>
+            </a:r>
+            <a:r>
+              <a:rPr lang="pt-BR" dirty="0"/>
+              <a:t> (ONCD)</a:t>
+            </a:r>
+          </a:p>
+          <a:p>
+            <a:pPr algn="just"/>
+            <a:r>
+              <a:rPr lang="pt-BR" dirty="0"/>
+              <a:t>Etapas do algoritmo</a:t>
+            </a:r>
+          </a:p>
+          <a:p>
+            <a:pPr marL="0" indent="0" algn="just">
+              <a:buNone/>
+            </a:pPr>
+            <a:endParaRPr lang="pt-BR" dirty="0"/>
+          </a:p>
+          <a:p>
+            <a:pPr marL="914400" lvl="1" indent="-457200" algn="just">
+              <a:buFont typeface="+mj-lt"/>
+              <a:buAutoNum type="arabicPeriod"/>
+            </a:pPr>
+            <a:r>
+              <a:rPr lang="pt-BR" dirty="0"/>
+              <a:t>Criar uma árvore hierárquica de cluster</a:t>
+            </a:r>
+          </a:p>
+          <a:p>
+            <a:pPr marL="914400" lvl="1" indent="-457200" algn="just">
+              <a:buFont typeface="+mj-lt"/>
+              <a:buAutoNum type="arabicPeriod"/>
+            </a:pPr>
+            <a:r>
+              <a:rPr lang="pt-BR" dirty="0"/>
+              <a:t>Construir clusters a partir da árvore hierárquica de clusters</a:t>
+            </a:r>
+          </a:p>
+          <a:p>
+            <a:pPr marL="457200" lvl="1" indent="0" algn="just">
+              <a:buNone/>
+            </a:pPr>
+            <a:endParaRPr lang="pt-BR" dirty="0"/>
+          </a:p>
+          <a:p>
+            <a:pPr marL="914400" lvl="2" indent="0" algn="just">
+              <a:buNone/>
+            </a:pPr>
+            <a:r>
+              <a:rPr lang="pt-BR" dirty="0"/>
+              <a:t>	</a:t>
+            </a:r>
+            <a:r>
+              <a:rPr lang="pt-BR" sz="2400" dirty="0"/>
+              <a:t>Cálculo do peso </a:t>
+            </a:r>
+            <a:r>
+              <a:rPr lang="pt-BR" sz="2400" b="1" i="1" dirty="0"/>
+              <a:t>W(</a:t>
+            </a:r>
+            <a:r>
+              <a:rPr lang="pt-BR" sz="2400" b="1" i="1" dirty="0" err="1"/>
+              <a:t>Gi</a:t>
+            </a:r>
+            <a:r>
+              <a:rPr lang="pt-BR" sz="2400" b="1" i="1" dirty="0"/>
+              <a:t>)</a:t>
+            </a:r>
+            <a:r>
+              <a:rPr lang="pt-BR" sz="2400" dirty="0"/>
+              <a:t> da AGM de todas as amostras do i-</a:t>
+            </a:r>
+            <a:r>
+              <a:rPr lang="pt-BR" sz="2400" dirty="0" err="1"/>
+              <a:t>ésimo</a:t>
+            </a:r>
+            <a:r>
+              <a:rPr lang="pt-BR" sz="2400" dirty="0"/>
+              <a:t> cluster</a:t>
+            </a:r>
+          </a:p>
+          <a:p>
+            <a:pPr marL="914400" lvl="2" indent="0" algn="just">
+              <a:buNone/>
+            </a:pPr>
+            <a:r>
+              <a:rPr lang="pt-BR" sz="2400" dirty="0"/>
+              <a:t>	Cálculo da separação </a:t>
+            </a:r>
+            <a:r>
+              <a:rPr lang="pt-BR" sz="2400" dirty="0" err="1"/>
+              <a:t>intercluster</a:t>
+            </a:r>
+            <a:r>
+              <a:rPr lang="pt-BR" sz="2400" dirty="0"/>
+              <a:t> </a:t>
+            </a:r>
+            <a:r>
+              <a:rPr lang="pt-BR" sz="2400" b="1" i="1" dirty="0"/>
+              <a:t>SD(i) </a:t>
+            </a:r>
+          </a:p>
+          <a:p>
+            <a:pPr algn="just"/>
+            <a:endParaRPr lang="pt-BR" dirty="0"/>
+          </a:p>
+          <a:p>
+            <a:pPr algn="just"/>
+            <a:endParaRPr lang="pt-BR" dirty="0"/>
+          </a:p>
+        </p:txBody>
+      </p:sp>
+      <p:pic>
+        <p:nvPicPr>
+          <p:cNvPr id="4" name="Picture 2" descr="Local do Evento | SBRC 2021 - Simpósio Brasileiro de Redes ...">
+            <a:extLst>
+              <a:ext uri="{FF2B5EF4-FFF2-40B4-BE49-F238E27FC236}">
+                <a16:creationId xmlns:a16="http://schemas.microsoft.com/office/drawing/2014/main" id="{C4BAF076-983A-267F-65B0-779489FA3886}"/>
+              </a:ext>
+            </a:extLst>
+          </p:cNvPr>
+          <p:cNvPicPr>
+            <a:picLocks noChangeAspect="1" noChangeArrowheads="1"/>
+          </p:cNvPicPr>
+          <p:nvPr/>
+        </p:nvPicPr>
+        <p:blipFill>
+          <a:blip r:embed="rId3">
+            <a:extLst>
+              <a:ext uri="{28A0092B-C50C-407E-A947-70E740481C1C}">
+                <a14:useLocalDpi xmlns:a14="http://schemas.microsoft.com/office/drawing/2010/main" val="0"/>
+              </a:ext>
+            </a:extLst>
+          </a:blip>
+          <a:srcRect/>
+          <a:stretch>
+            <a:fillRect/>
+          </a:stretch>
+        </p:blipFill>
+        <p:spPr bwMode="auto">
+          <a:xfrm>
+            <a:off x="8783783" y="0"/>
+            <a:ext cx="3408217" cy="1388533"/>
+          </a:xfrm>
+          <a:prstGeom prst="rect">
+            <a:avLst/>
+          </a:prstGeom>
+          <a:noFill/>
+          <a:extLst>
+            <a:ext uri="{909E8E84-426E-40DD-AFC4-6F175D3DCCD1}">
+              <a14:hiddenFill xmlns:a14="http://schemas.microsoft.com/office/drawing/2010/main">
+                <a:solidFill>
+                  <a:srgbClr val="FFFFFF"/>
+                </a:solidFill>
+              </a14:hiddenFill>
+            </a:ext>
+          </a:extLst>
+        </p:spPr>
+      </p:pic>
+      <p:pic>
+        <p:nvPicPr>
+          <p:cNvPr id="5" name="Picture 4" descr="Edições Anteriores | SBRC 2021 - Simpósio Brasileiro de Redes de  Computadores e Sistemas Distribuídos">
+            <a:extLst>
+              <a:ext uri="{FF2B5EF4-FFF2-40B4-BE49-F238E27FC236}">
+                <a16:creationId xmlns:a16="http://schemas.microsoft.com/office/drawing/2014/main" id="{EE629CB4-DE61-E1C8-0777-7BFAD2ACB3C1}"/>
+              </a:ext>
+            </a:extLst>
+          </p:cNvPr>
+          <p:cNvPicPr>
+            <a:picLocks noChangeAspect="1" noChangeArrowheads="1"/>
+          </p:cNvPicPr>
+          <p:nvPr/>
+        </p:nvPicPr>
+        <p:blipFill rotWithShape="1">
+          <a:blip r:embed="rId4">
+            <a:extLst>
+              <a:ext uri="{28A0092B-C50C-407E-A947-70E740481C1C}">
+                <a14:useLocalDpi xmlns:a14="http://schemas.microsoft.com/office/drawing/2010/main" val="0"/>
+              </a:ext>
+            </a:extLst>
+          </a:blip>
+          <a:srcRect l="18938" t="24085"/>
+          <a:stretch/>
+        </p:blipFill>
+        <p:spPr bwMode="auto">
+          <a:xfrm>
+            <a:off x="259976" y="5803900"/>
+            <a:ext cx="2762759" cy="1054100"/>
+          </a:xfrm>
+          <a:prstGeom prst="rect">
+            <a:avLst/>
+          </a:prstGeom>
+          <a:noFill/>
+          <a:extLst>
+            <a:ext uri="{909E8E84-426E-40DD-AFC4-6F175D3DCCD1}">
+              <a14:hiddenFill xmlns:a14="http://schemas.microsoft.com/office/drawing/2010/main">
+                <a:solidFill>
+                  <a:srgbClr val="FFFFFF"/>
+                </a:solidFill>
+              </a14:hiddenFill>
+            </a:ext>
+          </a:extLst>
+        </p:spPr>
+      </p:pic>
+      <p:cxnSp>
+        <p:nvCxnSpPr>
+          <p:cNvPr id="6" name="Conector de Seta Reta 5">
+            <a:extLst>
+              <a:ext uri="{FF2B5EF4-FFF2-40B4-BE49-F238E27FC236}">
+                <a16:creationId xmlns:a16="http://schemas.microsoft.com/office/drawing/2014/main" id="{D662B01F-9556-7F26-FB47-16DC1B6314C8}"/>
+              </a:ext>
+            </a:extLst>
+          </p:cNvPr>
+          <p:cNvCxnSpPr>
+            <a:cxnSpLocks/>
+          </p:cNvCxnSpPr>
+          <p:nvPr/>
+        </p:nvCxnSpPr>
+        <p:spPr>
+          <a:xfrm>
+            <a:off x="2034540" y="4703025"/>
+            <a:ext cx="567997" cy="0"/>
+          </a:xfrm>
+          <a:prstGeom prst="straightConnector1">
+            <a:avLst/>
+          </a:prstGeom>
+          <a:ln w="38100">
+            <a:tailEnd type="triangle"/>
+          </a:ln>
+        </p:spPr>
+        <p:style>
+          <a:lnRef idx="1">
+            <a:schemeClr val="dk1"/>
+          </a:lnRef>
+          <a:fillRef idx="0">
+            <a:schemeClr val="dk1"/>
+          </a:fillRef>
+          <a:effectRef idx="0">
+            <a:schemeClr val="dk1"/>
+          </a:effectRef>
+          <a:fontRef idx="minor">
+            <a:schemeClr val="tx1"/>
+          </a:fontRef>
+        </p:style>
+      </p:cxnSp>
+      <p:cxnSp>
+        <p:nvCxnSpPr>
+          <p:cNvPr id="11" name="Conector reto 10">
+            <a:extLst>
+              <a:ext uri="{FF2B5EF4-FFF2-40B4-BE49-F238E27FC236}">
+                <a16:creationId xmlns:a16="http://schemas.microsoft.com/office/drawing/2014/main" id="{FDF97C4F-1E55-1B16-EC55-73164552A079}"/>
+              </a:ext>
+            </a:extLst>
+          </p:cNvPr>
+          <p:cNvCxnSpPr/>
+          <p:nvPr/>
+        </p:nvCxnSpPr>
+        <p:spPr>
+          <a:xfrm flipV="1">
+            <a:off x="2054542" y="4338638"/>
+            <a:ext cx="0" cy="364387"/>
+          </a:xfrm>
+          <a:prstGeom prst="line">
+            <a:avLst/>
+          </a:prstGeom>
+          <a:ln w="38100">
+            <a:solidFill>
+              <a:schemeClr val="tx1"/>
+            </a:solidFill>
+          </a:ln>
+        </p:spPr>
+        <p:style>
+          <a:lnRef idx="1">
+            <a:schemeClr val="dk1"/>
+          </a:lnRef>
+          <a:fillRef idx="0">
+            <a:schemeClr val="dk1"/>
+          </a:fillRef>
+          <a:effectRef idx="0">
+            <a:schemeClr val="dk1"/>
+          </a:effectRef>
+          <a:fontRef idx="minor">
+            <a:schemeClr val="tx1"/>
+          </a:fontRef>
+        </p:style>
+      </p:cxnSp>
+    </p:spTree>
+    <p:extLst>
+      <p:ext uri="{BB962C8B-B14F-4D97-AF65-F5344CB8AC3E}">
+        <p14:creationId xmlns:p14="http://schemas.microsoft.com/office/powerpoint/2010/main" val="2497028157"/>
       </p:ext>
     </p:extLst>
   </p:cSld>
@@ -10653,8 +13427,8 @@
           </a:p>
         </p:txBody>
       </p:sp>
-      <mc:AlternateContent xmlns:mc="http://schemas.openxmlformats.org/markup-compatibility/2006">
-        <mc:Choice xmlns:a14="http://schemas.microsoft.com/office/drawing/2010/main" Requires="a14">
+      <mc:AlternateContent xmlns:mc="http://schemas.openxmlformats.org/markup-compatibility/2006" xmlns:a14="http://schemas.microsoft.com/office/drawing/2010/main">
+        <mc:Choice Requires="a14">
           <p:sp>
             <p:nvSpPr>
               <p:cNvPr id="3" name="Espaço Reservado para Conteúdo 2">
@@ -10908,7 +13682,7 @@
             </p:txBody>
           </p:sp>
         </mc:Choice>
-        <mc:Fallback>
+        <mc:Fallback xmlns="">
           <p:sp>
             <p:nvSpPr>
               <p:cNvPr id="3" name="Espaço Reservado para Conteúdo 2">
@@ -11113,8 +13887,8 @@
           </a:p>
         </p:txBody>
       </p:sp>
-      <mc:AlternateContent xmlns:mc="http://schemas.openxmlformats.org/markup-compatibility/2006">
-        <mc:Choice xmlns:a14="http://schemas.microsoft.com/office/drawing/2010/main" Requires="a14">
+      <mc:AlternateContent xmlns:mc="http://schemas.openxmlformats.org/markup-compatibility/2006" xmlns:a14="http://schemas.microsoft.com/office/drawing/2010/main">
+        <mc:Choice Requires="a14">
           <p:sp>
             <p:nvSpPr>
               <p:cNvPr id="3" name="Espaço Reservado para Conteúdo 2">
@@ -11484,7 +14258,7 @@
             </p:txBody>
           </p:sp>
         </mc:Choice>
-        <mc:Fallback>
+        <mc:Fallback xmlns="">
           <p:sp>
             <p:nvSpPr>
               <p:cNvPr id="3" name="Espaço Reservado para Conteúdo 2">

</xml_diff>

<commit_message>
Atualização dos slides de seminarios 06/05
</commit_message>
<xml_diff>
--- a/Seminario/optimal clusters - SLIDES.pptx
+++ b/Seminario/optimal clusters - SLIDES.pptx
@@ -5,7 +5,7 @@
     <p:sldMasterId id="2147483648" r:id="rId1"/>
   </p:sldMasterIdLst>
   <p:notesMasterIdLst>
-    <p:notesMasterId r:id="rId32"/>
+    <p:notesMasterId r:id="rId40"/>
   </p:notesMasterIdLst>
   <p:sldIdLst>
     <p:sldId id="256" r:id="rId2"/>
@@ -33,11 +33,19 @@
     <p:sldId id="287" r:id="rId24"/>
     <p:sldId id="288" r:id="rId25"/>
     <p:sldId id="292" r:id="rId26"/>
-    <p:sldId id="289" r:id="rId27"/>
-    <p:sldId id="290" r:id="rId28"/>
-    <p:sldId id="291" r:id="rId29"/>
-    <p:sldId id="293" r:id="rId30"/>
+    <p:sldId id="295" r:id="rId27"/>
+    <p:sldId id="289" r:id="rId28"/>
+    <p:sldId id="290" r:id="rId29"/>
+    <p:sldId id="291" r:id="rId30"/>
     <p:sldId id="294" r:id="rId31"/>
+    <p:sldId id="296" r:id="rId32"/>
+    <p:sldId id="297" r:id="rId33"/>
+    <p:sldId id="298" r:id="rId34"/>
+    <p:sldId id="300" r:id="rId35"/>
+    <p:sldId id="302" r:id="rId36"/>
+    <p:sldId id="304" r:id="rId37"/>
+    <p:sldId id="303" r:id="rId38"/>
+    <p:sldId id="305" r:id="rId39"/>
   </p:sldIdLst>
   <p:sldSz cx="12192000" cy="6858000"/>
   <p:notesSz cx="6858000" cy="9144000"/>
@@ -226,7 +234,7 @@
           <a:p>
             <a:fld id="{C27D85D0-8849-4E53-AC47-0B98F7A07F37}" type="datetimeFigureOut">
               <a:rPr lang="pt-BR" smtClean="0"/>
-              <a:t>01/05/2024</a:t>
+              <a:t>06/05/2024</a:t>
             </a:fld>
             <a:endParaRPr lang="pt-BR"/>
           </a:p>
@@ -2355,7 +2363,7 @@
     </p:spTree>
     <p:extLst>
       <p:ext uri="{BB962C8B-B14F-4D97-AF65-F5344CB8AC3E}">
-        <p14:creationId xmlns:p14="http://schemas.microsoft.com/office/powerpoint/2010/main" val="1474958269"/>
+        <p14:creationId xmlns:p14="http://schemas.microsoft.com/office/powerpoint/2010/main" val="3982169743"/>
       </p:ext>
     </p:extLst>
   </p:cSld>
@@ -2458,7 +2466,7 @@
     </p:spTree>
     <p:extLst>
       <p:ext uri="{BB962C8B-B14F-4D97-AF65-F5344CB8AC3E}">
-        <p14:creationId xmlns:p14="http://schemas.microsoft.com/office/powerpoint/2010/main" val="3546572164"/>
+        <p14:creationId xmlns:p14="http://schemas.microsoft.com/office/powerpoint/2010/main" val="1474958269"/>
       </p:ext>
     </p:extLst>
   </p:cSld>
@@ -2561,7 +2569,7 @@
     </p:spTree>
     <p:extLst>
       <p:ext uri="{BB962C8B-B14F-4D97-AF65-F5344CB8AC3E}">
-        <p14:creationId xmlns:p14="http://schemas.microsoft.com/office/powerpoint/2010/main" val="296031340"/>
+        <p14:creationId xmlns:p14="http://schemas.microsoft.com/office/powerpoint/2010/main" val="3546572164"/>
       </p:ext>
     </p:extLst>
   </p:cSld>
@@ -2664,7 +2672,7 @@
     </p:spTree>
     <p:extLst>
       <p:ext uri="{BB962C8B-B14F-4D97-AF65-F5344CB8AC3E}">
-        <p14:creationId xmlns:p14="http://schemas.microsoft.com/office/powerpoint/2010/main" val="3409394794"/>
+        <p14:creationId xmlns:p14="http://schemas.microsoft.com/office/powerpoint/2010/main" val="296031340"/>
       </p:ext>
     </p:extLst>
   </p:cSld>
@@ -2852,6 +2860,830 @@
     <p:extLst>
       <p:ext uri="{BB962C8B-B14F-4D97-AF65-F5344CB8AC3E}">
         <p14:creationId xmlns:p14="http://schemas.microsoft.com/office/powerpoint/2010/main" val="2942311743"/>
+      </p:ext>
+    </p:extLst>
+  </p:cSld>
+  <p:clrMapOvr>
+    <a:masterClrMapping/>
+  </p:clrMapOvr>
+</p:notes>
+</file>
+
+<file path=ppt/notesSlides/notesSlide30.xml><?xml version="1.0" encoding="utf-8"?>
+<p:notes xmlns:a="http://schemas.openxmlformats.org/drawingml/2006/main" xmlns:r="http://schemas.openxmlformats.org/officeDocument/2006/relationships" xmlns:p="http://schemas.openxmlformats.org/presentationml/2006/main">
+  <p:cSld>
+    <p:spTree>
+      <p:nvGrpSpPr>
+        <p:cNvPr id="1" name=""/>
+        <p:cNvGrpSpPr/>
+        <p:nvPr/>
+      </p:nvGrpSpPr>
+      <p:grpSpPr>
+        <a:xfrm>
+          <a:off x="0" y="0"/>
+          <a:ext cx="0" cy="0"/>
+          <a:chOff x="0" y="0"/>
+          <a:chExt cx="0" cy="0"/>
+        </a:xfrm>
+      </p:grpSpPr>
+      <p:sp>
+        <p:nvSpPr>
+          <p:cNvPr id="2" name="Espaço Reservado para Imagem de Slide 1"/>
+          <p:cNvSpPr>
+            <a:spLocks noGrp="1" noRot="1" noChangeAspect="1"/>
+          </p:cNvSpPr>
+          <p:nvPr>
+            <p:ph type="sldImg"/>
+          </p:nvPr>
+        </p:nvSpPr>
+        <p:spPr/>
+      </p:sp>
+      <p:sp>
+        <p:nvSpPr>
+          <p:cNvPr id="3" name="Espaço Reservado para Anotações 2"/>
+          <p:cNvSpPr>
+            <a:spLocks noGrp="1"/>
+          </p:cNvSpPr>
+          <p:nvPr>
+            <p:ph type="body" idx="1"/>
+          </p:nvPr>
+        </p:nvSpPr>
+        <p:spPr/>
+        <p:txBody>
+          <a:bodyPr/>
+          <a:lstStyle/>
+          <a:p>
+            <a:r>
+              <a:rPr lang="pt-BR" dirty="0"/>
+              <a:t>Os procedimentos </a:t>
+            </a:r>
+            <a:r>
+              <a:rPr lang="pt-BR" dirty="0" err="1"/>
+              <a:t>aglomerativos</a:t>
+            </a:r>
+            <a:r>
+              <a:rPr lang="pt-BR" dirty="0"/>
+              <a:t> começam com n clusters </a:t>
+            </a:r>
+            <a:r>
+              <a:rPr lang="pt-BR" dirty="0" err="1"/>
+              <a:t>singleton</a:t>
+            </a:r>
+            <a:r>
+              <a:rPr lang="pt-BR" dirty="0"/>
+              <a:t> e, em seguida, formam uma sequência mesclando clusters sucessivamente</a:t>
+            </a:r>
+          </a:p>
+        </p:txBody>
+      </p:sp>
+      <p:sp>
+        <p:nvSpPr>
+          <p:cNvPr id="4" name="Espaço Reservado para Número de Slide 3"/>
+          <p:cNvSpPr>
+            <a:spLocks noGrp="1"/>
+          </p:cNvSpPr>
+          <p:nvPr>
+            <p:ph type="sldNum" sz="quarter" idx="5"/>
+          </p:nvPr>
+        </p:nvSpPr>
+        <p:spPr/>
+        <p:txBody>
+          <a:bodyPr/>
+          <a:lstStyle/>
+          <a:p>
+            <a:fld id="{5E0A5BA6-946D-4582-8BDA-25D6682E6A6A}" type="slidenum">
+              <a:rPr lang="pt-BR" smtClean="0"/>
+              <a:t>31</a:t>
+            </a:fld>
+            <a:endParaRPr lang="pt-BR"/>
+          </a:p>
+        </p:txBody>
+      </p:sp>
+    </p:spTree>
+    <p:extLst>
+      <p:ext uri="{BB962C8B-B14F-4D97-AF65-F5344CB8AC3E}">
+        <p14:creationId xmlns:p14="http://schemas.microsoft.com/office/powerpoint/2010/main" val="518639076"/>
+      </p:ext>
+    </p:extLst>
+  </p:cSld>
+  <p:clrMapOvr>
+    <a:masterClrMapping/>
+  </p:clrMapOvr>
+</p:notes>
+</file>
+
+<file path=ppt/notesSlides/notesSlide31.xml><?xml version="1.0" encoding="utf-8"?>
+<p:notes xmlns:a="http://schemas.openxmlformats.org/drawingml/2006/main" xmlns:r="http://schemas.openxmlformats.org/officeDocument/2006/relationships" xmlns:p="http://schemas.openxmlformats.org/presentationml/2006/main">
+  <p:cSld>
+    <p:spTree>
+      <p:nvGrpSpPr>
+        <p:cNvPr id="1" name=""/>
+        <p:cNvGrpSpPr/>
+        <p:nvPr/>
+      </p:nvGrpSpPr>
+      <p:grpSpPr>
+        <a:xfrm>
+          <a:off x="0" y="0"/>
+          <a:ext cx="0" cy="0"/>
+          <a:chOff x="0" y="0"/>
+          <a:chExt cx="0" cy="0"/>
+        </a:xfrm>
+      </p:grpSpPr>
+      <p:sp>
+        <p:nvSpPr>
+          <p:cNvPr id="2" name="Espaço Reservado para Imagem de Slide 1"/>
+          <p:cNvSpPr>
+            <a:spLocks noGrp="1" noRot="1" noChangeAspect="1"/>
+          </p:cNvSpPr>
+          <p:nvPr>
+            <p:ph type="sldImg"/>
+          </p:nvPr>
+        </p:nvSpPr>
+        <p:spPr/>
+      </p:sp>
+      <p:sp>
+        <p:nvSpPr>
+          <p:cNvPr id="3" name="Espaço Reservado para Anotações 2"/>
+          <p:cNvSpPr>
+            <a:spLocks noGrp="1"/>
+          </p:cNvSpPr>
+          <p:nvPr>
+            <p:ph type="body" idx="1"/>
+          </p:nvPr>
+        </p:nvSpPr>
+        <p:spPr/>
+        <p:txBody>
+          <a:bodyPr/>
+          <a:lstStyle/>
+          <a:p>
+            <a:r>
+              <a:rPr lang="pt-BR" dirty="0"/>
+              <a:t>Os procedimentos </a:t>
+            </a:r>
+            <a:r>
+              <a:rPr lang="pt-BR" dirty="0" err="1"/>
+              <a:t>aglomerativos</a:t>
+            </a:r>
+            <a:r>
+              <a:rPr lang="pt-BR" dirty="0"/>
+              <a:t> começam com n clusters </a:t>
+            </a:r>
+            <a:r>
+              <a:rPr lang="pt-BR" dirty="0" err="1"/>
+              <a:t>singleton</a:t>
+            </a:r>
+            <a:r>
+              <a:rPr lang="pt-BR" dirty="0"/>
+              <a:t> e, em seguida, formam uma sequência mesclando clusters sucessivamente</a:t>
+            </a:r>
+          </a:p>
+        </p:txBody>
+      </p:sp>
+      <p:sp>
+        <p:nvSpPr>
+          <p:cNvPr id="4" name="Espaço Reservado para Número de Slide 3"/>
+          <p:cNvSpPr>
+            <a:spLocks noGrp="1"/>
+          </p:cNvSpPr>
+          <p:nvPr>
+            <p:ph type="sldNum" sz="quarter" idx="5"/>
+          </p:nvPr>
+        </p:nvSpPr>
+        <p:spPr/>
+        <p:txBody>
+          <a:bodyPr/>
+          <a:lstStyle/>
+          <a:p>
+            <a:fld id="{5E0A5BA6-946D-4582-8BDA-25D6682E6A6A}" type="slidenum">
+              <a:rPr lang="pt-BR" smtClean="0"/>
+              <a:t>32</a:t>
+            </a:fld>
+            <a:endParaRPr lang="pt-BR"/>
+          </a:p>
+        </p:txBody>
+      </p:sp>
+    </p:spTree>
+    <p:extLst>
+      <p:ext uri="{BB962C8B-B14F-4D97-AF65-F5344CB8AC3E}">
+        <p14:creationId xmlns:p14="http://schemas.microsoft.com/office/powerpoint/2010/main" val="3366420767"/>
+      </p:ext>
+    </p:extLst>
+  </p:cSld>
+  <p:clrMapOvr>
+    <a:masterClrMapping/>
+  </p:clrMapOvr>
+</p:notes>
+</file>
+
+<file path=ppt/notesSlides/notesSlide32.xml><?xml version="1.0" encoding="utf-8"?>
+<p:notes xmlns:a="http://schemas.openxmlformats.org/drawingml/2006/main" xmlns:r="http://schemas.openxmlformats.org/officeDocument/2006/relationships" xmlns:p="http://schemas.openxmlformats.org/presentationml/2006/main">
+  <p:cSld>
+    <p:spTree>
+      <p:nvGrpSpPr>
+        <p:cNvPr id="1" name=""/>
+        <p:cNvGrpSpPr/>
+        <p:nvPr/>
+      </p:nvGrpSpPr>
+      <p:grpSpPr>
+        <a:xfrm>
+          <a:off x="0" y="0"/>
+          <a:ext cx="0" cy="0"/>
+          <a:chOff x="0" y="0"/>
+          <a:chExt cx="0" cy="0"/>
+        </a:xfrm>
+      </p:grpSpPr>
+      <p:sp>
+        <p:nvSpPr>
+          <p:cNvPr id="2" name="Espaço Reservado para Imagem de Slide 1"/>
+          <p:cNvSpPr>
+            <a:spLocks noGrp="1" noRot="1" noChangeAspect="1"/>
+          </p:cNvSpPr>
+          <p:nvPr>
+            <p:ph type="sldImg"/>
+          </p:nvPr>
+        </p:nvSpPr>
+        <p:spPr/>
+      </p:sp>
+      <p:sp>
+        <p:nvSpPr>
+          <p:cNvPr id="3" name="Espaço Reservado para Anotações 2"/>
+          <p:cNvSpPr>
+            <a:spLocks noGrp="1"/>
+          </p:cNvSpPr>
+          <p:nvPr>
+            <p:ph type="body" idx="1"/>
+          </p:nvPr>
+        </p:nvSpPr>
+        <p:spPr/>
+        <p:txBody>
+          <a:bodyPr/>
+          <a:lstStyle/>
+          <a:p>
+            <a:r>
+              <a:rPr lang="pt-BR" dirty="0"/>
+              <a:t>Os procedimentos </a:t>
+            </a:r>
+            <a:r>
+              <a:rPr lang="pt-BR" dirty="0" err="1"/>
+              <a:t>aglomerativos</a:t>
+            </a:r>
+            <a:r>
+              <a:rPr lang="pt-BR" dirty="0"/>
+              <a:t> começam com n clusters </a:t>
+            </a:r>
+            <a:r>
+              <a:rPr lang="pt-BR" dirty="0" err="1"/>
+              <a:t>singleton</a:t>
+            </a:r>
+            <a:r>
+              <a:rPr lang="pt-BR" dirty="0"/>
+              <a:t> e, em seguida, formam uma sequência mesclando clusters sucessivamente</a:t>
+            </a:r>
+          </a:p>
+        </p:txBody>
+      </p:sp>
+      <p:sp>
+        <p:nvSpPr>
+          <p:cNvPr id="4" name="Espaço Reservado para Número de Slide 3"/>
+          <p:cNvSpPr>
+            <a:spLocks noGrp="1"/>
+          </p:cNvSpPr>
+          <p:nvPr>
+            <p:ph type="sldNum" sz="quarter" idx="5"/>
+          </p:nvPr>
+        </p:nvSpPr>
+        <p:spPr/>
+        <p:txBody>
+          <a:bodyPr/>
+          <a:lstStyle/>
+          <a:p>
+            <a:fld id="{5E0A5BA6-946D-4582-8BDA-25D6682E6A6A}" type="slidenum">
+              <a:rPr lang="pt-BR" smtClean="0"/>
+              <a:t>33</a:t>
+            </a:fld>
+            <a:endParaRPr lang="pt-BR"/>
+          </a:p>
+        </p:txBody>
+      </p:sp>
+    </p:spTree>
+    <p:extLst>
+      <p:ext uri="{BB962C8B-B14F-4D97-AF65-F5344CB8AC3E}">
+        <p14:creationId xmlns:p14="http://schemas.microsoft.com/office/powerpoint/2010/main" val="691202473"/>
+      </p:ext>
+    </p:extLst>
+  </p:cSld>
+  <p:clrMapOvr>
+    <a:masterClrMapping/>
+  </p:clrMapOvr>
+</p:notes>
+</file>
+
+<file path=ppt/notesSlides/notesSlide33.xml><?xml version="1.0" encoding="utf-8"?>
+<p:notes xmlns:a="http://schemas.openxmlformats.org/drawingml/2006/main" xmlns:r="http://schemas.openxmlformats.org/officeDocument/2006/relationships" xmlns:p="http://schemas.openxmlformats.org/presentationml/2006/main">
+  <p:cSld>
+    <p:spTree>
+      <p:nvGrpSpPr>
+        <p:cNvPr id="1" name=""/>
+        <p:cNvGrpSpPr/>
+        <p:nvPr/>
+      </p:nvGrpSpPr>
+      <p:grpSpPr>
+        <a:xfrm>
+          <a:off x="0" y="0"/>
+          <a:ext cx="0" cy="0"/>
+          <a:chOff x="0" y="0"/>
+          <a:chExt cx="0" cy="0"/>
+        </a:xfrm>
+      </p:grpSpPr>
+      <p:sp>
+        <p:nvSpPr>
+          <p:cNvPr id="2" name="Espaço Reservado para Imagem de Slide 1"/>
+          <p:cNvSpPr>
+            <a:spLocks noGrp="1" noRot="1" noChangeAspect="1"/>
+          </p:cNvSpPr>
+          <p:nvPr>
+            <p:ph type="sldImg"/>
+          </p:nvPr>
+        </p:nvSpPr>
+        <p:spPr/>
+      </p:sp>
+      <p:sp>
+        <p:nvSpPr>
+          <p:cNvPr id="3" name="Espaço Reservado para Anotações 2"/>
+          <p:cNvSpPr>
+            <a:spLocks noGrp="1"/>
+          </p:cNvSpPr>
+          <p:nvPr>
+            <p:ph type="body" idx="1"/>
+          </p:nvPr>
+        </p:nvSpPr>
+        <p:spPr/>
+        <p:txBody>
+          <a:bodyPr/>
+          <a:lstStyle/>
+          <a:p>
+            <a:r>
+              <a:rPr lang="pt-BR" dirty="0"/>
+              <a:t>Os procedimentos </a:t>
+            </a:r>
+            <a:r>
+              <a:rPr lang="pt-BR" dirty="0" err="1"/>
+              <a:t>aglomerativos</a:t>
+            </a:r>
+            <a:r>
+              <a:rPr lang="pt-BR" dirty="0"/>
+              <a:t> começam com n clusters </a:t>
+            </a:r>
+            <a:r>
+              <a:rPr lang="pt-BR" dirty="0" err="1"/>
+              <a:t>singleton</a:t>
+            </a:r>
+            <a:r>
+              <a:rPr lang="pt-BR" dirty="0"/>
+              <a:t> e, em seguida, formam uma sequência mesclando clusters sucessivamente</a:t>
+            </a:r>
+          </a:p>
+        </p:txBody>
+      </p:sp>
+      <p:sp>
+        <p:nvSpPr>
+          <p:cNvPr id="4" name="Espaço Reservado para Número de Slide 3"/>
+          <p:cNvSpPr>
+            <a:spLocks noGrp="1"/>
+          </p:cNvSpPr>
+          <p:nvPr>
+            <p:ph type="sldNum" sz="quarter" idx="5"/>
+          </p:nvPr>
+        </p:nvSpPr>
+        <p:spPr/>
+        <p:txBody>
+          <a:bodyPr/>
+          <a:lstStyle/>
+          <a:p>
+            <a:fld id="{5E0A5BA6-946D-4582-8BDA-25D6682E6A6A}" type="slidenum">
+              <a:rPr lang="pt-BR" smtClean="0"/>
+              <a:t>34</a:t>
+            </a:fld>
+            <a:endParaRPr lang="pt-BR"/>
+          </a:p>
+        </p:txBody>
+      </p:sp>
+    </p:spTree>
+    <p:extLst>
+      <p:ext uri="{BB962C8B-B14F-4D97-AF65-F5344CB8AC3E}">
+        <p14:creationId xmlns:p14="http://schemas.microsoft.com/office/powerpoint/2010/main" val="4023659816"/>
+      </p:ext>
+    </p:extLst>
+  </p:cSld>
+  <p:clrMapOvr>
+    <a:masterClrMapping/>
+  </p:clrMapOvr>
+</p:notes>
+</file>
+
+<file path=ppt/notesSlides/notesSlide34.xml><?xml version="1.0" encoding="utf-8"?>
+<p:notes xmlns:a="http://schemas.openxmlformats.org/drawingml/2006/main" xmlns:r="http://schemas.openxmlformats.org/officeDocument/2006/relationships" xmlns:p="http://schemas.openxmlformats.org/presentationml/2006/main">
+  <p:cSld>
+    <p:spTree>
+      <p:nvGrpSpPr>
+        <p:cNvPr id="1" name=""/>
+        <p:cNvGrpSpPr/>
+        <p:nvPr/>
+      </p:nvGrpSpPr>
+      <p:grpSpPr>
+        <a:xfrm>
+          <a:off x="0" y="0"/>
+          <a:ext cx="0" cy="0"/>
+          <a:chOff x="0" y="0"/>
+          <a:chExt cx="0" cy="0"/>
+        </a:xfrm>
+      </p:grpSpPr>
+      <p:sp>
+        <p:nvSpPr>
+          <p:cNvPr id="2" name="Espaço Reservado para Imagem de Slide 1"/>
+          <p:cNvSpPr>
+            <a:spLocks noGrp="1" noRot="1" noChangeAspect="1"/>
+          </p:cNvSpPr>
+          <p:nvPr>
+            <p:ph type="sldImg"/>
+          </p:nvPr>
+        </p:nvSpPr>
+        <p:spPr/>
+      </p:sp>
+      <p:sp>
+        <p:nvSpPr>
+          <p:cNvPr id="3" name="Espaço Reservado para Anotações 2"/>
+          <p:cNvSpPr>
+            <a:spLocks noGrp="1"/>
+          </p:cNvSpPr>
+          <p:nvPr>
+            <p:ph type="body" idx="1"/>
+          </p:nvPr>
+        </p:nvSpPr>
+        <p:spPr/>
+        <p:txBody>
+          <a:bodyPr/>
+          <a:lstStyle/>
+          <a:p>
+            <a:r>
+              <a:rPr lang="pt-BR" dirty="0"/>
+              <a:t>Os procedimentos </a:t>
+            </a:r>
+            <a:r>
+              <a:rPr lang="pt-BR" dirty="0" err="1"/>
+              <a:t>aglomerativos</a:t>
+            </a:r>
+            <a:r>
+              <a:rPr lang="pt-BR" dirty="0"/>
+              <a:t> começam com n clusters </a:t>
+            </a:r>
+            <a:r>
+              <a:rPr lang="pt-BR" dirty="0" err="1"/>
+              <a:t>singleton</a:t>
+            </a:r>
+            <a:r>
+              <a:rPr lang="pt-BR" dirty="0"/>
+              <a:t> e, em seguida, formam uma sequência mesclando clusters sucessivamente</a:t>
+            </a:r>
+          </a:p>
+        </p:txBody>
+      </p:sp>
+      <p:sp>
+        <p:nvSpPr>
+          <p:cNvPr id="4" name="Espaço Reservado para Número de Slide 3"/>
+          <p:cNvSpPr>
+            <a:spLocks noGrp="1"/>
+          </p:cNvSpPr>
+          <p:nvPr>
+            <p:ph type="sldNum" sz="quarter" idx="5"/>
+          </p:nvPr>
+        </p:nvSpPr>
+        <p:spPr/>
+        <p:txBody>
+          <a:bodyPr/>
+          <a:lstStyle/>
+          <a:p>
+            <a:fld id="{5E0A5BA6-946D-4582-8BDA-25D6682E6A6A}" type="slidenum">
+              <a:rPr lang="pt-BR" smtClean="0"/>
+              <a:t>35</a:t>
+            </a:fld>
+            <a:endParaRPr lang="pt-BR"/>
+          </a:p>
+        </p:txBody>
+      </p:sp>
+    </p:spTree>
+    <p:extLst>
+      <p:ext uri="{BB962C8B-B14F-4D97-AF65-F5344CB8AC3E}">
+        <p14:creationId xmlns:p14="http://schemas.microsoft.com/office/powerpoint/2010/main" val="4147307061"/>
+      </p:ext>
+    </p:extLst>
+  </p:cSld>
+  <p:clrMapOvr>
+    <a:masterClrMapping/>
+  </p:clrMapOvr>
+</p:notes>
+</file>
+
+<file path=ppt/notesSlides/notesSlide35.xml><?xml version="1.0" encoding="utf-8"?>
+<p:notes xmlns:a="http://schemas.openxmlformats.org/drawingml/2006/main" xmlns:r="http://schemas.openxmlformats.org/officeDocument/2006/relationships" xmlns:p="http://schemas.openxmlformats.org/presentationml/2006/main">
+  <p:cSld>
+    <p:spTree>
+      <p:nvGrpSpPr>
+        <p:cNvPr id="1" name=""/>
+        <p:cNvGrpSpPr/>
+        <p:nvPr/>
+      </p:nvGrpSpPr>
+      <p:grpSpPr>
+        <a:xfrm>
+          <a:off x="0" y="0"/>
+          <a:ext cx="0" cy="0"/>
+          <a:chOff x="0" y="0"/>
+          <a:chExt cx="0" cy="0"/>
+        </a:xfrm>
+      </p:grpSpPr>
+      <p:sp>
+        <p:nvSpPr>
+          <p:cNvPr id="2" name="Espaço Reservado para Imagem de Slide 1"/>
+          <p:cNvSpPr>
+            <a:spLocks noGrp="1" noRot="1" noChangeAspect="1"/>
+          </p:cNvSpPr>
+          <p:nvPr>
+            <p:ph type="sldImg"/>
+          </p:nvPr>
+        </p:nvSpPr>
+        <p:spPr/>
+      </p:sp>
+      <p:sp>
+        <p:nvSpPr>
+          <p:cNvPr id="3" name="Espaço Reservado para Anotações 2"/>
+          <p:cNvSpPr>
+            <a:spLocks noGrp="1"/>
+          </p:cNvSpPr>
+          <p:nvPr>
+            <p:ph type="body" idx="1"/>
+          </p:nvPr>
+        </p:nvSpPr>
+        <p:spPr/>
+        <p:txBody>
+          <a:bodyPr/>
+          <a:lstStyle/>
+          <a:p>
+            <a:r>
+              <a:rPr lang="pt-BR" dirty="0"/>
+              <a:t>Os procedimentos </a:t>
+            </a:r>
+            <a:r>
+              <a:rPr lang="pt-BR" dirty="0" err="1"/>
+              <a:t>aglomerativos</a:t>
+            </a:r>
+            <a:r>
+              <a:rPr lang="pt-BR" dirty="0"/>
+              <a:t> começam com n clusters </a:t>
+            </a:r>
+            <a:r>
+              <a:rPr lang="pt-BR" dirty="0" err="1"/>
+              <a:t>singleton</a:t>
+            </a:r>
+            <a:r>
+              <a:rPr lang="pt-BR" dirty="0"/>
+              <a:t> e, em seguida, formam uma sequência mesclando clusters sucessivamente</a:t>
+            </a:r>
+          </a:p>
+        </p:txBody>
+      </p:sp>
+      <p:sp>
+        <p:nvSpPr>
+          <p:cNvPr id="4" name="Espaço Reservado para Número de Slide 3"/>
+          <p:cNvSpPr>
+            <a:spLocks noGrp="1"/>
+          </p:cNvSpPr>
+          <p:nvPr>
+            <p:ph type="sldNum" sz="quarter" idx="5"/>
+          </p:nvPr>
+        </p:nvSpPr>
+        <p:spPr/>
+        <p:txBody>
+          <a:bodyPr/>
+          <a:lstStyle/>
+          <a:p>
+            <a:fld id="{5E0A5BA6-946D-4582-8BDA-25D6682E6A6A}" type="slidenum">
+              <a:rPr lang="pt-BR" smtClean="0"/>
+              <a:t>36</a:t>
+            </a:fld>
+            <a:endParaRPr lang="pt-BR"/>
+          </a:p>
+        </p:txBody>
+      </p:sp>
+    </p:spTree>
+    <p:extLst>
+      <p:ext uri="{BB962C8B-B14F-4D97-AF65-F5344CB8AC3E}">
+        <p14:creationId xmlns:p14="http://schemas.microsoft.com/office/powerpoint/2010/main" val="3643755109"/>
+      </p:ext>
+    </p:extLst>
+  </p:cSld>
+  <p:clrMapOvr>
+    <a:masterClrMapping/>
+  </p:clrMapOvr>
+</p:notes>
+</file>
+
+<file path=ppt/notesSlides/notesSlide36.xml><?xml version="1.0" encoding="utf-8"?>
+<p:notes xmlns:a="http://schemas.openxmlformats.org/drawingml/2006/main" xmlns:r="http://schemas.openxmlformats.org/officeDocument/2006/relationships" xmlns:p="http://schemas.openxmlformats.org/presentationml/2006/main">
+  <p:cSld>
+    <p:spTree>
+      <p:nvGrpSpPr>
+        <p:cNvPr id="1" name=""/>
+        <p:cNvGrpSpPr/>
+        <p:nvPr/>
+      </p:nvGrpSpPr>
+      <p:grpSpPr>
+        <a:xfrm>
+          <a:off x="0" y="0"/>
+          <a:ext cx="0" cy="0"/>
+          <a:chOff x="0" y="0"/>
+          <a:chExt cx="0" cy="0"/>
+        </a:xfrm>
+      </p:grpSpPr>
+      <p:sp>
+        <p:nvSpPr>
+          <p:cNvPr id="2" name="Espaço Reservado para Imagem de Slide 1"/>
+          <p:cNvSpPr>
+            <a:spLocks noGrp="1" noRot="1" noChangeAspect="1"/>
+          </p:cNvSpPr>
+          <p:nvPr>
+            <p:ph type="sldImg"/>
+          </p:nvPr>
+        </p:nvSpPr>
+        <p:spPr/>
+      </p:sp>
+      <p:sp>
+        <p:nvSpPr>
+          <p:cNvPr id="3" name="Espaço Reservado para Anotações 2"/>
+          <p:cNvSpPr>
+            <a:spLocks noGrp="1"/>
+          </p:cNvSpPr>
+          <p:nvPr>
+            <p:ph type="body" idx="1"/>
+          </p:nvPr>
+        </p:nvSpPr>
+        <p:spPr/>
+        <p:txBody>
+          <a:bodyPr/>
+          <a:lstStyle/>
+          <a:p>
+            <a:r>
+              <a:rPr lang="pt-BR" dirty="0"/>
+              <a:t>Os procedimentos </a:t>
+            </a:r>
+            <a:r>
+              <a:rPr lang="pt-BR" dirty="0" err="1"/>
+              <a:t>aglomerativos</a:t>
+            </a:r>
+            <a:r>
+              <a:rPr lang="pt-BR" dirty="0"/>
+              <a:t> começam com n clusters </a:t>
+            </a:r>
+            <a:r>
+              <a:rPr lang="pt-BR" dirty="0" err="1"/>
+              <a:t>singleton</a:t>
+            </a:r>
+            <a:r>
+              <a:rPr lang="pt-BR" dirty="0"/>
+              <a:t> e, em seguida, formam uma sequência mesclando clusters sucessivamente</a:t>
+            </a:r>
+          </a:p>
+        </p:txBody>
+      </p:sp>
+      <p:sp>
+        <p:nvSpPr>
+          <p:cNvPr id="4" name="Espaço Reservado para Número de Slide 3"/>
+          <p:cNvSpPr>
+            <a:spLocks noGrp="1"/>
+          </p:cNvSpPr>
+          <p:nvPr>
+            <p:ph type="sldNum" sz="quarter" idx="5"/>
+          </p:nvPr>
+        </p:nvSpPr>
+        <p:spPr/>
+        <p:txBody>
+          <a:bodyPr/>
+          <a:lstStyle/>
+          <a:p>
+            <a:fld id="{5E0A5BA6-946D-4582-8BDA-25D6682E6A6A}" type="slidenum">
+              <a:rPr lang="pt-BR" smtClean="0"/>
+              <a:t>37</a:t>
+            </a:fld>
+            <a:endParaRPr lang="pt-BR"/>
+          </a:p>
+        </p:txBody>
+      </p:sp>
+    </p:spTree>
+    <p:extLst>
+      <p:ext uri="{BB962C8B-B14F-4D97-AF65-F5344CB8AC3E}">
+        <p14:creationId xmlns:p14="http://schemas.microsoft.com/office/powerpoint/2010/main" val="3926195524"/>
+      </p:ext>
+    </p:extLst>
+  </p:cSld>
+  <p:clrMapOvr>
+    <a:masterClrMapping/>
+  </p:clrMapOvr>
+</p:notes>
+</file>
+
+<file path=ppt/notesSlides/notesSlide37.xml><?xml version="1.0" encoding="utf-8"?>
+<p:notes xmlns:a="http://schemas.openxmlformats.org/drawingml/2006/main" xmlns:r="http://schemas.openxmlformats.org/officeDocument/2006/relationships" xmlns:p="http://schemas.openxmlformats.org/presentationml/2006/main">
+  <p:cSld>
+    <p:spTree>
+      <p:nvGrpSpPr>
+        <p:cNvPr id="1" name=""/>
+        <p:cNvGrpSpPr/>
+        <p:nvPr/>
+      </p:nvGrpSpPr>
+      <p:grpSpPr>
+        <a:xfrm>
+          <a:off x="0" y="0"/>
+          <a:ext cx="0" cy="0"/>
+          <a:chOff x="0" y="0"/>
+          <a:chExt cx="0" cy="0"/>
+        </a:xfrm>
+      </p:grpSpPr>
+      <p:sp>
+        <p:nvSpPr>
+          <p:cNvPr id="2" name="Espaço Reservado para Imagem de Slide 1"/>
+          <p:cNvSpPr>
+            <a:spLocks noGrp="1" noRot="1" noChangeAspect="1"/>
+          </p:cNvSpPr>
+          <p:nvPr>
+            <p:ph type="sldImg"/>
+          </p:nvPr>
+        </p:nvSpPr>
+        <p:spPr/>
+      </p:sp>
+      <p:sp>
+        <p:nvSpPr>
+          <p:cNvPr id="3" name="Espaço Reservado para Anotações 2"/>
+          <p:cNvSpPr>
+            <a:spLocks noGrp="1"/>
+          </p:cNvSpPr>
+          <p:nvPr>
+            <p:ph type="body" idx="1"/>
+          </p:nvPr>
+        </p:nvSpPr>
+        <p:spPr/>
+        <p:txBody>
+          <a:bodyPr/>
+          <a:lstStyle/>
+          <a:p>
+            <a:r>
+              <a:rPr lang="pt-BR" dirty="0"/>
+              <a:t>Os procedimentos </a:t>
+            </a:r>
+            <a:r>
+              <a:rPr lang="pt-BR" dirty="0" err="1"/>
+              <a:t>aglomerativos</a:t>
+            </a:r>
+            <a:r>
+              <a:rPr lang="pt-BR" dirty="0"/>
+              <a:t> começam com n clusters </a:t>
+            </a:r>
+            <a:r>
+              <a:rPr lang="pt-BR" dirty="0" err="1"/>
+              <a:t>singleton</a:t>
+            </a:r>
+            <a:r>
+              <a:rPr lang="pt-BR" dirty="0"/>
+              <a:t> e, em seguida, formam uma sequência mesclando clusters sucessivamente</a:t>
+            </a:r>
+          </a:p>
+        </p:txBody>
+      </p:sp>
+      <p:sp>
+        <p:nvSpPr>
+          <p:cNvPr id="4" name="Espaço Reservado para Número de Slide 3"/>
+          <p:cNvSpPr>
+            <a:spLocks noGrp="1"/>
+          </p:cNvSpPr>
+          <p:nvPr>
+            <p:ph type="sldNum" sz="quarter" idx="5"/>
+          </p:nvPr>
+        </p:nvSpPr>
+        <p:spPr/>
+        <p:txBody>
+          <a:bodyPr/>
+          <a:lstStyle/>
+          <a:p>
+            <a:fld id="{5E0A5BA6-946D-4582-8BDA-25D6682E6A6A}" type="slidenum">
+              <a:rPr lang="pt-BR" smtClean="0"/>
+              <a:t>38</a:t>
+            </a:fld>
+            <a:endParaRPr lang="pt-BR"/>
+          </a:p>
+        </p:txBody>
+      </p:sp>
+    </p:spTree>
+    <p:extLst>
+      <p:ext uri="{BB962C8B-B14F-4D97-AF65-F5344CB8AC3E}">
+        <p14:creationId xmlns:p14="http://schemas.microsoft.com/office/powerpoint/2010/main" val="447869316"/>
       </p:ext>
     </p:extLst>
   </p:cSld>
@@ -3607,7 +4439,7 @@
           <a:p>
             <a:fld id="{809AD006-F4CF-42C4-B1DE-5280DDD9EA79}" type="datetimeFigureOut">
               <a:rPr lang="pt-BR" smtClean="0"/>
-              <a:t>01/05/2024</a:t>
+              <a:t>06/05/2024</a:t>
             </a:fld>
             <a:endParaRPr lang="pt-BR"/>
           </a:p>
@@ -3805,7 +4637,7 @@
           <a:p>
             <a:fld id="{809AD006-F4CF-42C4-B1DE-5280DDD9EA79}" type="datetimeFigureOut">
               <a:rPr lang="pt-BR" smtClean="0"/>
-              <a:t>01/05/2024</a:t>
+              <a:t>06/05/2024</a:t>
             </a:fld>
             <a:endParaRPr lang="pt-BR"/>
           </a:p>
@@ -4013,7 +4845,7 @@
           <a:p>
             <a:fld id="{809AD006-F4CF-42C4-B1DE-5280DDD9EA79}" type="datetimeFigureOut">
               <a:rPr lang="pt-BR" smtClean="0"/>
-              <a:t>01/05/2024</a:t>
+              <a:t>06/05/2024</a:t>
             </a:fld>
             <a:endParaRPr lang="pt-BR"/>
           </a:p>
@@ -4211,7 +5043,7 @@
           <a:p>
             <a:fld id="{809AD006-F4CF-42C4-B1DE-5280DDD9EA79}" type="datetimeFigureOut">
               <a:rPr lang="pt-BR" smtClean="0"/>
-              <a:t>01/05/2024</a:t>
+              <a:t>06/05/2024</a:t>
             </a:fld>
             <a:endParaRPr lang="pt-BR"/>
           </a:p>
@@ -4486,7 +5318,7 @@
           <a:p>
             <a:fld id="{809AD006-F4CF-42C4-B1DE-5280DDD9EA79}" type="datetimeFigureOut">
               <a:rPr lang="pt-BR" smtClean="0"/>
-              <a:t>01/05/2024</a:t>
+              <a:t>06/05/2024</a:t>
             </a:fld>
             <a:endParaRPr lang="pt-BR"/>
           </a:p>
@@ -4751,7 +5583,7 @@
           <a:p>
             <a:fld id="{809AD006-F4CF-42C4-B1DE-5280DDD9EA79}" type="datetimeFigureOut">
               <a:rPr lang="pt-BR" smtClean="0"/>
-              <a:t>01/05/2024</a:t>
+              <a:t>06/05/2024</a:t>
             </a:fld>
             <a:endParaRPr lang="pt-BR"/>
           </a:p>
@@ -5163,7 +5995,7 @@
           <a:p>
             <a:fld id="{809AD006-F4CF-42C4-B1DE-5280DDD9EA79}" type="datetimeFigureOut">
               <a:rPr lang="pt-BR" smtClean="0"/>
-              <a:t>01/05/2024</a:t>
+              <a:t>06/05/2024</a:t>
             </a:fld>
             <a:endParaRPr lang="pt-BR"/>
           </a:p>
@@ -5304,7 +6136,7 @@
           <a:p>
             <a:fld id="{809AD006-F4CF-42C4-B1DE-5280DDD9EA79}" type="datetimeFigureOut">
               <a:rPr lang="pt-BR" smtClean="0"/>
-              <a:t>01/05/2024</a:t>
+              <a:t>06/05/2024</a:t>
             </a:fld>
             <a:endParaRPr lang="pt-BR"/>
           </a:p>
@@ -5417,7 +6249,7 @@
           <a:p>
             <a:fld id="{809AD006-F4CF-42C4-B1DE-5280DDD9EA79}" type="datetimeFigureOut">
               <a:rPr lang="pt-BR" smtClean="0"/>
-              <a:t>01/05/2024</a:t>
+              <a:t>06/05/2024</a:t>
             </a:fld>
             <a:endParaRPr lang="pt-BR"/>
           </a:p>
@@ -5728,7 +6560,7 @@
           <a:p>
             <a:fld id="{809AD006-F4CF-42C4-B1DE-5280DDD9EA79}" type="datetimeFigureOut">
               <a:rPr lang="pt-BR" smtClean="0"/>
-              <a:t>01/05/2024</a:t>
+              <a:t>06/05/2024</a:t>
             </a:fld>
             <a:endParaRPr lang="pt-BR"/>
           </a:p>
@@ -6016,7 +6848,7 @@
           <a:p>
             <a:fld id="{809AD006-F4CF-42C4-B1DE-5280DDD9EA79}" type="datetimeFigureOut">
               <a:rPr lang="pt-BR" smtClean="0"/>
-              <a:t>01/05/2024</a:t>
+              <a:t>06/05/2024</a:t>
             </a:fld>
             <a:endParaRPr lang="pt-BR"/>
           </a:p>
@@ -6257,7 +7089,7 @@
           <a:p>
             <a:fld id="{809AD006-F4CF-42C4-B1DE-5280DDD9EA79}" type="datetimeFigureOut">
               <a:rPr lang="pt-BR" smtClean="0"/>
-              <a:t>01/05/2024</a:t>
+              <a:t>06/05/2024</a:t>
             </a:fld>
             <a:endParaRPr lang="pt-BR"/>
           </a:p>
@@ -12740,8 +13572,8 @@
           </a:p>
         </p:txBody>
       </p:sp>
-      <mc:AlternateContent xmlns:mc="http://schemas.openxmlformats.org/markup-compatibility/2006">
-        <mc:Choice xmlns:a14="http://schemas.microsoft.com/office/drawing/2010/main" Requires="a14">
+      <mc:AlternateContent xmlns:mc="http://schemas.openxmlformats.org/markup-compatibility/2006" xmlns:a14="http://schemas.microsoft.com/office/drawing/2010/main">
+        <mc:Choice Requires="a14">
           <p:sp>
             <p:nvSpPr>
               <p:cNvPr id="3" name="Espaço Reservado para Conteúdo 2">
@@ -12912,7 +13744,7 @@
             </p:txBody>
           </p:sp>
         </mc:Choice>
-        <mc:Fallback>
+        <mc:Fallback xmlns="">
           <p:sp>
             <p:nvSpPr>
               <p:cNvPr id="3" name="Espaço Reservado para Conteúdo 2">
@@ -13191,6 +14023,336 @@
         </p:nvSpPr>
         <p:spPr>
           <a:xfrm>
+            <a:off x="838201" y="2374899"/>
+            <a:ext cx="4978399" cy="3788833"/>
+          </a:xfrm>
+        </p:spPr>
+        <p:txBody>
+          <a:bodyPr>
+            <a:normAutofit/>
+          </a:bodyPr>
+          <a:lstStyle/>
+          <a:p>
+            <a:pPr algn="just"/>
+            <a:r>
+              <a:rPr lang="pt-BR" dirty="0"/>
+              <a:t>Algorítmo </a:t>
+            </a:r>
+            <a:r>
+              <a:rPr lang="pt-BR" i="1" dirty="0" err="1"/>
+              <a:t>optimal</a:t>
+            </a:r>
+            <a:r>
+              <a:rPr lang="pt-BR" i="1" dirty="0"/>
+              <a:t> </a:t>
+            </a:r>
+            <a:r>
+              <a:rPr lang="pt-BR" i="1" dirty="0" err="1"/>
+              <a:t>number</a:t>
+            </a:r>
+            <a:r>
+              <a:rPr lang="pt-BR" i="1" dirty="0"/>
+              <a:t> </a:t>
+            </a:r>
+            <a:r>
+              <a:rPr lang="pt-BR" i="1" dirty="0" err="1"/>
+              <a:t>of</a:t>
+            </a:r>
+            <a:r>
+              <a:rPr lang="pt-BR" i="1" dirty="0"/>
+              <a:t> cluster </a:t>
+            </a:r>
+            <a:r>
+              <a:rPr lang="pt-BR" i="1" dirty="0" err="1"/>
+              <a:t>determination</a:t>
+            </a:r>
+            <a:r>
+              <a:rPr lang="pt-BR" i="1" dirty="0"/>
+              <a:t> </a:t>
+            </a:r>
+            <a:r>
+              <a:rPr lang="pt-BR" dirty="0"/>
+              <a:t> (ONCD2)</a:t>
+            </a:r>
+          </a:p>
+          <a:p>
+            <a:pPr lvl="1" algn="just"/>
+            <a:endParaRPr lang="pt-BR" dirty="0">
+              <a:solidFill>
+                <a:srgbClr val="FF0000"/>
+              </a:solidFill>
+            </a:endParaRPr>
+          </a:p>
+          <a:p>
+            <a:pPr lvl="1" algn="just"/>
+            <a:r>
+              <a:rPr lang="pt-BR" dirty="0">
+                <a:solidFill>
+                  <a:srgbClr val="FF0000"/>
+                </a:solidFill>
+              </a:rPr>
+              <a:t>Baseado no algoritmo AHC com ligação única e índices CH, DB, </a:t>
+            </a:r>
+            <a:r>
+              <a:rPr lang="pt-BR" dirty="0" err="1">
+                <a:solidFill>
+                  <a:srgbClr val="FF0000"/>
+                </a:solidFill>
+              </a:rPr>
+              <a:t>Sil</a:t>
+            </a:r>
+            <a:r>
+              <a:rPr lang="pt-BR" dirty="0">
+                <a:solidFill>
+                  <a:srgbClr val="FF0000"/>
+                </a:solidFill>
+              </a:rPr>
+              <a:t>, KL, </a:t>
+            </a:r>
+            <a:r>
+              <a:rPr lang="pt-BR" dirty="0" err="1">
+                <a:solidFill>
+                  <a:srgbClr val="FF0000"/>
+                </a:solidFill>
+              </a:rPr>
+              <a:t>Wint</a:t>
+            </a:r>
+            <a:r>
+              <a:rPr lang="pt-BR" dirty="0">
+                <a:solidFill>
+                  <a:srgbClr val="FF0000"/>
+                </a:solidFill>
+              </a:rPr>
+              <a:t> ou índice </a:t>
+            </a:r>
+            <a:r>
+              <a:rPr lang="pt-BR" dirty="0" err="1">
+                <a:solidFill>
+                  <a:srgbClr val="FF0000"/>
+                </a:solidFill>
+              </a:rPr>
+              <a:t>Vλ</a:t>
+            </a:r>
+            <a:r>
+              <a:rPr lang="pt-BR" dirty="0">
+                <a:solidFill>
+                  <a:srgbClr val="FF0000"/>
+                </a:solidFill>
+              </a:rPr>
+              <a:t>, o algoritmo de determinação do número ideal de clusters (ONCD2) pode ser descrito</a:t>
+            </a:r>
+          </a:p>
+          <a:p>
+            <a:pPr algn="just"/>
+            <a:endParaRPr lang="pt-BR" dirty="0"/>
+          </a:p>
+        </p:txBody>
+      </p:sp>
+      <p:pic>
+        <p:nvPicPr>
+          <p:cNvPr id="4" name="Picture 2" descr="Local do Evento | SBRC 2021 - Simpósio Brasileiro de Redes ...">
+            <a:extLst>
+              <a:ext uri="{FF2B5EF4-FFF2-40B4-BE49-F238E27FC236}">
+                <a16:creationId xmlns:a16="http://schemas.microsoft.com/office/drawing/2014/main" id="{C4BAF076-983A-267F-65B0-779489FA3886}"/>
+              </a:ext>
+            </a:extLst>
+          </p:cNvPr>
+          <p:cNvPicPr>
+            <a:picLocks noChangeAspect="1" noChangeArrowheads="1"/>
+          </p:cNvPicPr>
+          <p:nvPr/>
+        </p:nvPicPr>
+        <p:blipFill>
+          <a:blip r:embed="rId3">
+            <a:extLst>
+              <a:ext uri="{28A0092B-C50C-407E-A947-70E740481C1C}">
+                <a14:useLocalDpi xmlns:a14="http://schemas.microsoft.com/office/drawing/2010/main" val="0"/>
+              </a:ext>
+            </a:extLst>
+          </a:blip>
+          <a:srcRect/>
+          <a:stretch>
+            <a:fillRect/>
+          </a:stretch>
+        </p:blipFill>
+        <p:spPr bwMode="auto">
+          <a:xfrm>
+            <a:off x="8783783" y="0"/>
+            <a:ext cx="3408217" cy="1388533"/>
+          </a:xfrm>
+          <a:prstGeom prst="rect">
+            <a:avLst/>
+          </a:prstGeom>
+          <a:noFill/>
+          <a:extLst>
+            <a:ext uri="{909E8E84-426E-40DD-AFC4-6F175D3DCCD1}">
+              <a14:hiddenFill xmlns:a14="http://schemas.microsoft.com/office/drawing/2010/main">
+                <a:solidFill>
+                  <a:srgbClr val="FFFFFF"/>
+                </a:solidFill>
+              </a14:hiddenFill>
+            </a:ext>
+          </a:extLst>
+        </p:spPr>
+      </p:pic>
+      <p:pic>
+        <p:nvPicPr>
+          <p:cNvPr id="5" name="Picture 4" descr="Edições Anteriores | SBRC 2021 - Simpósio Brasileiro de Redes de  Computadores e Sistemas Distribuídos">
+            <a:extLst>
+              <a:ext uri="{FF2B5EF4-FFF2-40B4-BE49-F238E27FC236}">
+                <a16:creationId xmlns:a16="http://schemas.microsoft.com/office/drawing/2014/main" id="{EE629CB4-DE61-E1C8-0777-7BFAD2ACB3C1}"/>
+              </a:ext>
+            </a:extLst>
+          </p:cNvPr>
+          <p:cNvPicPr>
+            <a:picLocks noChangeAspect="1" noChangeArrowheads="1"/>
+          </p:cNvPicPr>
+          <p:nvPr/>
+        </p:nvPicPr>
+        <p:blipFill rotWithShape="1">
+          <a:blip r:embed="rId4">
+            <a:extLst>
+              <a:ext uri="{28A0092B-C50C-407E-A947-70E740481C1C}">
+                <a14:useLocalDpi xmlns:a14="http://schemas.microsoft.com/office/drawing/2010/main" val="0"/>
+              </a:ext>
+            </a:extLst>
+          </a:blip>
+          <a:srcRect l="18938" t="24085"/>
+          <a:stretch/>
+        </p:blipFill>
+        <p:spPr bwMode="auto">
+          <a:xfrm>
+            <a:off x="259976" y="5803900"/>
+            <a:ext cx="2762759" cy="1054100"/>
+          </a:xfrm>
+          <a:prstGeom prst="rect">
+            <a:avLst/>
+          </a:prstGeom>
+          <a:noFill/>
+          <a:extLst>
+            <a:ext uri="{909E8E84-426E-40DD-AFC4-6F175D3DCCD1}">
+              <a14:hiddenFill xmlns:a14="http://schemas.microsoft.com/office/drawing/2010/main">
+                <a:solidFill>
+                  <a:srgbClr val="FFFFFF"/>
+                </a:solidFill>
+              </a14:hiddenFill>
+            </a:ext>
+          </a:extLst>
+        </p:spPr>
+      </p:pic>
+      <p:pic>
+        <p:nvPicPr>
+          <p:cNvPr id="7" name="Imagem 6">
+            <a:extLst>
+              <a:ext uri="{FF2B5EF4-FFF2-40B4-BE49-F238E27FC236}">
+                <a16:creationId xmlns:a16="http://schemas.microsoft.com/office/drawing/2014/main" id="{294B3135-39D2-AFFA-8A1F-AB7A0638AA05}"/>
+              </a:ext>
+            </a:extLst>
+          </p:cNvPr>
+          <p:cNvPicPr>
+            <a:picLocks noChangeAspect="1"/>
+          </p:cNvPicPr>
+          <p:nvPr/>
+        </p:nvPicPr>
+        <p:blipFill>
+          <a:blip r:embed="rId5"/>
+          <a:stretch>
+            <a:fillRect/>
+          </a:stretch>
+        </p:blipFill>
+        <p:spPr>
+          <a:xfrm>
+            <a:off x="5989123" y="2297079"/>
+            <a:ext cx="6096000" cy="3944471"/>
+          </a:xfrm>
+          <a:prstGeom prst="rect">
+            <a:avLst/>
+          </a:prstGeom>
+        </p:spPr>
+      </p:pic>
+    </p:spTree>
+    <p:extLst>
+      <p:ext uri="{BB962C8B-B14F-4D97-AF65-F5344CB8AC3E}">
+        <p14:creationId xmlns:p14="http://schemas.microsoft.com/office/powerpoint/2010/main" val="4025850483"/>
+      </p:ext>
+    </p:extLst>
+  </p:cSld>
+  <p:clrMapOvr>
+    <a:masterClrMapping/>
+  </p:clrMapOvr>
+</p:sld>
+</file>
+
+<file path=ppt/slides/slide27.xml><?xml version="1.0" encoding="utf-8"?>
+<p:sld xmlns:a="http://schemas.openxmlformats.org/drawingml/2006/main" xmlns:r="http://schemas.openxmlformats.org/officeDocument/2006/relationships" xmlns:p="http://schemas.openxmlformats.org/presentationml/2006/main">
+  <p:cSld>
+    <p:spTree>
+      <p:nvGrpSpPr>
+        <p:cNvPr id="1" name=""/>
+        <p:cNvGrpSpPr/>
+        <p:nvPr/>
+      </p:nvGrpSpPr>
+      <p:grpSpPr>
+        <a:xfrm>
+          <a:off x="0" y="0"/>
+          <a:ext cx="0" cy="0"/>
+          <a:chOff x="0" y="0"/>
+          <a:chExt cx="0" cy="0"/>
+        </a:xfrm>
+      </p:grpSpPr>
+      <p:sp>
+        <p:nvSpPr>
+          <p:cNvPr id="2" name="Título 1">
+            <a:extLst>
+              <a:ext uri="{FF2B5EF4-FFF2-40B4-BE49-F238E27FC236}">
+                <a16:creationId xmlns:a16="http://schemas.microsoft.com/office/drawing/2014/main" id="{4549A9CF-9A04-0D0B-3F38-47569BAC879F}"/>
+              </a:ext>
+            </a:extLst>
+          </p:cNvPr>
+          <p:cNvSpPr>
+            <a:spLocks noGrp="1"/>
+          </p:cNvSpPr>
+          <p:nvPr>
+            <p:ph type="title"/>
+          </p:nvPr>
+        </p:nvSpPr>
+        <p:spPr/>
+        <p:txBody>
+          <a:bodyPr/>
+          <a:lstStyle/>
+          <a:p>
+            <a:r>
+              <a:rPr lang="pt-BR" dirty="0"/>
+              <a:t>Determinar o numero </a:t>
+            </a:r>
+            <a:br>
+              <a:rPr lang="pt-BR" dirty="0"/>
+            </a:br>
+            <a:r>
+              <a:rPr lang="pt-BR" dirty="0"/>
+              <a:t>ideal de clusters</a:t>
+            </a:r>
+          </a:p>
+        </p:txBody>
+      </p:sp>
+      <p:sp>
+        <p:nvSpPr>
+          <p:cNvPr id="3" name="Espaço Reservado para Conteúdo 2">
+            <a:extLst>
+              <a:ext uri="{FF2B5EF4-FFF2-40B4-BE49-F238E27FC236}">
+                <a16:creationId xmlns:a16="http://schemas.microsoft.com/office/drawing/2014/main" id="{EC2E1DDA-B549-8F9D-BA64-18BAFB4D49A1}"/>
+              </a:ext>
+            </a:extLst>
+          </p:cNvPr>
+          <p:cNvSpPr>
+            <a:spLocks noGrp="1"/>
+          </p:cNvSpPr>
+          <p:nvPr>
+            <p:ph idx="1"/>
+          </p:nvPr>
+        </p:nvSpPr>
+        <p:spPr>
+          <a:xfrm>
             <a:off x="838202" y="1812395"/>
             <a:ext cx="9548444" cy="4351338"/>
           </a:xfrm>
@@ -13413,7 +14575,7 @@
 </p:sld>
 </file>
 
-<file path=ppt/slides/slide27.xml><?xml version="1.0" encoding="utf-8"?>
+<file path=ppt/slides/slide28.xml><?xml version="1.0" encoding="utf-8"?>
 <p:sld xmlns:a="http://schemas.openxmlformats.org/drawingml/2006/main" xmlns:r="http://schemas.openxmlformats.org/officeDocument/2006/relationships" xmlns:p="http://schemas.openxmlformats.org/presentationml/2006/main">
   <p:cSld>
     <p:spTree>
@@ -13726,7 +14888,7 @@
 </p:sld>
 </file>
 
-<file path=ppt/slides/slide28.xml><?xml version="1.0" encoding="utf-8"?>
+<file path=ppt/slides/slide29.xml><?xml version="1.0" encoding="utf-8"?>
 <p:sld xmlns:a="http://schemas.openxmlformats.org/drawingml/2006/main" xmlns:r="http://schemas.openxmlformats.org/officeDocument/2006/relationships" xmlns:p="http://schemas.openxmlformats.org/presentationml/2006/main">
   <p:cSld>
     <p:spTree>
@@ -13943,232 +15105,6 @@
     <p:extLst>
       <p:ext uri="{BB962C8B-B14F-4D97-AF65-F5344CB8AC3E}">
         <p14:creationId xmlns:p14="http://schemas.microsoft.com/office/powerpoint/2010/main" val="2190952350"/>
-      </p:ext>
-    </p:extLst>
-  </p:cSld>
-  <p:clrMapOvr>
-    <a:masterClrMapping/>
-  </p:clrMapOvr>
-</p:sld>
-</file>
-
-<file path=ppt/slides/slide29.xml><?xml version="1.0" encoding="utf-8"?>
-<p:sld xmlns:a="http://schemas.openxmlformats.org/drawingml/2006/main" xmlns:r="http://schemas.openxmlformats.org/officeDocument/2006/relationships" xmlns:p="http://schemas.openxmlformats.org/presentationml/2006/main">
-  <p:cSld>
-    <p:spTree>
-      <p:nvGrpSpPr>
-        <p:cNvPr id="1" name=""/>
-        <p:cNvGrpSpPr/>
-        <p:nvPr/>
-      </p:nvGrpSpPr>
-      <p:grpSpPr>
-        <a:xfrm>
-          <a:off x="0" y="0"/>
-          <a:ext cx="0" cy="0"/>
-          <a:chOff x="0" y="0"/>
-          <a:chExt cx="0" cy="0"/>
-        </a:xfrm>
-      </p:grpSpPr>
-      <p:sp>
-        <p:nvSpPr>
-          <p:cNvPr id="2" name="Título 1">
-            <a:extLst>
-              <a:ext uri="{FF2B5EF4-FFF2-40B4-BE49-F238E27FC236}">
-                <a16:creationId xmlns:a16="http://schemas.microsoft.com/office/drawing/2014/main" id="{4549A9CF-9A04-0D0B-3F38-47569BAC879F}"/>
-              </a:ext>
-            </a:extLst>
-          </p:cNvPr>
-          <p:cNvSpPr>
-            <a:spLocks noGrp="1"/>
-          </p:cNvSpPr>
-          <p:nvPr>
-            <p:ph type="title"/>
-          </p:nvPr>
-        </p:nvSpPr>
-        <p:spPr/>
-        <p:txBody>
-          <a:bodyPr/>
-          <a:lstStyle/>
-          <a:p>
-            <a:r>
-              <a:rPr lang="pt-BR" dirty="0"/>
-              <a:t>Determinar o numero </a:t>
-            </a:r>
-            <a:br>
-              <a:rPr lang="pt-BR" dirty="0"/>
-            </a:br>
-            <a:r>
-              <a:rPr lang="pt-BR" dirty="0"/>
-              <a:t>ideal de clusters</a:t>
-            </a:r>
-          </a:p>
-        </p:txBody>
-      </p:sp>
-      <p:sp>
-        <p:nvSpPr>
-          <p:cNvPr id="3" name="Espaço Reservado para Conteúdo 2">
-            <a:extLst>
-              <a:ext uri="{FF2B5EF4-FFF2-40B4-BE49-F238E27FC236}">
-                <a16:creationId xmlns:a16="http://schemas.microsoft.com/office/drawing/2014/main" id="{EC2E1DDA-B549-8F9D-BA64-18BAFB4D49A1}"/>
-              </a:ext>
-            </a:extLst>
-          </p:cNvPr>
-          <p:cNvSpPr>
-            <a:spLocks noGrp="1"/>
-          </p:cNvSpPr>
-          <p:nvPr>
-            <p:ph idx="1"/>
-          </p:nvPr>
-        </p:nvSpPr>
-        <p:spPr>
-          <a:xfrm>
-            <a:off x="838201" y="1812395"/>
-            <a:ext cx="10923269" cy="4351338"/>
-          </a:xfrm>
-        </p:spPr>
-        <p:txBody>
-          <a:bodyPr>
-            <a:normAutofit/>
-          </a:bodyPr>
-          <a:lstStyle/>
-          <a:p>
-            <a:pPr algn="just"/>
-            <a:r>
-              <a:rPr lang="pt-BR" dirty="0"/>
-              <a:t>Em essência, o algoritmo ONCD proposto inclui dois processos</a:t>
-            </a:r>
-          </a:p>
-          <a:p>
-            <a:pPr lvl="1" algn="just"/>
-            <a:endParaRPr lang="pt-BR" dirty="0"/>
-          </a:p>
-          <a:p>
-            <a:pPr lvl="1" algn="just"/>
-            <a:r>
-              <a:rPr lang="pt-BR" dirty="0"/>
-              <a:t>processo de clusterização do uso do algoritmo AHC com single link</a:t>
-            </a:r>
-          </a:p>
-          <a:p>
-            <a:pPr lvl="1" algn="just"/>
-            <a:r>
-              <a:rPr lang="pt-BR" dirty="0"/>
-              <a:t>processo de avaliação do uso do índice CSP</a:t>
-            </a:r>
-          </a:p>
-          <a:p>
-            <a:pPr lvl="1" algn="just"/>
-            <a:endParaRPr lang="pt-BR" dirty="0"/>
-          </a:p>
-          <a:p>
-            <a:pPr lvl="2" algn="just"/>
-            <a:r>
-              <a:rPr lang="pt-BR" dirty="0" err="1"/>
-              <a:t>Obs</a:t>
-            </a:r>
-            <a:r>
-              <a:rPr lang="pt-BR" dirty="0"/>
-              <a:t>: O processo de agrupamento de uso do algoritmo AHC com ligação única também é o processo de produzir a árvore geradora mínima, a partir da qual podemos facilmente obter o peso da árvore geradora mínima para todas as amostras em cada cluster e a distância mínima entre clusters de cada cluster.</a:t>
-            </a:r>
-          </a:p>
-        </p:txBody>
-      </p:sp>
-      <p:pic>
-        <p:nvPicPr>
-          <p:cNvPr id="4" name="Picture 2" descr="Local do Evento | SBRC 2021 - Simpósio Brasileiro de Redes ...">
-            <a:extLst>
-              <a:ext uri="{FF2B5EF4-FFF2-40B4-BE49-F238E27FC236}">
-                <a16:creationId xmlns:a16="http://schemas.microsoft.com/office/drawing/2014/main" id="{C4BAF076-983A-267F-65B0-779489FA3886}"/>
-              </a:ext>
-            </a:extLst>
-          </p:cNvPr>
-          <p:cNvPicPr>
-            <a:picLocks noChangeAspect="1" noChangeArrowheads="1"/>
-          </p:cNvPicPr>
-          <p:nvPr/>
-        </p:nvPicPr>
-        <p:blipFill>
-          <a:blip r:embed="rId3">
-            <a:extLst>
-              <a:ext uri="{28A0092B-C50C-407E-A947-70E740481C1C}">
-                <a14:useLocalDpi xmlns:a14="http://schemas.microsoft.com/office/drawing/2010/main" val="0"/>
-              </a:ext>
-            </a:extLst>
-          </a:blip>
-          <a:srcRect/>
-          <a:stretch>
-            <a:fillRect/>
-          </a:stretch>
-        </p:blipFill>
-        <p:spPr bwMode="auto">
-          <a:xfrm>
-            <a:off x="8783783" y="0"/>
-            <a:ext cx="3408217" cy="1388533"/>
-          </a:xfrm>
-          <a:prstGeom prst="rect">
-            <a:avLst/>
-          </a:prstGeom>
-          <a:noFill/>
-          <a:extLst>
-            <a:ext uri="{909E8E84-426E-40DD-AFC4-6F175D3DCCD1}">
-              <a14:hiddenFill xmlns:a14="http://schemas.microsoft.com/office/drawing/2010/main">
-                <a:solidFill>
-                  <a:srgbClr val="FFFFFF"/>
-                </a:solidFill>
-              </a14:hiddenFill>
-            </a:ext>
-          </a:extLst>
-        </p:spPr>
-      </p:pic>
-      <p:pic>
-        <p:nvPicPr>
-          <p:cNvPr id="5" name="Picture 4" descr="Edições Anteriores | SBRC 2021 - Simpósio Brasileiro de Redes de  Computadores e Sistemas Distribuídos">
-            <a:extLst>
-              <a:ext uri="{FF2B5EF4-FFF2-40B4-BE49-F238E27FC236}">
-                <a16:creationId xmlns:a16="http://schemas.microsoft.com/office/drawing/2014/main" id="{EE629CB4-DE61-E1C8-0777-7BFAD2ACB3C1}"/>
-              </a:ext>
-            </a:extLst>
-          </p:cNvPr>
-          <p:cNvPicPr>
-            <a:picLocks noChangeAspect="1" noChangeArrowheads="1"/>
-          </p:cNvPicPr>
-          <p:nvPr/>
-        </p:nvPicPr>
-        <p:blipFill rotWithShape="1">
-          <a:blip r:embed="rId4">
-            <a:extLst>
-              <a:ext uri="{28A0092B-C50C-407E-A947-70E740481C1C}">
-                <a14:useLocalDpi xmlns:a14="http://schemas.microsoft.com/office/drawing/2010/main" val="0"/>
-              </a:ext>
-            </a:extLst>
-          </a:blip>
-          <a:srcRect l="18938" t="24085"/>
-          <a:stretch/>
-        </p:blipFill>
-        <p:spPr bwMode="auto">
-          <a:xfrm>
-            <a:off x="259976" y="5803900"/>
-            <a:ext cx="2762759" cy="1054100"/>
-          </a:xfrm>
-          <a:prstGeom prst="rect">
-            <a:avLst/>
-          </a:prstGeom>
-          <a:noFill/>
-          <a:extLst>
-            <a:ext uri="{909E8E84-426E-40DD-AFC4-6F175D3DCCD1}">
-              <a14:hiddenFill xmlns:a14="http://schemas.microsoft.com/office/drawing/2010/main">
-                <a:solidFill>
-                  <a:srgbClr val="FFFFFF"/>
-                </a:solidFill>
-              </a14:hiddenFill>
-            </a:ext>
-          </a:extLst>
-        </p:spPr>
-      </p:pic>
-    </p:spTree>
-    <p:extLst>
-      <p:ext uri="{BB962C8B-B14F-4D97-AF65-F5344CB8AC3E}">
-        <p14:creationId xmlns:p14="http://schemas.microsoft.com/office/powerpoint/2010/main" val="3620626198"/>
       </p:ext>
     </p:extLst>
   </p:cSld>
@@ -14505,8 +15441,8 @@
         </p:nvSpPr>
         <p:spPr>
           <a:xfrm>
-            <a:off x="838201" y="1812395"/>
-            <a:ext cx="10923269" cy="4351338"/>
+            <a:off x="838202" y="1812395"/>
+            <a:ext cx="8567056" cy="4351338"/>
           </a:xfrm>
         </p:spPr>
         <p:txBody>
@@ -14517,9 +15453,47 @@
           <a:p>
             <a:pPr algn="just"/>
             <a:r>
-              <a:rPr lang="pt-BR"/>
-              <a:t>Em</a:t>
-            </a:r>
+              <a:rPr lang="pt-BR" dirty="0"/>
+              <a:t>Verificação do desempenho do índice CSP e ONCD</a:t>
+            </a:r>
+          </a:p>
+          <a:p>
+            <a:pPr marL="971550" lvl="1" indent="-514350" algn="just">
+              <a:buFont typeface="+mj-lt"/>
+              <a:buAutoNum type="arabicPeriod"/>
+            </a:pPr>
+            <a:endParaRPr lang="pt-BR" dirty="0"/>
+          </a:p>
+          <a:p>
+            <a:pPr lvl="1" algn="just"/>
+            <a:r>
+              <a:rPr lang="pt-BR" dirty="0"/>
+              <a:t>Experimentos utilizando </a:t>
+            </a:r>
+            <a:r>
+              <a:rPr lang="pt-BR" i="1" dirty="0" err="1"/>
+              <a:t>datasets</a:t>
+            </a:r>
+            <a:r>
+              <a:rPr lang="pt-BR" dirty="0"/>
+              <a:t> sintéticos</a:t>
+            </a:r>
+          </a:p>
+          <a:p>
+            <a:pPr lvl="2" algn="just"/>
+            <a:endParaRPr lang="pt-BR" i="1" dirty="0"/>
+          </a:p>
+          <a:p>
+            <a:pPr lvl="2" algn="just"/>
+            <a:r>
+              <a:rPr lang="pt-BR" dirty="0"/>
+              <a:t>Os experimentos incluem 18 conjuntos de dados sintéticos, que compreendem números aleatórios 2-D gerados por simulação computacional. </a:t>
+            </a:r>
+          </a:p>
+          <a:p>
+            <a:pPr marL="0" indent="0" algn="just">
+              <a:buNone/>
+            </a:pPr>
             <a:endParaRPr lang="pt-BR" dirty="0"/>
           </a:p>
         </p:txBody>
@@ -14620,6 +15594,1713 @@
     <p:extLst>
       <p:ext uri="{BB962C8B-B14F-4D97-AF65-F5344CB8AC3E}">
         <p14:creationId xmlns:p14="http://schemas.microsoft.com/office/powerpoint/2010/main" val="272696254"/>
+      </p:ext>
+    </p:extLst>
+  </p:cSld>
+  <p:clrMapOvr>
+    <a:masterClrMapping/>
+  </p:clrMapOvr>
+</p:sld>
+</file>
+
+<file path=ppt/slides/slide31.xml><?xml version="1.0" encoding="utf-8"?>
+<p:sld xmlns:a="http://schemas.openxmlformats.org/drawingml/2006/main" xmlns:r="http://schemas.openxmlformats.org/officeDocument/2006/relationships" xmlns:p="http://schemas.openxmlformats.org/presentationml/2006/main">
+  <p:cSld>
+    <p:spTree>
+      <p:nvGrpSpPr>
+        <p:cNvPr id="1" name=""/>
+        <p:cNvGrpSpPr/>
+        <p:nvPr/>
+      </p:nvGrpSpPr>
+      <p:grpSpPr>
+        <a:xfrm>
+          <a:off x="0" y="0"/>
+          <a:ext cx="0" cy="0"/>
+          <a:chOff x="0" y="0"/>
+          <a:chExt cx="0" cy="0"/>
+        </a:xfrm>
+      </p:grpSpPr>
+      <p:sp>
+        <p:nvSpPr>
+          <p:cNvPr id="3" name="Espaço Reservado para Conteúdo 2">
+            <a:extLst>
+              <a:ext uri="{FF2B5EF4-FFF2-40B4-BE49-F238E27FC236}">
+                <a16:creationId xmlns:a16="http://schemas.microsoft.com/office/drawing/2014/main" id="{EC2E1DDA-B549-8F9D-BA64-18BAFB4D49A1}"/>
+              </a:ext>
+            </a:extLst>
+          </p:cNvPr>
+          <p:cNvSpPr>
+            <a:spLocks noGrp="1"/>
+          </p:cNvSpPr>
+          <p:nvPr>
+            <p:ph idx="1"/>
+          </p:nvPr>
+        </p:nvSpPr>
+        <p:spPr>
+          <a:xfrm>
+            <a:off x="824334" y="2766372"/>
+            <a:ext cx="2762759" cy="1325253"/>
+          </a:xfrm>
+        </p:spPr>
+        <p:txBody>
+          <a:bodyPr>
+            <a:normAutofit/>
+          </a:bodyPr>
+          <a:lstStyle/>
+          <a:p>
+            <a:pPr algn="just"/>
+            <a:r>
+              <a:rPr lang="pt-BR" dirty="0"/>
+              <a:t>Visualização dos dados sintéticos fabricados:</a:t>
+            </a:r>
+          </a:p>
+          <a:p>
+            <a:pPr marL="971550" lvl="1" indent="-514350" algn="just">
+              <a:buFont typeface="+mj-lt"/>
+              <a:buAutoNum type="arabicPeriod"/>
+            </a:pPr>
+            <a:endParaRPr lang="pt-BR" dirty="0"/>
+          </a:p>
+          <a:p>
+            <a:pPr marL="0" indent="0" algn="just">
+              <a:buNone/>
+            </a:pPr>
+            <a:endParaRPr lang="pt-BR" dirty="0"/>
+          </a:p>
+        </p:txBody>
+      </p:sp>
+      <p:pic>
+        <p:nvPicPr>
+          <p:cNvPr id="5" name="Picture 4" descr="Edições Anteriores | SBRC 2021 - Simpósio Brasileiro de Redes de  Computadores e Sistemas Distribuídos">
+            <a:extLst>
+              <a:ext uri="{FF2B5EF4-FFF2-40B4-BE49-F238E27FC236}">
+                <a16:creationId xmlns:a16="http://schemas.microsoft.com/office/drawing/2014/main" id="{EE629CB4-DE61-E1C8-0777-7BFAD2ACB3C1}"/>
+              </a:ext>
+            </a:extLst>
+          </p:cNvPr>
+          <p:cNvPicPr>
+            <a:picLocks noChangeAspect="1" noChangeArrowheads="1"/>
+          </p:cNvPicPr>
+          <p:nvPr/>
+        </p:nvPicPr>
+        <p:blipFill rotWithShape="1">
+          <a:blip r:embed="rId3">
+            <a:extLst>
+              <a:ext uri="{28A0092B-C50C-407E-A947-70E740481C1C}">
+                <a14:useLocalDpi xmlns:a14="http://schemas.microsoft.com/office/drawing/2010/main" val="0"/>
+              </a:ext>
+            </a:extLst>
+          </a:blip>
+          <a:srcRect l="18938" t="24085"/>
+          <a:stretch/>
+        </p:blipFill>
+        <p:spPr bwMode="auto">
+          <a:xfrm>
+            <a:off x="259976" y="5803900"/>
+            <a:ext cx="2762759" cy="1054100"/>
+          </a:xfrm>
+          <a:prstGeom prst="rect">
+            <a:avLst/>
+          </a:prstGeom>
+          <a:noFill/>
+          <a:extLst>
+            <a:ext uri="{909E8E84-426E-40DD-AFC4-6F175D3DCCD1}">
+              <a14:hiddenFill xmlns:a14="http://schemas.microsoft.com/office/drawing/2010/main">
+                <a:solidFill>
+                  <a:srgbClr val="FFFFFF"/>
+                </a:solidFill>
+              </a14:hiddenFill>
+            </a:ext>
+          </a:extLst>
+        </p:spPr>
+      </p:pic>
+      <p:pic>
+        <p:nvPicPr>
+          <p:cNvPr id="7" name="Imagem 6">
+            <a:extLst>
+              <a:ext uri="{FF2B5EF4-FFF2-40B4-BE49-F238E27FC236}">
+                <a16:creationId xmlns:a16="http://schemas.microsoft.com/office/drawing/2014/main" id="{CF439FF5-8091-065C-DC7E-A1EAF8807ADD}"/>
+              </a:ext>
+            </a:extLst>
+          </p:cNvPr>
+          <p:cNvPicPr>
+            <a:picLocks noChangeAspect="1"/>
+          </p:cNvPicPr>
+          <p:nvPr/>
+        </p:nvPicPr>
+        <p:blipFill>
+          <a:blip r:embed="rId4"/>
+          <a:stretch>
+            <a:fillRect/>
+          </a:stretch>
+        </p:blipFill>
+        <p:spPr>
+          <a:xfrm>
+            <a:off x="4178346" y="457033"/>
+            <a:ext cx="7922652" cy="5943929"/>
+          </a:xfrm>
+          <a:prstGeom prst="rect">
+            <a:avLst/>
+          </a:prstGeom>
+        </p:spPr>
+      </p:pic>
+      <p:sp>
+        <p:nvSpPr>
+          <p:cNvPr id="10" name="Título 1">
+            <a:extLst>
+              <a:ext uri="{FF2B5EF4-FFF2-40B4-BE49-F238E27FC236}">
+                <a16:creationId xmlns:a16="http://schemas.microsoft.com/office/drawing/2014/main" id="{BFB54A0C-DB19-D22F-6AD7-4D2C52004457}"/>
+              </a:ext>
+            </a:extLst>
+          </p:cNvPr>
+          <p:cNvSpPr>
+            <a:spLocks noGrp="1"/>
+          </p:cNvSpPr>
+          <p:nvPr>
+            <p:ph type="title"/>
+          </p:nvPr>
+        </p:nvSpPr>
+        <p:spPr>
+          <a:xfrm>
+            <a:off x="838200" y="365125"/>
+            <a:ext cx="3796553" cy="1325563"/>
+          </a:xfrm>
+        </p:spPr>
+        <p:txBody>
+          <a:bodyPr/>
+          <a:lstStyle/>
+          <a:p>
+            <a:r>
+              <a:rPr lang="pt-BR" dirty="0"/>
+              <a:t>Estudos experimentais</a:t>
+            </a:r>
+          </a:p>
+        </p:txBody>
+      </p:sp>
+    </p:spTree>
+    <p:extLst>
+      <p:ext uri="{BB962C8B-B14F-4D97-AF65-F5344CB8AC3E}">
+        <p14:creationId xmlns:p14="http://schemas.microsoft.com/office/powerpoint/2010/main" val="3153084405"/>
+      </p:ext>
+    </p:extLst>
+  </p:cSld>
+  <p:clrMapOvr>
+    <a:masterClrMapping/>
+  </p:clrMapOvr>
+</p:sld>
+</file>
+
+<file path=ppt/slides/slide32.xml><?xml version="1.0" encoding="utf-8"?>
+<p:sld xmlns:a="http://schemas.openxmlformats.org/drawingml/2006/main" xmlns:r="http://schemas.openxmlformats.org/officeDocument/2006/relationships" xmlns:p="http://schemas.openxmlformats.org/presentationml/2006/main">
+  <p:cSld>
+    <p:spTree>
+      <p:nvGrpSpPr>
+        <p:cNvPr id="1" name=""/>
+        <p:cNvGrpSpPr/>
+        <p:nvPr/>
+      </p:nvGrpSpPr>
+      <p:grpSpPr>
+        <a:xfrm>
+          <a:off x="0" y="0"/>
+          <a:ext cx="0" cy="0"/>
+          <a:chOff x="0" y="0"/>
+          <a:chExt cx="0" cy="0"/>
+        </a:xfrm>
+      </p:grpSpPr>
+      <p:sp>
+        <p:nvSpPr>
+          <p:cNvPr id="2" name="Título 1">
+            <a:extLst>
+              <a:ext uri="{FF2B5EF4-FFF2-40B4-BE49-F238E27FC236}">
+                <a16:creationId xmlns:a16="http://schemas.microsoft.com/office/drawing/2014/main" id="{4549A9CF-9A04-0D0B-3F38-47569BAC879F}"/>
+              </a:ext>
+            </a:extLst>
+          </p:cNvPr>
+          <p:cNvSpPr>
+            <a:spLocks noGrp="1"/>
+          </p:cNvSpPr>
+          <p:nvPr>
+            <p:ph type="title"/>
+          </p:nvPr>
+        </p:nvSpPr>
+        <p:spPr/>
+        <p:txBody>
+          <a:bodyPr/>
+          <a:lstStyle/>
+          <a:p>
+            <a:r>
+              <a:rPr lang="pt-BR" dirty="0"/>
+              <a:t>Estudos experimentais</a:t>
+            </a:r>
+          </a:p>
+        </p:txBody>
+      </p:sp>
+      <p:sp>
+        <p:nvSpPr>
+          <p:cNvPr id="3" name="Espaço Reservado para Conteúdo 2">
+            <a:extLst>
+              <a:ext uri="{FF2B5EF4-FFF2-40B4-BE49-F238E27FC236}">
+                <a16:creationId xmlns:a16="http://schemas.microsoft.com/office/drawing/2014/main" id="{EC2E1DDA-B549-8F9D-BA64-18BAFB4D49A1}"/>
+              </a:ext>
+            </a:extLst>
+          </p:cNvPr>
+          <p:cNvSpPr>
+            <a:spLocks noGrp="1"/>
+          </p:cNvSpPr>
+          <p:nvPr>
+            <p:ph idx="1"/>
+          </p:nvPr>
+        </p:nvSpPr>
+        <p:spPr>
+          <a:xfrm>
+            <a:off x="748555" y="2055813"/>
+            <a:ext cx="5042645" cy="2868299"/>
+          </a:xfrm>
+        </p:spPr>
+        <p:txBody>
+          <a:bodyPr>
+            <a:normAutofit/>
+          </a:bodyPr>
+          <a:lstStyle/>
+          <a:p>
+            <a:pPr algn="just"/>
+            <a:r>
+              <a:rPr lang="pt-BR" dirty="0"/>
+              <a:t>Análise dos resultados</a:t>
+            </a:r>
+          </a:p>
+          <a:p>
+            <a:pPr lvl="1" algn="just"/>
+            <a:endParaRPr lang="pt-BR" dirty="0"/>
+          </a:p>
+          <a:p>
+            <a:pPr lvl="1" algn="just"/>
+            <a:r>
+              <a:rPr lang="pt-BR" dirty="0"/>
+              <a:t>Comparação entre os diferentes índices para encontrar o valor ideal de clusters para os dados sintéticos</a:t>
+            </a:r>
+          </a:p>
+          <a:p>
+            <a:pPr marL="971550" lvl="1" indent="-514350" algn="just">
+              <a:buFont typeface="+mj-lt"/>
+              <a:buAutoNum type="arabicPeriod"/>
+            </a:pPr>
+            <a:endParaRPr lang="pt-BR" dirty="0"/>
+          </a:p>
+          <a:p>
+            <a:pPr marL="0" indent="0" algn="just">
+              <a:buNone/>
+            </a:pPr>
+            <a:endParaRPr lang="pt-BR" dirty="0"/>
+          </a:p>
+        </p:txBody>
+      </p:sp>
+      <p:pic>
+        <p:nvPicPr>
+          <p:cNvPr id="4" name="Picture 2" descr="Local do Evento | SBRC 2021 - Simpósio Brasileiro de Redes ...">
+            <a:extLst>
+              <a:ext uri="{FF2B5EF4-FFF2-40B4-BE49-F238E27FC236}">
+                <a16:creationId xmlns:a16="http://schemas.microsoft.com/office/drawing/2014/main" id="{C4BAF076-983A-267F-65B0-779489FA3886}"/>
+              </a:ext>
+            </a:extLst>
+          </p:cNvPr>
+          <p:cNvPicPr>
+            <a:picLocks noChangeAspect="1" noChangeArrowheads="1"/>
+          </p:cNvPicPr>
+          <p:nvPr/>
+        </p:nvPicPr>
+        <p:blipFill>
+          <a:blip r:embed="rId3">
+            <a:extLst>
+              <a:ext uri="{28A0092B-C50C-407E-A947-70E740481C1C}">
+                <a14:useLocalDpi xmlns:a14="http://schemas.microsoft.com/office/drawing/2010/main" val="0"/>
+              </a:ext>
+            </a:extLst>
+          </a:blip>
+          <a:srcRect/>
+          <a:stretch>
+            <a:fillRect/>
+          </a:stretch>
+        </p:blipFill>
+        <p:spPr bwMode="auto">
+          <a:xfrm>
+            <a:off x="8783783" y="0"/>
+            <a:ext cx="3408217" cy="1388533"/>
+          </a:xfrm>
+          <a:prstGeom prst="rect">
+            <a:avLst/>
+          </a:prstGeom>
+          <a:noFill/>
+          <a:extLst>
+            <a:ext uri="{909E8E84-426E-40DD-AFC4-6F175D3DCCD1}">
+              <a14:hiddenFill xmlns:a14="http://schemas.microsoft.com/office/drawing/2010/main">
+                <a:solidFill>
+                  <a:srgbClr val="FFFFFF"/>
+                </a:solidFill>
+              </a14:hiddenFill>
+            </a:ext>
+          </a:extLst>
+        </p:spPr>
+      </p:pic>
+      <p:pic>
+        <p:nvPicPr>
+          <p:cNvPr id="5" name="Picture 4" descr="Edições Anteriores | SBRC 2021 - Simpósio Brasileiro de Redes de  Computadores e Sistemas Distribuídos">
+            <a:extLst>
+              <a:ext uri="{FF2B5EF4-FFF2-40B4-BE49-F238E27FC236}">
+                <a16:creationId xmlns:a16="http://schemas.microsoft.com/office/drawing/2014/main" id="{EE629CB4-DE61-E1C8-0777-7BFAD2ACB3C1}"/>
+              </a:ext>
+            </a:extLst>
+          </p:cNvPr>
+          <p:cNvPicPr>
+            <a:picLocks noChangeAspect="1" noChangeArrowheads="1"/>
+          </p:cNvPicPr>
+          <p:nvPr/>
+        </p:nvPicPr>
+        <p:blipFill rotWithShape="1">
+          <a:blip r:embed="rId4">
+            <a:extLst>
+              <a:ext uri="{28A0092B-C50C-407E-A947-70E740481C1C}">
+                <a14:useLocalDpi xmlns:a14="http://schemas.microsoft.com/office/drawing/2010/main" val="0"/>
+              </a:ext>
+            </a:extLst>
+          </a:blip>
+          <a:srcRect l="18938" t="24085"/>
+          <a:stretch/>
+        </p:blipFill>
+        <p:spPr bwMode="auto">
+          <a:xfrm>
+            <a:off x="259976" y="5803900"/>
+            <a:ext cx="2762759" cy="1054100"/>
+          </a:xfrm>
+          <a:prstGeom prst="rect">
+            <a:avLst/>
+          </a:prstGeom>
+          <a:noFill/>
+          <a:extLst>
+            <a:ext uri="{909E8E84-426E-40DD-AFC4-6F175D3DCCD1}">
+              <a14:hiddenFill xmlns:a14="http://schemas.microsoft.com/office/drawing/2010/main">
+                <a:solidFill>
+                  <a:srgbClr val="FFFFFF"/>
+                </a:solidFill>
+              </a14:hiddenFill>
+            </a:ext>
+          </a:extLst>
+        </p:spPr>
+      </p:pic>
+      <p:pic>
+        <p:nvPicPr>
+          <p:cNvPr id="7" name="Imagem 6">
+            <a:extLst>
+              <a:ext uri="{FF2B5EF4-FFF2-40B4-BE49-F238E27FC236}">
+                <a16:creationId xmlns:a16="http://schemas.microsoft.com/office/drawing/2014/main" id="{DFBD6E8A-4399-20C8-661A-C312DB6D4792}"/>
+              </a:ext>
+            </a:extLst>
+          </p:cNvPr>
+          <p:cNvPicPr>
+            <a:picLocks noChangeAspect="1"/>
+          </p:cNvPicPr>
+          <p:nvPr/>
+        </p:nvPicPr>
+        <p:blipFill>
+          <a:blip r:embed="rId5"/>
+          <a:stretch>
+            <a:fillRect/>
+          </a:stretch>
+        </p:blipFill>
+        <p:spPr>
+          <a:xfrm>
+            <a:off x="6096000" y="1722610"/>
+            <a:ext cx="5553266" cy="4530907"/>
+          </a:xfrm>
+          <a:prstGeom prst="rect">
+            <a:avLst/>
+          </a:prstGeom>
+        </p:spPr>
+      </p:pic>
+    </p:spTree>
+    <p:extLst>
+      <p:ext uri="{BB962C8B-B14F-4D97-AF65-F5344CB8AC3E}">
+        <p14:creationId xmlns:p14="http://schemas.microsoft.com/office/powerpoint/2010/main" val="1918670193"/>
+      </p:ext>
+    </p:extLst>
+  </p:cSld>
+  <p:clrMapOvr>
+    <a:masterClrMapping/>
+  </p:clrMapOvr>
+</p:sld>
+</file>
+
+<file path=ppt/slides/slide33.xml><?xml version="1.0" encoding="utf-8"?>
+<p:sld xmlns:a="http://schemas.openxmlformats.org/drawingml/2006/main" xmlns:r="http://schemas.openxmlformats.org/officeDocument/2006/relationships" xmlns:p="http://schemas.openxmlformats.org/presentationml/2006/main">
+  <p:cSld>
+    <p:spTree>
+      <p:nvGrpSpPr>
+        <p:cNvPr id="1" name=""/>
+        <p:cNvGrpSpPr/>
+        <p:nvPr/>
+      </p:nvGrpSpPr>
+      <p:grpSpPr>
+        <a:xfrm>
+          <a:off x="0" y="0"/>
+          <a:ext cx="0" cy="0"/>
+          <a:chOff x="0" y="0"/>
+          <a:chExt cx="0" cy="0"/>
+        </a:xfrm>
+      </p:grpSpPr>
+      <p:sp>
+        <p:nvSpPr>
+          <p:cNvPr id="2" name="Título 1">
+            <a:extLst>
+              <a:ext uri="{FF2B5EF4-FFF2-40B4-BE49-F238E27FC236}">
+                <a16:creationId xmlns:a16="http://schemas.microsoft.com/office/drawing/2014/main" id="{4549A9CF-9A04-0D0B-3F38-47569BAC879F}"/>
+              </a:ext>
+            </a:extLst>
+          </p:cNvPr>
+          <p:cNvSpPr>
+            <a:spLocks noGrp="1"/>
+          </p:cNvSpPr>
+          <p:nvPr>
+            <p:ph type="title"/>
+          </p:nvPr>
+        </p:nvSpPr>
+        <p:spPr>
+          <a:xfrm>
+            <a:off x="838200" y="365125"/>
+            <a:ext cx="3796553" cy="1325563"/>
+          </a:xfrm>
+        </p:spPr>
+        <p:txBody>
+          <a:bodyPr/>
+          <a:lstStyle/>
+          <a:p>
+            <a:r>
+              <a:rPr lang="pt-BR" dirty="0"/>
+              <a:t>Estudos experimentais</a:t>
+            </a:r>
+          </a:p>
+        </p:txBody>
+      </p:sp>
+      <p:sp>
+        <p:nvSpPr>
+          <p:cNvPr id="3" name="Espaço Reservado para Conteúdo 2">
+            <a:extLst>
+              <a:ext uri="{FF2B5EF4-FFF2-40B4-BE49-F238E27FC236}">
+                <a16:creationId xmlns:a16="http://schemas.microsoft.com/office/drawing/2014/main" id="{EC2E1DDA-B549-8F9D-BA64-18BAFB4D49A1}"/>
+              </a:ext>
+            </a:extLst>
+          </p:cNvPr>
+          <p:cNvSpPr>
+            <a:spLocks noGrp="1"/>
+          </p:cNvSpPr>
+          <p:nvPr>
+            <p:ph idx="1"/>
+          </p:nvPr>
+        </p:nvSpPr>
+        <p:spPr>
+          <a:xfrm>
+            <a:off x="618565" y="2232212"/>
+            <a:ext cx="3645249" cy="3146612"/>
+          </a:xfrm>
+        </p:spPr>
+        <p:txBody>
+          <a:bodyPr>
+            <a:normAutofit/>
+          </a:bodyPr>
+          <a:lstStyle/>
+          <a:p>
+            <a:r>
+              <a:rPr lang="pt-BR" dirty="0"/>
+              <a:t>Análise de resultados:</a:t>
+            </a:r>
+          </a:p>
+          <a:p>
+            <a:endParaRPr lang="pt-BR" dirty="0"/>
+          </a:p>
+          <a:p>
+            <a:pPr lvl="1"/>
+            <a:r>
+              <a:rPr lang="pt-BR" dirty="0"/>
+              <a:t>Comparação do tempo de execução entre os diferentes índices utilizados</a:t>
+            </a:r>
+          </a:p>
+          <a:p>
+            <a:pPr marL="971550" lvl="1" indent="-514350" algn="just">
+              <a:buFont typeface="+mj-lt"/>
+              <a:buAutoNum type="arabicPeriod"/>
+            </a:pPr>
+            <a:endParaRPr lang="pt-BR" dirty="0"/>
+          </a:p>
+          <a:p>
+            <a:pPr marL="0" indent="0" algn="just">
+              <a:buNone/>
+            </a:pPr>
+            <a:endParaRPr lang="pt-BR" dirty="0"/>
+          </a:p>
+        </p:txBody>
+      </p:sp>
+      <p:pic>
+        <p:nvPicPr>
+          <p:cNvPr id="5" name="Picture 4" descr="Edições Anteriores | SBRC 2021 - Simpósio Brasileiro de Redes de  Computadores e Sistemas Distribuídos">
+            <a:extLst>
+              <a:ext uri="{FF2B5EF4-FFF2-40B4-BE49-F238E27FC236}">
+                <a16:creationId xmlns:a16="http://schemas.microsoft.com/office/drawing/2014/main" id="{EE629CB4-DE61-E1C8-0777-7BFAD2ACB3C1}"/>
+              </a:ext>
+            </a:extLst>
+          </p:cNvPr>
+          <p:cNvPicPr>
+            <a:picLocks noChangeAspect="1" noChangeArrowheads="1"/>
+          </p:cNvPicPr>
+          <p:nvPr/>
+        </p:nvPicPr>
+        <p:blipFill rotWithShape="1">
+          <a:blip r:embed="rId3">
+            <a:extLst>
+              <a:ext uri="{28A0092B-C50C-407E-A947-70E740481C1C}">
+                <a14:useLocalDpi xmlns:a14="http://schemas.microsoft.com/office/drawing/2010/main" val="0"/>
+              </a:ext>
+            </a:extLst>
+          </a:blip>
+          <a:srcRect l="18938" t="24085"/>
+          <a:stretch/>
+        </p:blipFill>
+        <p:spPr bwMode="auto">
+          <a:xfrm>
+            <a:off x="259976" y="5803900"/>
+            <a:ext cx="2762759" cy="1054100"/>
+          </a:xfrm>
+          <a:prstGeom prst="rect">
+            <a:avLst/>
+          </a:prstGeom>
+          <a:noFill/>
+          <a:extLst>
+            <a:ext uri="{909E8E84-426E-40DD-AFC4-6F175D3DCCD1}">
+              <a14:hiddenFill xmlns:a14="http://schemas.microsoft.com/office/drawing/2010/main">
+                <a:solidFill>
+                  <a:srgbClr val="FFFFFF"/>
+                </a:solidFill>
+              </a14:hiddenFill>
+            </a:ext>
+          </a:extLst>
+        </p:spPr>
+      </p:pic>
+      <p:pic>
+        <p:nvPicPr>
+          <p:cNvPr id="8" name="Imagem 7">
+            <a:extLst>
+              <a:ext uri="{FF2B5EF4-FFF2-40B4-BE49-F238E27FC236}">
+                <a16:creationId xmlns:a16="http://schemas.microsoft.com/office/drawing/2014/main" id="{1CCE6AC8-5698-0A9A-BF9E-1A7BA0B5A470}"/>
+              </a:ext>
+            </a:extLst>
+          </p:cNvPr>
+          <p:cNvPicPr>
+            <a:picLocks noChangeAspect="1"/>
+          </p:cNvPicPr>
+          <p:nvPr/>
+        </p:nvPicPr>
+        <p:blipFill>
+          <a:blip r:embed="rId4"/>
+          <a:stretch>
+            <a:fillRect/>
+          </a:stretch>
+        </p:blipFill>
+        <p:spPr>
+          <a:xfrm>
+            <a:off x="4263814" y="219635"/>
+            <a:ext cx="7795474" cy="6418729"/>
+          </a:xfrm>
+          <a:prstGeom prst="rect">
+            <a:avLst/>
+          </a:prstGeom>
+        </p:spPr>
+      </p:pic>
+    </p:spTree>
+    <p:extLst>
+      <p:ext uri="{BB962C8B-B14F-4D97-AF65-F5344CB8AC3E}">
+        <p14:creationId xmlns:p14="http://schemas.microsoft.com/office/powerpoint/2010/main" val="2511915350"/>
+      </p:ext>
+    </p:extLst>
+  </p:cSld>
+  <p:clrMapOvr>
+    <a:masterClrMapping/>
+  </p:clrMapOvr>
+</p:sld>
+</file>
+
+<file path=ppt/slides/slide34.xml><?xml version="1.0" encoding="utf-8"?>
+<p:sld xmlns:a="http://schemas.openxmlformats.org/drawingml/2006/main" xmlns:r="http://schemas.openxmlformats.org/officeDocument/2006/relationships" xmlns:p="http://schemas.openxmlformats.org/presentationml/2006/main">
+  <p:cSld>
+    <p:spTree>
+      <p:nvGrpSpPr>
+        <p:cNvPr id="1" name=""/>
+        <p:cNvGrpSpPr/>
+        <p:nvPr/>
+      </p:nvGrpSpPr>
+      <p:grpSpPr>
+        <a:xfrm>
+          <a:off x="0" y="0"/>
+          <a:ext cx="0" cy="0"/>
+          <a:chOff x="0" y="0"/>
+          <a:chExt cx="0" cy="0"/>
+        </a:xfrm>
+      </p:grpSpPr>
+      <p:sp>
+        <p:nvSpPr>
+          <p:cNvPr id="2" name="Título 1">
+            <a:extLst>
+              <a:ext uri="{FF2B5EF4-FFF2-40B4-BE49-F238E27FC236}">
+                <a16:creationId xmlns:a16="http://schemas.microsoft.com/office/drawing/2014/main" id="{4549A9CF-9A04-0D0B-3F38-47569BAC879F}"/>
+              </a:ext>
+            </a:extLst>
+          </p:cNvPr>
+          <p:cNvSpPr>
+            <a:spLocks noGrp="1"/>
+          </p:cNvSpPr>
+          <p:nvPr>
+            <p:ph type="title"/>
+          </p:nvPr>
+        </p:nvSpPr>
+        <p:spPr/>
+        <p:txBody>
+          <a:bodyPr/>
+          <a:lstStyle/>
+          <a:p>
+            <a:r>
+              <a:rPr lang="pt-BR" dirty="0"/>
+              <a:t>Estudos experimentais</a:t>
+            </a:r>
+          </a:p>
+        </p:txBody>
+      </p:sp>
+      <p:sp>
+        <p:nvSpPr>
+          <p:cNvPr id="3" name="Espaço Reservado para Conteúdo 2">
+            <a:extLst>
+              <a:ext uri="{FF2B5EF4-FFF2-40B4-BE49-F238E27FC236}">
+                <a16:creationId xmlns:a16="http://schemas.microsoft.com/office/drawing/2014/main" id="{EC2E1DDA-B549-8F9D-BA64-18BAFB4D49A1}"/>
+              </a:ext>
+            </a:extLst>
+          </p:cNvPr>
+          <p:cNvSpPr>
+            <a:spLocks noGrp="1"/>
+          </p:cNvSpPr>
+          <p:nvPr>
+            <p:ph idx="1"/>
+          </p:nvPr>
+        </p:nvSpPr>
+        <p:spPr>
+          <a:xfrm>
+            <a:off x="838202" y="1812395"/>
+            <a:ext cx="8567056" cy="4351338"/>
+          </a:xfrm>
+        </p:spPr>
+        <p:txBody>
+          <a:bodyPr>
+            <a:normAutofit/>
+          </a:bodyPr>
+          <a:lstStyle/>
+          <a:p>
+            <a:pPr algn="just"/>
+            <a:r>
+              <a:rPr lang="pt-BR" dirty="0"/>
+              <a:t>Verificação do desempenho do índice CSP e ONCD</a:t>
+            </a:r>
+          </a:p>
+          <a:p>
+            <a:pPr marL="971550" lvl="1" indent="-514350" algn="just">
+              <a:buFont typeface="+mj-lt"/>
+              <a:buAutoNum type="arabicPeriod"/>
+            </a:pPr>
+            <a:endParaRPr lang="pt-BR" dirty="0"/>
+          </a:p>
+          <a:p>
+            <a:pPr lvl="1" algn="just"/>
+            <a:r>
+              <a:rPr lang="pt-BR" dirty="0"/>
+              <a:t>Experimentos utilizando </a:t>
+            </a:r>
+            <a:r>
+              <a:rPr lang="pt-BR" i="1" dirty="0" err="1"/>
+              <a:t>datasets</a:t>
+            </a:r>
+            <a:r>
+              <a:rPr lang="pt-BR" dirty="0"/>
+              <a:t> reais</a:t>
+            </a:r>
+          </a:p>
+          <a:p>
+            <a:pPr lvl="2" algn="just"/>
+            <a:endParaRPr lang="pt-BR" i="1" dirty="0"/>
+          </a:p>
+          <a:p>
+            <a:pPr lvl="2" algn="just"/>
+            <a:r>
+              <a:rPr lang="pt-BR" dirty="0"/>
+              <a:t>Os experimentos incluem três conjuntos de dados reais: Coluna Vertebral (Coluna_2C), </a:t>
+            </a:r>
+            <a:r>
+              <a:rPr lang="pt-BR" dirty="0" err="1"/>
+              <a:t>Statlog</a:t>
+            </a:r>
+            <a:r>
+              <a:rPr lang="pt-BR" dirty="0"/>
+              <a:t> Heart (Coração) e Avaliação do Assistente de Ensino (Tae), que são do UCI Machine Learning </a:t>
+            </a:r>
+            <a:r>
+              <a:rPr lang="pt-BR" dirty="0" err="1"/>
+              <a:t>Repository</a:t>
+            </a:r>
+            <a:endParaRPr lang="pt-BR" dirty="0"/>
+          </a:p>
+          <a:p>
+            <a:pPr lvl="2" algn="just"/>
+            <a:endParaRPr lang="pt-BR" dirty="0"/>
+          </a:p>
+          <a:p>
+            <a:pPr lvl="2" algn="just"/>
+            <a:r>
+              <a:rPr lang="pt-BR" dirty="0"/>
+              <a:t>Diferença de aplicação com os </a:t>
+            </a:r>
+            <a:r>
+              <a:rPr lang="pt-BR" i="1" dirty="0" err="1"/>
+              <a:t>datasets</a:t>
+            </a:r>
+            <a:r>
+              <a:rPr lang="pt-BR" dirty="0"/>
+              <a:t> sintéticos</a:t>
+            </a:r>
+          </a:p>
+        </p:txBody>
+      </p:sp>
+      <p:pic>
+        <p:nvPicPr>
+          <p:cNvPr id="4" name="Picture 2" descr="Local do Evento | SBRC 2021 - Simpósio Brasileiro de Redes ...">
+            <a:extLst>
+              <a:ext uri="{FF2B5EF4-FFF2-40B4-BE49-F238E27FC236}">
+                <a16:creationId xmlns:a16="http://schemas.microsoft.com/office/drawing/2014/main" id="{C4BAF076-983A-267F-65B0-779489FA3886}"/>
+              </a:ext>
+            </a:extLst>
+          </p:cNvPr>
+          <p:cNvPicPr>
+            <a:picLocks noChangeAspect="1" noChangeArrowheads="1"/>
+          </p:cNvPicPr>
+          <p:nvPr/>
+        </p:nvPicPr>
+        <p:blipFill>
+          <a:blip r:embed="rId3">
+            <a:extLst>
+              <a:ext uri="{28A0092B-C50C-407E-A947-70E740481C1C}">
+                <a14:useLocalDpi xmlns:a14="http://schemas.microsoft.com/office/drawing/2010/main" val="0"/>
+              </a:ext>
+            </a:extLst>
+          </a:blip>
+          <a:srcRect/>
+          <a:stretch>
+            <a:fillRect/>
+          </a:stretch>
+        </p:blipFill>
+        <p:spPr bwMode="auto">
+          <a:xfrm>
+            <a:off x="8783783" y="0"/>
+            <a:ext cx="3408217" cy="1388533"/>
+          </a:xfrm>
+          <a:prstGeom prst="rect">
+            <a:avLst/>
+          </a:prstGeom>
+          <a:noFill/>
+          <a:extLst>
+            <a:ext uri="{909E8E84-426E-40DD-AFC4-6F175D3DCCD1}">
+              <a14:hiddenFill xmlns:a14="http://schemas.microsoft.com/office/drawing/2010/main">
+                <a:solidFill>
+                  <a:srgbClr val="FFFFFF"/>
+                </a:solidFill>
+              </a14:hiddenFill>
+            </a:ext>
+          </a:extLst>
+        </p:spPr>
+      </p:pic>
+      <p:pic>
+        <p:nvPicPr>
+          <p:cNvPr id="5" name="Picture 4" descr="Edições Anteriores | SBRC 2021 - Simpósio Brasileiro de Redes de  Computadores e Sistemas Distribuídos">
+            <a:extLst>
+              <a:ext uri="{FF2B5EF4-FFF2-40B4-BE49-F238E27FC236}">
+                <a16:creationId xmlns:a16="http://schemas.microsoft.com/office/drawing/2014/main" id="{EE629CB4-DE61-E1C8-0777-7BFAD2ACB3C1}"/>
+              </a:ext>
+            </a:extLst>
+          </p:cNvPr>
+          <p:cNvPicPr>
+            <a:picLocks noChangeAspect="1" noChangeArrowheads="1"/>
+          </p:cNvPicPr>
+          <p:nvPr/>
+        </p:nvPicPr>
+        <p:blipFill rotWithShape="1">
+          <a:blip r:embed="rId4">
+            <a:extLst>
+              <a:ext uri="{28A0092B-C50C-407E-A947-70E740481C1C}">
+                <a14:useLocalDpi xmlns:a14="http://schemas.microsoft.com/office/drawing/2010/main" val="0"/>
+              </a:ext>
+            </a:extLst>
+          </a:blip>
+          <a:srcRect l="18938" t="24085"/>
+          <a:stretch/>
+        </p:blipFill>
+        <p:spPr bwMode="auto">
+          <a:xfrm>
+            <a:off x="259976" y="5803900"/>
+            <a:ext cx="2762759" cy="1054100"/>
+          </a:xfrm>
+          <a:prstGeom prst="rect">
+            <a:avLst/>
+          </a:prstGeom>
+          <a:noFill/>
+          <a:extLst>
+            <a:ext uri="{909E8E84-426E-40DD-AFC4-6F175D3DCCD1}">
+              <a14:hiddenFill xmlns:a14="http://schemas.microsoft.com/office/drawing/2010/main">
+                <a:solidFill>
+                  <a:srgbClr val="FFFFFF"/>
+                </a:solidFill>
+              </a14:hiddenFill>
+            </a:ext>
+          </a:extLst>
+        </p:spPr>
+      </p:pic>
+    </p:spTree>
+    <p:extLst>
+      <p:ext uri="{BB962C8B-B14F-4D97-AF65-F5344CB8AC3E}">
+        <p14:creationId xmlns:p14="http://schemas.microsoft.com/office/powerpoint/2010/main" val="1762874041"/>
+      </p:ext>
+    </p:extLst>
+  </p:cSld>
+  <p:clrMapOvr>
+    <a:masterClrMapping/>
+  </p:clrMapOvr>
+</p:sld>
+</file>
+
+<file path=ppt/slides/slide35.xml><?xml version="1.0" encoding="utf-8"?>
+<p:sld xmlns:a="http://schemas.openxmlformats.org/drawingml/2006/main" xmlns:r="http://schemas.openxmlformats.org/officeDocument/2006/relationships" xmlns:p="http://schemas.openxmlformats.org/presentationml/2006/main">
+  <p:cSld>
+    <p:spTree>
+      <p:nvGrpSpPr>
+        <p:cNvPr id="1" name=""/>
+        <p:cNvGrpSpPr/>
+        <p:nvPr/>
+      </p:nvGrpSpPr>
+      <p:grpSpPr>
+        <a:xfrm>
+          <a:off x="0" y="0"/>
+          <a:ext cx="0" cy="0"/>
+          <a:chOff x="0" y="0"/>
+          <a:chExt cx="0" cy="0"/>
+        </a:xfrm>
+      </p:grpSpPr>
+      <p:sp>
+        <p:nvSpPr>
+          <p:cNvPr id="2" name="Título 1">
+            <a:extLst>
+              <a:ext uri="{FF2B5EF4-FFF2-40B4-BE49-F238E27FC236}">
+                <a16:creationId xmlns:a16="http://schemas.microsoft.com/office/drawing/2014/main" id="{4549A9CF-9A04-0D0B-3F38-47569BAC879F}"/>
+              </a:ext>
+            </a:extLst>
+          </p:cNvPr>
+          <p:cNvSpPr>
+            <a:spLocks noGrp="1"/>
+          </p:cNvSpPr>
+          <p:nvPr>
+            <p:ph type="title"/>
+          </p:nvPr>
+        </p:nvSpPr>
+        <p:spPr/>
+        <p:txBody>
+          <a:bodyPr/>
+          <a:lstStyle/>
+          <a:p>
+            <a:r>
+              <a:rPr lang="pt-BR" dirty="0"/>
+              <a:t>Estudos experimentais</a:t>
+            </a:r>
+          </a:p>
+        </p:txBody>
+      </p:sp>
+      <p:sp>
+        <p:nvSpPr>
+          <p:cNvPr id="3" name="Espaço Reservado para Conteúdo 2">
+            <a:extLst>
+              <a:ext uri="{FF2B5EF4-FFF2-40B4-BE49-F238E27FC236}">
+                <a16:creationId xmlns:a16="http://schemas.microsoft.com/office/drawing/2014/main" id="{EC2E1DDA-B549-8F9D-BA64-18BAFB4D49A1}"/>
+              </a:ext>
+            </a:extLst>
+          </p:cNvPr>
+          <p:cNvSpPr>
+            <a:spLocks noGrp="1"/>
+          </p:cNvSpPr>
+          <p:nvPr>
+            <p:ph idx="1"/>
+          </p:nvPr>
+        </p:nvSpPr>
+        <p:spPr>
+          <a:xfrm>
+            <a:off x="748556" y="1819834"/>
+            <a:ext cx="3814480" cy="3789003"/>
+          </a:xfrm>
+        </p:spPr>
+        <p:txBody>
+          <a:bodyPr>
+            <a:normAutofit/>
+          </a:bodyPr>
+          <a:lstStyle/>
+          <a:p>
+            <a:pPr algn="just"/>
+            <a:r>
+              <a:rPr lang="pt-BR" dirty="0"/>
+              <a:t>Análise de resultados:</a:t>
+            </a:r>
+          </a:p>
+          <a:p>
+            <a:pPr lvl="1" algn="just"/>
+            <a:endParaRPr lang="pt-BR" dirty="0"/>
+          </a:p>
+          <a:p>
+            <a:pPr lvl="1" algn="just"/>
+            <a:r>
+              <a:rPr lang="pt-BR" dirty="0"/>
+              <a:t>Comparação entre os diferentes índices para encontrar o valor ideal de clusters e o tempo de execução para os dados reais</a:t>
+            </a:r>
+          </a:p>
+          <a:p>
+            <a:pPr marL="971550" lvl="1" indent="-514350" algn="just">
+              <a:buFont typeface="+mj-lt"/>
+              <a:buAutoNum type="arabicPeriod"/>
+            </a:pPr>
+            <a:endParaRPr lang="pt-BR" dirty="0"/>
+          </a:p>
+          <a:p>
+            <a:pPr marL="0" indent="0" algn="just">
+              <a:buNone/>
+            </a:pPr>
+            <a:endParaRPr lang="pt-BR" dirty="0"/>
+          </a:p>
+        </p:txBody>
+      </p:sp>
+      <p:pic>
+        <p:nvPicPr>
+          <p:cNvPr id="4" name="Picture 2" descr="Local do Evento | SBRC 2021 - Simpósio Brasileiro de Redes ...">
+            <a:extLst>
+              <a:ext uri="{FF2B5EF4-FFF2-40B4-BE49-F238E27FC236}">
+                <a16:creationId xmlns:a16="http://schemas.microsoft.com/office/drawing/2014/main" id="{C4BAF076-983A-267F-65B0-779489FA3886}"/>
+              </a:ext>
+            </a:extLst>
+          </p:cNvPr>
+          <p:cNvPicPr>
+            <a:picLocks noChangeAspect="1" noChangeArrowheads="1"/>
+          </p:cNvPicPr>
+          <p:nvPr/>
+        </p:nvPicPr>
+        <p:blipFill>
+          <a:blip r:embed="rId3">
+            <a:extLst>
+              <a:ext uri="{28A0092B-C50C-407E-A947-70E740481C1C}">
+                <a14:useLocalDpi xmlns:a14="http://schemas.microsoft.com/office/drawing/2010/main" val="0"/>
+              </a:ext>
+            </a:extLst>
+          </a:blip>
+          <a:srcRect/>
+          <a:stretch>
+            <a:fillRect/>
+          </a:stretch>
+        </p:blipFill>
+        <p:spPr bwMode="auto">
+          <a:xfrm>
+            <a:off x="8783783" y="0"/>
+            <a:ext cx="3408217" cy="1388533"/>
+          </a:xfrm>
+          <a:prstGeom prst="rect">
+            <a:avLst/>
+          </a:prstGeom>
+          <a:noFill/>
+          <a:extLst>
+            <a:ext uri="{909E8E84-426E-40DD-AFC4-6F175D3DCCD1}">
+              <a14:hiddenFill xmlns:a14="http://schemas.microsoft.com/office/drawing/2010/main">
+                <a:solidFill>
+                  <a:srgbClr val="FFFFFF"/>
+                </a:solidFill>
+              </a14:hiddenFill>
+            </a:ext>
+          </a:extLst>
+        </p:spPr>
+      </p:pic>
+      <p:pic>
+        <p:nvPicPr>
+          <p:cNvPr id="5" name="Picture 4" descr="Edições Anteriores | SBRC 2021 - Simpósio Brasileiro de Redes de  Computadores e Sistemas Distribuídos">
+            <a:extLst>
+              <a:ext uri="{FF2B5EF4-FFF2-40B4-BE49-F238E27FC236}">
+                <a16:creationId xmlns:a16="http://schemas.microsoft.com/office/drawing/2014/main" id="{EE629CB4-DE61-E1C8-0777-7BFAD2ACB3C1}"/>
+              </a:ext>
+            </a:extLst>
+          </p:cNvPr>
+          <p:cNvPicPr>
+            <a:picLocks noChangeAspect="1" noChangeArrowheads="1"/>
+          </p:cNvPicPr>
+          <p:nvPr/>
+        </p:nvPicPr>
+        <p:blipFill rotWithShape="1">
+          <a:blip r:embed="rId4">
+            <a:extLst>
+              <a:ext uri="{28A0092B-C50C-407E-A947-70E740481C1C}">
+                <a14:useLocalDpi xmlns:a14="http://schemas.microsoft.com/office/drawing/2010/main" val="0"/>
+              </a:ext>
+            </a:extLst>
+          </a:blip>
+          <a:srcRect l="18938" t="24085"/>
+          <a:stretch/>
+        </p:blipFill>
+        <p:spPr bwMode="auto">
+          <a:xfrm>
+            <a:off x="259976" y="5803900"/>
+            <a:ext cx="2762759" cy="1054100"/>
+          </a:xfrm>
+          <a:prstGeom prst="rect">
+            <a:avLst/>
+          </a:prstGeom>
+          <a:noFill/>
+          <a:extLst>
+            <a:ext uri="{909E8E84-426E-40DD-AFC4-6F175D3DCCD1}">
+              <a14:hiddenFill xmlns:a14="http://schemas.microsoft.com/office/drawing/2010/main">
+                <a:solidFill>
+                  <a:srgbClr val="FFFFFF"/>
+                </a:solidFill>
+              </a14:hiddenFill>
+            </a:ext>
+          </a:extLst>
+        </p:spPr>
+      </p:pic>
+      <p:pic>
+        <p:nvPicPr>
+          <p:cNvPr id="6" name="Imagem 5">
+            <a:extLst>
+              <a:ext uri="{FF2B5EF4-FFF2-40B4-BE49-F238E27FC236}">
+                <a16:creationId xmlns:a16="http://schemas.microsoft.com/office/drawing/2014/main" id="{5BA5C124-80F1-EAA6-0B60-B46B0AB2324F}"/>
+              </a:ext>
+            </a:extLst>
+          </p:cNvPr>
+          <p:cNvPicPr>
+            <a:picLocks noChangeAspect="1"/>
+          </p:cNvPicPr>
+          <p:nvPr/>
+        </p:nvPicPr>
+        <p:blipFill>
+          <a:blip r:embed="rId5"/>
+          <a:stretch>
+            <a:fillRect/>
+          </a:stretch>
+        </p:blipFill>
+        <p:spPr>
+          <a:xfrm>
+            <a:off x="4712337" y="1836767"/>
+            <a:ext cx="7479663" cy="3772071"/>
+          </a:xfrm>
+          <a:prstGeom prst="rect">
+            <a:avLst/>
+          </a:prstGeom>
+        </p:spPr>
+      </p:pic>
+    </p:spTree>
+    <p:extLst>
+      <p:ext uri="{BB962C8B-B14F-4D97-AF65-F5344CB8AC3E}">
+        <p14:creationId xmlns:p14="http://schemas.microsoft.com/office/powerpoint/2010/main" val="3618354914"/>
+      </p:ext>
+    </p:extLst>
+  </p:cSld>
+  <p:clrMapOvr>
+    <a:masterClrMapping/>
+  </p:clrMapOvr>
+</p:sld>
+</file>
+
+<file path=ppt/slides/slide36.xml><?xml version="1.0" encoding="utf-8"?>
+<p:sld xmlns:a="http://schemas.openxmlformats.org/drawingml/2006/main" xmlns:r="http://schemas.openxmlformats.org/officeDocument/2006/relationships" xmlns:p="http://schemas.openxmlformats.org/presentationml/2006/main">
+  <p:cSld>
+    <p:spTree>
+      <p:nvGrpSpPr>
+        <p:cNvPr id="1" name=""/>
+        <p:cNvGrpSpPr/>
+        <p:nvPr/>
+      </p:nvGrpSpPr>
+      <p:grpSpPr>
+        <a:xfrm>
+          <a:off x="0" y="0"/>
+          <a:ext cx="0" cy="0"/>
+          <a:chOff x="0" y="0"/>
+          <a:chExt cx="0" cy="0"/>
+        </a:xfrm>
+      </p:grpSpPr>
+      <p:sp>
+        <p:nvSpPr>
+          <p:cNvPr id="2" name="Título 1">
+            <a:extLst>
+              <a:ext uri="{FF2B5EF4-FFF2-40B4-BE49-F238E27FC236}">
+                <a16:creationId xmlns:a16="http://schemas.microsoft.com/office/drawing/2014/main" id="{4549A9CF-9A04-0D0B-3F38-47569BAC879F}"/>
+              </a:ext>
+            </a:extLst>
+          </p:cNvPr>
+          <p:cNvSpPr>
+            <a:spLocks noGrp="1"/>
+          </p:cNvSpPr>
+          <p:nvPr>
+            <p:ph type="title"/>
+          </p:nvPr>
+        </p:nvSpPr>
+        <p:spPr/>
+        <p:txBody>
+          <a:bodyPr/>
+          <a:lstStyle/>
+          <a:p>
+            <a:r>
+              <a:rPr lang="pt-BR" dirty="0"/>
+              <a:t>Discussões</a:t>
+            </a:r>
+          </a:p>
+        </p:txBody>
+      </p:sp>
+      <p:sp>
+        <p:nvSpPr>
+          <p:cNvPr id="3" name="Espaço Reservado para Conteúdo 2">
+            <a:extLst>
+              <a:ext uri="{FF2B5EF4-FFF2-40B4-BE49-F238E27FC236}">
+                <a16:creationId xmlns:a16="http://schemas.microsoft.com/office/drawing/2014/main" id="{EC2E1DDA-B549-8F9D-BA64-18BAFB4D49A1}"/>
+              </a:ext>
+            </a:extLst>
+          </p:cNvPr>
+          <p:cNvSpPr>
+            <a:spLocks noGrp="1"/>
+          </p:cNvSpPr>
+          <p:nvPr>
+            <p:ph idx="1"/>
+          </p:nvPr>
+        </p:nvSpPr>
+        <p:spPr>
+          <a:xfrm>
+            <a:off x="838202" y="1812395"/>
+            <a:ext cx="8567056" cy="4351338"/>
+          </a:xfrm>
+        </p:spPr>
+        <p:txBody>
+          <a:bodyPr>
+            <a:normAutofit/>
+          </a:bodyPr>
+          <a:lstStyle/>
+          <a:p>
+            <a:pPr algn="just"/>
+            <a:r>
+              <a:rPr lang="pt-BR" dirty="0"/>
+              <a:t>Extensão do algoritmo OCND (EOCND)</a:t>
+            </a:r>
+          </a:p>
+          <a:p>
+            <a:pPr algn="just"/>
+            <a:endParaRPr lang="pt-BR" dirty="0"/>
+          </a:p>
+        </p:txBody>
+      </p:sp>
+      <p:pic>
+        <p:nvPicPr>
+          <p:cNvPr id="4" name="Picture 2" descr="Local do Evento | SBRC 2021 - Simpósio Brasileiro de Redes ...">
+            <a:extLst>
+              <a:ext uri="{FF2B5EF4-FFF2-40B4-BE49-F238E27FC236}">
+                <a16:creationId xmlns:a16="http://schemas.microsoft.com/office/drawing/2014/main" id="{C4BAF076-983A-267F-65B0-779489FA3886}"/>
+              </a:ext>
+            </a:extLst>
+          </p:cNvPr>
+          <p:cNvPicPr>
+            <a:picLocks noChangeAspect="1" noChangeArrowheads="1"/>
+          </p:cNvPicPr>
+          <p:nvPr/>
+        </p:nvPicPr>
+        <p:blipFill>
+          <a:blip r:embed="rId3">
+            <a:extLst>
+              <a:ext uri="{28A0092B-C50C-407E-A947-70E740481C1C}">
+                <a14:useLocalDpi xmlns:a14="http://schemas.microsoft.com/office/drawing/2010/main" val="0"/>
+              </a:ext>
+            </a:extLst>
+          </a:blip>
+          <a:srcRect/>
+          <a:stretch>
+            <a:fillRect/>
+          </a:stretch>
+        </p:blipFill>
+        <p:spPr bwMode="auto">
+          <a:xfrm>
+            <a:off x="8783783" y="0"/>
+            <a:ext cx="3408217" cy="1388533"/>
+          </a:xfrm>
+          <a:prstGeom prst="rect">
+            <a:avLst/>
+          </a:prstGeom>
+          <a:noFill/>
+          <a:extLst>
+            <a:ext uri="{909E8E84-426E-40DD-AFC4-6F175D3DCCD1}">
+              <a14:hiddenFill xmlns:a14="http://schemas.microsoft.com/office/drawing/2010/main">
+                <a:solidFill>
+                  <a:srgbClr val="FFFFFF"/>
+                </a:solidFill>
+              </a14:hiddenFill>
+            </a:ext>
+          </a:extLst>
+        </p:spPr>
+      </p:pic>
+      <p:pic>
+        <p:nvPicPr>
+          <p:cNvPr id="5" name="Picture 4" descr="Edições Anteriores | SBRC 2021 - Simpósio Brasileiro de Redes de  Computadores e Sistemas Distribuídos">
+            <a:extLst>
+              <a:ext uri="{FF2B5EF4-FFF2-40B4-BE49-F238E27FC236}">
+                <a16:creationId xmlns:a16="http://schemas.microsoft.com/office/drawing/2014/main" id="{EE629CB4-DE61-E1C8-0777-7BFAD2ACB3C1}"/>
+              </a:ext>
+            </a:extLst>
+          </p:cNvPr>
+          <p:cNvPicPr>
+            <a:picLocks noChangeAspect="1" noChangeArrowheads="1"/>
+          </p:cNvPicPr>
+          <p:nvPr/>
+        </p:nvPicPr>
+        <p:blipFill rotWithShape="1">
+          <a:blip r:embed="rId4">
+            <a:extLst>
+              <a:ext uri="{28A0092B-C50C-407E-A947-70E740481C1C}">
+                <a14:useLocalDpi xmlns:a14="http://schemas.microsoft.com/office/drawing/2010/main" val="0"/>
+              </a:ext>
+            </a:extLst>
+          </a:blip>
+          <a:srcRect l="18938" t="24085"/>
+          <a:stretch/>
+        </p:blipFill>
+        <p:spPr bwMode="auto">
+          <a:xfrm>
+            <a:off x="259976" y="5803900"/>
+            <a:ext cx="2762759" cy="1054100"/>
+          </a:xfrm>
+          <a:prstGeom prst="rect">
+            <a:avLst/>
+          </a:prstGeom>
+          <a:noFill/>
+          <a:extLst>
+            <a:ext uri="{909E8E84-426E-40DD-AFC4-6F175D3DCCD1}">
+              <a14:hiddenFill xmlns:a14="http://schemas.microsoft.com/office/drawing/2010/main">
+                <a:solidFill>
+                  <a:srgbClr val="FFFFFF"/>
+                </a:solidFill>
+              </a14:hiddenFill>
+            </a:ext>
+          </a:extLst>
+        </p:spPr>
+      </p:pic>
+      <p:pic>
+        <p:nvPicPr>
+          <p:cNvPr id="7" name="Imagem 6">
+            <a:extLst>
+              <a:ext uri="{FF2B5EF4-FFF2-40B4-BE49-F238E27FC236}">
+                <a16:creationId xmlns:a16="http://schemas.microsoft.com/office/drawing/2014/main" id="{23031F00-F4B8-4BB3-1FCF-4CFF6DE1BFB1}"/>
+              </a:ext>
+            </a:extLst>
+          </p:cNvPr>
+          <p:cNvPicPr>
+            <a:picLocks noChangeAspect="1"/>
+          </p:cNvPicPr>
+          <p:nvPr/>
+        </p:nvPicPr>
+        <p:blipFill>
+          <a:blip r:embed="rId5"/>
+          <a:stretch>
+            <a:fillRect/>
+          </a:stretch>
+        </p:blipFill>
+        <p:spPr>
+          <a:xfrm>
+            <a:off x="3120257" y="2623531"/>
+            <a:ext cx="5951486" cy="3786233"/>
+          </a:xfrm>
+          <a:prstGeom prst="rect">
+            <a:avLst/>
+          </a:prstGeom>
+        </p:spPr>
+      </p:pic>
+    </p:spTree>
+    <p:extLst>
+      <p:ext uri="{BB962C8B-B14F-4D97-AF65-F5344CB8AC3E}">
+        <p14:creationId xmlns:p14="http://schemas.microsoft.com/office/powerpoint/2010/main" val="3870059626"/>
+      </p:ext>
+    </p:extLst>
+  </p:cSld>
+  <p:clrMapOvr>
+    <a:masterClrMapping/>
+  </p:clrMapOvr>
+</p:sld>
+</file>
+
+<file path=ppt/slides/slide37.xml><?xml version="1.0" encoding="utf-8"?>
+<p:sld xmlns:a="http://schemas.openxmlformats.org/drawingml/2006/main" xmlns:r="http://schemas.openxmlformats.org/officeDocument/2006/relationships" xmlns:p="http://schemas.openxmlformats.org/presentationml/2006/main">
+  <p:cSld>
+    <p:spTree>
+      <p:nvGrpSpPr>
+        <p:cNvPr id="1" name=""/>
+        <p:cNvGrpSpPr/>
+        <p:nvPr/>
+      </p:nvGrpSpPr>
+      <p:grpSpPr>
+        <a:xfrm>
+          <a:off x="0" y="0"/>
+          <a:ext cx="0" cy="0"/>
+          <a:chOff x="0" y="0"/>
+          <a:chExt cx="0" cy="0"/>
+        </a:xfrm>
+      </p:grpSpPr>
+      <p:sp>
+        <p:nvSpPr>
+          <p:cNvPr id="2" name="Título 1">
+            <a:extLst>
+              <a:ext uri="{FF2B5EF4-FFF2-40B4-BE49-F238E27FC236}">
+                <a16:creationId xmlns:a16="http://schemas.microsoft.com/office/drawing/2014/main" id="{4549A9CF-9A04-0D0B-3F38-47569BAC879F}"/>
+              </a:ext>
+            </a:extLst>
+          </p:cNvPr>
+          <p:cNvSpPr>
+            <a:spLocks noGrp="1"/>
+          </p:cNvSpPr>
+          <p:nvPr>
+            <p:ph type="title"/>
+          </p:nvPr>
+        </p:nvSpPr>
+        <p:spPr/>
+        <p:txBody>
+          <a:bodyPr/>
+          <a:lstStyle/>
+          <a:p>
+            <a:r>
+              <a:rPr lang="pt-BR" dirty="0" err="1"/>
+              <a:t>Conlusões</a:t>
+            </a:r>
+            <a:endParaRPr lang="pt-BR" dirty="0"/>
+          </a:p>
+        </p:txBody>
+      </p:sp>
+      <p:sp>
+        <p:nvSpPr>
+          <p:cNvPr id="3" name="Espaço Reservado para Conteúdo 2">
+            <a:extLst>
+              <a:ext uri="{FF2B5EF4-FFF2-40B4-BE49-F238E27FC236}">
+                <a16:creationId xmlns:a16="http://schemas.microsoft.com/office/drawing/2014/main" id="{EC2E1DDA-B549-8F9D-BA64-18BAFB4D49A1}"/>
+              </a:ext>
+            </a:extLst>
+          </p:cNvPr>
+          <p:cNvSpPr>
+            <a:spLocks noGrp="1"/>
+          </p:cNvSpPr>
+          <p:nvPr>
+            <p:ph idx="1"/>
+          </p:nvPr>
+        </p:nvSpPr>
+        <p:spPr>
+          <a:xfrm>
+            <a:off x="838202" y="1812395"/>
+            <a:ext cx="10515598" cy="4351338"/>
+          </a:xfrm>
+        </p:spPr>
+        <p:txBody>
+          <a:bodyPr>
+            <a:normAutofit/>
+          </a:bodyPr>
+          <a:lstStyle/>
+          <a:p>
+            <a:pPr algn="just"/>
+            <a:r>
+              <a:rPr lang="pt-BR" dirty="0"/>
+              <a:t>Baseado no algoritmo AHC com ligação única e no índice de validade de agrupamento CSP, o algoritmo ONCD é proposto para analisar o efeito de agrupamento de conjuntos de dados e determinar o número ideal de clusters. Pesquisas teóricas e resultados experimentais mostram que o índice proposto e o método podem avaliar os resultados do agrupamento de forma eficaz e são adequados para determinar o número ideal de agrupamentos para conjuntos de dados lineares, múltiplos, anulares e convexos.</a:t>
+            </a:r>
+          </a:p>
+        </p:txBody>
+      </p:sp>
+      <p:pic>
+        <p:nvPicPr>
+          <p:cNvPr id="4" name="Picture 2" descr="Local do Evento | SBRC 2021 - Simpósio Brasileiro de Redes ...">
+            <a:extLst>
+              <a:ext uri="{FF2B5EF4-FFF2-40B4-BE49-F238E27FC236}">
+                <a16:creationId xmlns:a16="http://schemas.microsoft.com/office/drawing/2014/main" id="{C4BAF076-983A-267F-65B0-779489FA3886}"/>
+              </a:ext>
+            </a:extLst>
+          </p:cNvPr>
+          <p:cNvPicPr>
+            <a:picLocks noChangeAspect="1" noChangeArrowheads="1"/>
+          </p:cNvPicPr>
+          <p:nvPr/>
+        </p:nvPicPr>
+        <p:blipFill>
+          <a:blip r:embed="rId3">
+            <a:extLst>
+              <a:ext uri="{28A0092B-C50C-407E-A947-70E740481C1C}">
+                <a14:useLocalDpi xmlns:a14="http://schemas.microsoft.com/office/drawing/2010/main" val="0"/>
+              </a:ext>
+            </a:extLst>
+          </a:blip>
+          <a:srcRect/>
+          <a:stretch>
+            <a:fillRect/>
+          </a:stretch>
+        </p:blipFill>
+        <p:spPr bwMode="auto">
+          <a:xfrm>
+            <a:off x="8783783" y="0"/>
+            <a:ext cx="3408217" cy="1388533"/>
+          </a:xfrm>
+          <a:prstGeom prst="rect">
+            <a:avLst/>
+          </a:prstGeom>
+          <a:noFill/>
+          <a:extLst>
+            <a:ext uri="{909E8E84-426E-40DD-AFC4-6F175D3DCCD1}">
+              <a14:hiddenFill xmlns:a14="http://schemas.microsoft.com/office/drawing/2010/main">
+                <a:solidFill>
+                  <a:srgbClr val="FFFFFF"/>
+                </a:solidFill>
+              </a14:hiddenFill>
+            </a:ext>
+          </a:extLst>
+        </p:spPr>
+      </p:pic>
+      <p:pic>
+        <p:nvPicPr>
+          <p:cNvPr id="5" name="Picture 4" descr="Edições Anteriores | SBRC 2021 - Simpósio Brasileiro de Redes de  Computadores e Sistemas Distribuídos">
+            <a:extLst>
+              <a:ext uri="{FF2B5EF4-FFF2-40B4-BE49-F238E27FC236}">
+                <a16:creationId xmlns:a16="http://schemas.microsoft.com/office/drawing/2014/main" id="{EE629CB4-DE61-E1C8-0777-7BFAD2ACB3C1}"/>
+              </a:ext>
+            </a:extLst>
+          </p:cNvPr>
+          <p:cNvPicPr>
+            <a:picLocks noChangeAspect="1" noChangeArrowheads="1"/>
+          </p:cNvPicPr>
+          <p:nvPr/>
+        </p:nvPicPr>
+        <p:blipFill rotWithShape="1">
+          <a:blip r:embed="rId4">
+            <a:extLst>
+              <a:ext uri="{28A0092B-C50C-407E-A947-70E740481C1C}">
+                <a14:useLocalDpi xmlns:a14="http://schemas.microsoft.com/office/drawing/2010/main" val="0"/>
+              </a:ext>
+            </a:extLst>
+          </a:blip>
+          <a:srcRect l="18938" t="24085"/>
+          <a:stretch/>
+        </p:blipFill>
+        <p:spPr bwMode="auto">
+          <a:xfrm>
+            <a:off x="259976" y="5803900"/>
+            <a:ext cx="2762759" cy="1054100"/>
+          </a:xfrm>
+          <a:prstGeom prst="rect">
+            <a:avLst/>
+          </a:prstGeom>
+          <a:noFill/>
+          <a:extLst>
+            <a:ext uri="{909E8E84-426E-40DD-AFC4-6F175D3DCCD1}">
+              <a14:hiddenFill xmlns:a14="http://schemas.microsoft.com/office/drawing/2010/main">
+                <a:solidFill>
+                  <a:srgbClr val="FFFFFF"/>
+                </a:solidFill>
+              </a14:hiddenFill>
+            </a:ext>
+          </a:extLst>
+        </p:spPr>
+      </p:pic>
+    </p:spTree>
+    <p:extLst>
+      <p:ext uri="{BB962C8B-B14F-4D97-AF65-F5344CB8AC3E}">
+        <p14:creationId xmlns:p14="http://schemas.microsoft.com/office/powerpoint/2010/main" val="2537649068"/>
+      </p:ext>
+    </p:extLst>
+  </p:cSld>
+  <p:clrMapOvr>
+    <a:masterClrMapping/>
+  </p:clrMapOvr>
+</p:sld>
+</file>
+
+<file path=ppt/slides/slide38.xml><?xml version="1.0" encoding="utf-8"?>
+<p:sld xmlns:a="http://schemas.openxmlformats.org/drawingml/2006/main" xmlns:r="http://schemas.openxmlformats.org/officeDocument/2006/relationships" xmlns:p="http://schemas.openxmlformats.org/presentationml/2006/main">
+  <p:cSld>
+    <p:spTree>
+      <p:nvGrpSpPr>
+        <p:cNvPr id="1" name=""/>
+        <p:cNvGrpSpPr/>
+        <p:nvPr/>
+      </p:nvGrpSpPr>
+      <p:grpSpPr>
+        <a:xfrm>
+          <a:off x="0" y="0"/>
+          <a:ext cx="0" cy="0"/>
+          <a:chOff x="0" y="0"/>
+          <a:chExt cx="0" cy="0"/>
+        </a:xfrm>
+      </p:grpSpPr>
+      <p:sp>
+        <p:nvSpPr>
+          <p:cNvPr id="2" name="Título 1">
+            <a:extLst>
+              <a:ext uri="{FF2B5EF4-FFF2-40B4-BE49-F238E27FC236}">
+                <a16:creationId xmlns:a16="http://schemas.microsoft.com/office/drawing/2014/main" id="{4549A9CF-9A04-0D0B-3F38-47569BAC879F}"/>
+              </a:ext>
+            </a:extLst>
+          </p:cNvPr>
+          <p:cNvSpPr>
+            <a:spLocks noGrp="1"/>
+          </p:cNvSpPr>
+          <p:nvPr>
+            <p:ph type="title"/>
+          </p:nvPr>
+        </p:nvSpPr>
+        <p:spPr/>
+        <p:txBody>
+          <a:bodyPr/>
+          <a:lstStyle/>
+          <a:p>
+            <a:r>
+              <a:rPr lang="pt-BR" dirty="0"/>
+              <a:t>Referências</a:t>
+            </a:r>
+          </a:p>
+        </p:txBody>
+      </p:sp>
+      <p:sp>
+        <p:nvSpPr>
+          <p:cNvPr id="3" name="Espaço Reservado para Conteúdo 2">
+            <a:extLst>
+              <a:ext uri="{FF2B5EF4-FFF2-40B4-BE49-F238E27FC236}">
+                <a16:creationId xmlns:a16="http://schemas.microsoft.com/office/drawing/2014/main" id="{EC2E1DDA-B549-8F9D-BA64-18BAFB4D49A1}"/>
+              </a:ext>
+            </a:extLst>
+          </p:cNvPr>
+          <p:cNvSpPr>
+            <a:spLocks noGrp="1"/>
+          </p:cNvSpPr>
+          <p:nvPr>
+            <p:ph idx="1"/>
+          </p:nvPr>
+        </p:nvSpPr>
+        <p:spPr>
+          <a:xfrm>
+            <a:off x="838202" y="1812395"/>
+            <a:ext cx="8567056" cy="4351338"/>
+          </a:xfrm>
+        </p:spPr>
+        <p:txBody>
+          <a:bodyPr>
+            <a:normAutofit/>
+          </a:bodyPr>
+          <a:lstStyle/>
+          <a:p>
+            <a:pPr algn="just"/>
+            <a:r>
+              <a:rPr lang="pt-BR" dirty="0"/>
+              <a:t>Id</a:t>
+            </a:r>
+          </a:p>
+        </p:txBody>
+      </p:sp>
+      <p:pic>
+        <p:nvPicPr>
+          <p:cNvPr id="4" name="Picture 2" descr="Local do Evento | SBRC 2021 - Simpósio Brasileiro de Redes ...">
+            <a:extLst>
+              <a:ext uri="{FF2B5EF4-FFF2-40B4-BE49-F238E27FC236}">
+                <a16:creationId xmlns:a16="http://schemas.microsoft.com/office/drawing/2014/main" id="{C4BAF076-983A-267F-65B0-779489FA3886}"/>
+              </a:ext>
+            </a:extLst>
+          </p:cNvPr>
+          <p:cNvPicPr>
+            <a:picLocks noChangeAspect="1" noChangeArrowheads="1"/>
+          </p:cNvPicPr>
+          <p:nvPr/>
+        </p:nvPicPr>
+        <p:blipFill>
+          <a:blip r:embed="rId3">
+            <a:extLst>
+              <a:ext uri="{28A0092B-C50C-407E-A947-70E740481C1C}">
+                <a14:useLocalDpi xmlns:a14="http://schemas.microsoft.com/office/drawing/2010/main" val="0"/>
+              </a:ext>
+            </a:extLst>
+          </a:blip>
+          <a:srcRect/>
+          <a:stretch>
+            <a:fillRect/>
+          </a:stretch>
+        </p:blipFill>
+        <p:spPr bwMode="auto">
+          <a:xfrm>
+            <a:off x="8783783" y="0"/>
+            <a:ext cx="3408217" cy="1388533"/>
+          </a:xfrm>
+          <a:prstGeom prst="rect">
+            <a:avLst/>
+          </a:prstGeom>
+          <a:noFill/>
+          <a:extLst>
+            <a:ext uri="{909E8E84-426E-40DD-AFC4-6F175D3DCCD1}">
+              <a14:hiddenFill xmlns:a14="http://schemas.microsoft.com/office/drawing/2010/main">
+                <a:solidFill>
+                  <a:srgbClr val="FFFFFF"/>
+                </a:solidFill>
+              </a14:hiddenFill>
+            </a:ext>
+          </a:extLst>
+        </p:spPr>
+      </p:pic>
+      <p:pic>
+        <p:nvPicPr>
+          <p:cNvPr id="5" name="Picture 4" descr="Edições Anteriores | SBRC 2021 - Simpósio Brasileiro de Redes de  Computadores e Sistemas Distribuídos">
+            <a:extLst>
+              <a:ext uri="{FF2B5EF4-FFF2-40B4-BE49-F238E27FC236}">
+                <a16:creationId xmlns:a16="http://schemas.microsoft.com/office/drawing/2014/main" id="{EE629CB4-DE61-E1C8-0777-7BFAD2ACB3C1}"/>
+              </a:ext>
+            </a:extLst>
+          </p:cNvPr>
+          <p:cNvPicPr>
+            <a:picLocks noChangeAspect="1" noChangeArrowheads="1"/>
+          </p:cNvPicPr>
+          <p:nvPr/>
+        </p:nvPicPr>
+        <p:blipFill rotWithShape="1">
+          <a:blip r:embed="rId4">
+            <a:extLst>
+              <a:ext uri="{28A0092B-C50C-407E-A947-70E740481C1C}">
+                <a14:useLocalDpi xmlns:a14="http://schemas.microsoft.com/office/drawing/2010/main" val="0"/>
+              </a:ext>
+            </a:extLst>
+          </a:blip>
+          <a:srcRect l="18938" t="24085"/>
+          <a:stretch/>
+        </p:blipFill>
+        <p:spPr bwMode="auto">
+          <a:xfrm>
+            <a:off x="259976" y="5803900"/>
+            <a:ext cx="2762759" cy="1054100"/>
+          </a:xfrm>
+          <a:prstGeom prst="rect">
+            <a:avLst/>
+          </a:prstGeom>
+          <a:noFill/>
+          <a:extLst>
+            <a:ext uri="{909E8E84-426E-40DD-AFC4-6F175D3DCCD1}">
+              <a14:hiddenFill xmlns:a14="http://schemas.microsoft.com/office/drawing/2010/main">
+                <a:solidFill>
+                  <a:srgbClr val="FFFFFF"/>
+                </a:solidFill>
+              </a14:hiddenFill>
+            </a:ext>
+          </a:extLst>
+        </p:spPr>
+      </p:pic>
+    </p:spTree>
+    <p:extLst>
+      <p:ext uri="{BB962C8B-B14F-4D97-AF65-F5344CB8AC3E}">
+        <p14:creationId xmlns:p14="http://schemas.microsoft.com/office/powerpoint/2010/main" val="288272327"/>
       </p:ext>
     </p:extLst>
   </p:cSld>

</xml_diff>

<commit_message>
Versão preliminar dos slides de apresentação
</commit_message>
<xml_diff>
--- a/Seminario/optimal clusters - SLIDES.pptx
+++ b/Seminario/optimal clusters - SLIDES.pptx
@@ -234,7 +234,7 @@
           <a:p>
             <a:fld id="{C27D85D0-8849-4E53-AC47-0B98F7A07F37}" type="datetimeFigureOut">
               <a:rPr lang="pt-BR" smtClean="0"/>
-              <a:t>06/05/2024</a:t>
+              <a:t>11/05/2024</a:t>
             </a:fld>
             <a:endParaRPr lang="pt-BR"/>
           </a:p>
@@ -4439,7 +4439,7 @@
           <a:p>
             <a:fld id="{809AD006-F4CF-42C4-B1DE-5280DDD9EA79}" type="datetimeFigureOut">
               <a:rPr lang="pt-BR" smtClean="0"/>
-              <a:t>06/05/2024</a:t>
+              <a:t>11/05/2024</a:t>
             </a:fld>
             <a:endParaRPr lang="pt-BR"/>
           </a:p>
@@ -4637,7 +4637,7 @@
           <a:p>
             <a:fld id="{809AD006-F4CF-42C4-B1DE-5280DDD9EA79}" type="datetimeFigureOut">
               <a:rPr lang="pt-BR" smtClean="0"/>
-              <a:t>06/05/2024</a:t>
+              <a:t>11/05/2024</a:t>
             </a:fld>
             <a:endParaRPr lang="pt-BR"/>
           </a:p>
@@ -4845,7 +4845,7 @@
           <a:p>
             <a:fld id="{809AD006-F4CF-42C4-B1DE-5280DDD9EA79}" type="datetimeFigureOut">
               <a:rPr lang="pt-BR" smtClean="0"/>
-              <a:t>06/05/2024</a:t>
+              <a:t>11/05/2024</a:t>
             </a:fld>
             <a:endParaRPr lang="pt-BR"/>
           </a:p>
@@ -5043,7 +5043,7 @@
           <a:p>
             <a:fld id="{809AD006-F4CF-42C4-B1DE-5280DDD9EA79}" type="datetimeFigureOut">
               <a:rPr lang="pt-BR" smtClean="0"/>
-              <a:t>06/05/2024</a:t>
+              <a:t>11/05/2024</a:t>
             </a:fld>
             <a:endParaRPr lang="pt-BR"/>
           </a:p>
@@ -5318,7 +5318,7 @@
           <a:p>
             <a:fld id="{809AD006-F4CF-42C4-B1DE-5280DDD9EA79}" type="datetimeFigureOut">
               <a:rPr lang="pt-BR" smtClean="0"/>
-              <a:t>06/05/2024</a:t>
+              <a:t>11/05/2024</a:t>
             </a:fld>
             <a:endParaRPr lang="pt-BR"/>
           </a:p>
@@ -5583,7 +5583,7 @@
           <a:p>
             <a:fld id="{809AD006-F4CF-42C4-B1DE-5280DDD9EA79}" type="datetimeFigureOut">
               <a:rPr lang="pt-BR" smtClean="0"/>
-              <a:t>06/05/2024</a:t>
+              <a:t>11/05/2024</a:t>
             </a:fld>
             <a:endParaRPr lang="pt-BR"/>
           </a:p>
@@ -5995,7 +5995,7 @@
           <a:p>
             <a:fld id="{809AD006-F4CF-42C4-B1DE-5280DDD9EA79}" type="datetimeFigureOut">
               <a:rPr lang="pt-BR" smtClean="0"/>
-              <a:t>06/05/2024</a:t>
+              <a:t>11/05/2024</a:t>
             </a:fld>
             <a:endParaRPr lang="pt-BR"/>
           </a:p>
@@ -6136,7 +6136,7 @@
           <a:p>
             <a:fld id="{809AD006-F4CF-42C4-B1DE-5280DDD9EA79}" type="datetimeFigureOut">
               <a:rPr lang="pt-BR" smtClean="0"/>
-              <a:t>06/05/2024</a:t>
+              <a:t>11/05/2024</a:t>
             </a:fld>
             <a:endParaRPr lang="pt-BR"/>
           </a:p>
@@ -6249,7 +6249,7 @@
           <a:p>
             <a:fld id="{809AD006-F4CF-42C4-B1DE-5280DDD9EA79}" type="datetimeFigureOut">
               <a:rPr lang="pt-BR" smtClean="0"/>
-              <a:t>06/05/2024</a:t>
+              <a:t>11/05/2024</a:t>
             </a:fld>
             <a:endParaRPr lang="pt-BR"/>
           </a:p>
@@ -6560,7 +6560,7 @@
           <a:p>
             <a:fld id="{809AD006-F4CF-42C4-B1DE-5280DDD9EA79}" type="datetimeFigureOut">
               <a:rPr lang="pt-BR" smtClean="0"/>
-              <a:t>06/05/2024</a:t>
+              <a:t>11/05/2024</a:t>
             </a:fld>
             <a:endParaRPr lang="pt-BR"/>
           </a:p>
@@ -6848,7 +6848,7 @@
           <a:p>
             <a:fld id="{809AD006-F4CF-42C4-B1DE-5280DDD9EA79}" type="datetimeFigureOut">
               <a:rPr lang="pt-BR" smtClean="0"/>
-              <a:t>06/05/2024</a:t>
+              <a:t>11/05/2024</a:t>
             </a:fld>
             <a:endParaRPr lang="pt-BR"/>
           </a:p>
@@ -7089,7 +7089,7 @@
           <a:p>
             <a:fld id="{809AD006-F4CF-42C4-B1DE-5280DDD9EA79}" type="datetimeFigureOut">
               <a:rPr lang="pt-BR" smtClean="0"/>
-              <a:t>06/05/2024</a:t>
+              <a:t>11/05/2024</a:t>
             </a:fld>
             <a:endParaRPr lang="pt-BR"/>
           </a:p>
@@ -16793,7 +16793,7 @@
             <a:pPr algn="just"/>
             <a:r>
               <a:rPr lang="pt-BR" dirty="0"/>
-              <a:t>Extensão do algoritmo OCND (EOCND)</a:t>
+              <a:t>Extensão do algoritmo ONCD (EOCND)</a:t>
             </a:r>
           </a:p>
           <a:p>

</xml_diff>